<commit_message>
building blocks reorganized and llm gateway specified
</commit_message>
<xml_diff>
--- a/RAKIPOEV-docs/docs/ppt/Building-Blocks.pptx
+++ b/RAKIPOEV-docs/docs/ppt/Building-Blocks.pptx
@@ -12,6 +12,7 @@
     <p:sldId id="259" r:id="rId6"/>
     <p:sldId id="260" r:id="rId7"/>
     <p:sldId id="258" r:id="rId8"/>
+    <p:sldId id="263" r:id="rId9"/>
   </p:sldIdLst>
   <p:sldSz cx="12192000" cy="6858000"/>
   <p:notesSz cx="6858000" cy="9144000"/>
@@ -110,6 +111,11 @@
       </a:defRPr>
     </a:lvl9pPr>
   </p:defaultTextStyle>
+  <p:extLst>
+    <p:ext uri="{EFAFB233-063F-42B5-8137-9DF3F51BA10A}">
+      <p15:sldGuideLst xmlns:p15="http://schemas.microsoft.com/office/powerpoint/2012/main"/>
+    </p:ext>
+  </p:extLst>
 </p:presentation>
 </file>
 
@@ -260,7 +266,7 @@
           <a:p>
             <a:fld id="{BA6DBFC3-540E-6444-9571-9AC72F552CFB}" type="datetimeFigureOut">
               <a:rPr lang="de-DE" smtClean="0"/>
-              <a:t>17.01.25</a:t>
+              <a:t>27.01.25</a:t>
             </a:fld>
             <a:endParaRPr lang="de-DE"/>
           </a:p>
@@ -458,7 +464,7 @@
           <a:p>
             <a:fld id="{BA6DBFC3-540E-6444-9571-9AC72F552CFB}" type="datetimeFigureOut">
               <a:rPr lang="de-DE" smtClean="0"/>
-              <a:t>17.01.25</a:t>
+              <a:t>27.01.25</a:t>
             </a:fld>
             <a:endParaRPr lang="de-DE"/>
           </a:p>
@@ -666,7 +672,7 @@
           <a:p>
             <a:fld id="{BA6DBFC3-540E-6444-9571-9AC72F552CFB}" type="datetimeFigureOut">
               <a:rPr lang="de-DE" smtClean="0"/>
-              <a:t>17.01.25</a:t>
+              <a:t>27.01.25</a:t>
             </a:fld>
             <a:endParaRPr lang="de-DE"/>
           </a:p>
@@ -864,7 +870,7 @@
           <a:p>
             <a:fld id="{BA6DBFC3-540E-6444-9571-9AC72F552CFB}" type="datetimeFigureOut">
               <a:rPr lang="de-DE" smtClean="0"/>
-              <a:t>17.01.25</a:t>
+              <a:t>27.01.25</a:t>
             </a:fld>
             <a:endParaRPr lang="de-DE"/>
           </a:p>
@@ -1139,7 +1145,7 @@
           <a:p>
             <a:fld id="{BA6DBFC3-540E-6444-9571-9AC72F552CFB}" type="datetimeFigureOut">
               <a:rPr lang="de-DE" smtClean="0"/>
-              <a:t>17.01.25</a:t>
+              <a:t>27.01.25</a:t>
             </a:fld>
             <a:endParaRPr lang="de-DE"/>
           </a:p>
@@ -1404,7 +1410,7 @@
           <a:p>
             <a:fld id="{BA6DBFC3-540E-6444-9571-9AC72F552CFB}" type="datetimeFigureOut">
               <a:rPr lang="de-DE" smtClean="0"/>
-              <a:t>17.01.25</a:t>
+              <a:t>27.01.25</a:t>
             </a:fld>
             <a:endParaRPr lang="de-DE"/>
           </a:p>
@@ -1816,7 +1822,7 @@
           <a:p>
             <a:fld id="{BA6DBFC3-540E-6444-9571-9AC72F552CFB}" type="datetimeFigureOut">
               <a:rPr lang="de-DE" smtClean="0"/>
-              <a:t>17.01.25</a:t>
+              <a:t>27.01.25</a:t>
             </a:fld>
             <a:endParaRPr lang="de-DE"/>
           </a:p>
@@ -1957,7 +1963,7 @@
           <a:p>
             <a:fld id="{BA6DBFC3-540E-6444-9571-9AC72F552CFB}" type="datetimeFigureOut">
               <a:rPr lang="de-DE" smtClean="0"/>
-              <a:t>17.01.25</a:t>
+              <a:t>27.01.25</a:t>
             </a:fld>
             <a:endParaRPr lang="de-DE"/>
           </a:p>
@@ -2070,7 +2076,7 @@
           <a:p>
             <a:fld id="{BA6DBFC3-540E-6444-9571-9AC72F552CFB}" type="datetimeFigureOut">
               <a:rPr lang="de-DE" smtClean="0"/>
-              <a:t>17.01.25</a:t>
+              <a:t>27.01.25</a:t>
             </a:fld>
             <a:endParaRPr lang="de-DE"/>
           </a:p>
@@ -2381,7 +2387,7 @@
           <a:p>
             <a:fld id="{BA6DBFC3-540E-6444-9571-9AC72F552CFB}" type="datetimeFigureOut">
               <a:rPr lang="de-DE" smtClean="0"/>
-              <a:t>17.01.25</a:t>
+              <a:t>27.01.25</a:t>
             </a:fld>
             <a:endParaRPr lang="de-DE"/>
           </a:p>
@@ -2669,7 +2675,7 @@
           <a:p>
             <a:fld id="{BA6DBFC3-540E-6444-9571-9AC72F552CFB}" type="datetimeFigureOut">
               <a:rPr lang="de-DE" smtClean="0"/>
-              <a:t>17.01.25</a:t>
+              <a:t>27.01.25</a:t>
             </a:fld>
             <a:endParaRPr lang="de-DE"/>
           </a:p>
@@ -2910,7 +2916,7 @@
           <a:p>
             <a:fld id="{BA6DBFC3-540E-6444-9571-9AC72F552CFB}" type="datetimeFigureOut">
               <a:rPr lang="de-DE" smtClean="0"/>
-              <a:t>17.01.25</a:t>
+              <a:t>27.01.25</a:t>
             </a:fld>
             <a:endParaRPr lang="de-DE"/>
           </a:p>
@@ -6187,6 +6193,1696 @@
 </p:sld>
 </file>
 
+<file path=ppt/slides/slide8.xml><?xml version="1.0" encoding="utf-8"?>
+<p:sld xmlns:a="http://schemas.openxmlformats.org/drawingml/2006/main" xmlns:r="http://schemas.openxmlformats.org/officeDocument/2006/relationships" xmlns:p="http://schemas.openxmlformats.org/presentationml/2006/main">
+  <p:cSld>
+    <p:spTree>
+      <p:nvGrpSpPr>
+        <p:cNvPr id="1" name="">
+          <a:extLst>
+            <a:ext uri="{FF2B5EF4-FFF2-40B4-BE49-F238E27FC236}">
+              <a16:creationId xmlns:a16="http://schemas.microsoft.com/office/drawing/2014/main" id="{C5AA740A-B22E-267E-685E-57A569EAA693}"/>
+            </a:ext>
+          </a:extLst>
+        </p:cNvPr>
+        <p:cNvGrpSpPr/>
+        <p:nvPr/>
+      </p:nvGrpSpPr>
+      <p:grpSpPr>
+        <a:xfrm>
+          <a:off x="0" y="0"/>
+          <a:ext cx="0" cy="0"/>
+          <a:chOff x="0" y="0"/>
+          <a:chExt cx="0" cy="0"/>
+        </a:xfrm>
+      </p:grpSpPr>
+      <p:sp>
+        <p:nvSpPr>
+          <p:cNvPr id="2" name="Textfeld 1">
+            <a:extLst>
+              <a:ext uri="{FF2B5EF4-FFF2-40B4-BE49-F238E27FC236}">
+                <a16:creationId xmlns:a16="http://schemas.microsoft.com/office/drawing/2014/main" id="{781058E1-FA51-37E4-BA72-F075BC78C6C8}"/>
+              </a:ext>
+            </a:extLst>
+          </p:cNvPr>
+          <p:cNvSpPr txBox="1"/>
+          <p:nvPr/>
+        </p:nvSpPr>
+        <p:spPr>
+          <a:xfrm>
+            <a:off x="10434468" y="6127161"/>
+            <a:ext cx="1550746" cy="369332"/>
+          </a:xfrm>
+          <a:prstGeom prst="rect">
+            <a:avLst/>
+          </a:prstGeom>
+          <a:noFill/>
+        </p:spPr>
+        <p:txBody>
+          <a:bodyPr wrap="none" rtlCol="0">
+            <a:spAutoFit/>
+          </a:bodyPr>
+          <a:lstStyle/>
+          <a:p>
+            <a:r>
+              <a:rPr lang="de-DE" dirty="0"/>
+              <a:t>LLM-Gateway</a:t>
+            </a:r>
+          </a:p>
+        </p:txBody>
+      </p:sp>
+      <p:sp>
+        <p:nvSpPr>
+          <p:cNvPr id="3" name="Rechteck 2">
+            <a:extLst>
+              <a:ext uri="{FF2B5EF4-FFF2-40B4-BE49-F238E27FC236}">
+                <a16:creationId xmlns:a16="http://schemas.microsoft.com/office/drawing/2014/main" id="{742DE95F-898E-479C-DD7F-F06CE137193C}"/>
+              </a:ext>
+            </a:extLst>
+          </p:cNvPr>
+          <p:cNvSpPr/>
+          <p:nvPr/>
+        </p:nvSpPr>
+        <p:spPr>
+          <a:xfrm>
+            <a:off x="3664835" y="1790885"/>
+            <a:ext cx="1534632" cy="2298026"/>
+          </a:xfrm>
+          <a:prstGeom prst="rect">
+            <a:avLst/>
+          </a:prstGeom>
+        </p:spPr>
+        <p:style>
+          <a:lnRef idx="2">
+            <a:schemeClr val="accent1">
+              <a:shade val="15000"/>
+            </a:schemeClr>
+          </a:lnRef>
+          <a:fillRef idx="1">
+            <a:schemeClr val="accent1"/>
+          </a:fillRef>
+          <a:effectRef idx="0">
+            <a:schemeClr val="accent1"/>
+          </a:effectRef>
+          <a:fontRef idx="minor">
+            <a:schemeClr val="lt1"/>
+          </a:fontRef>
+        </p:style>
+        <p:txBody>
+          <a:bodyPr rtlCol="0" anchor="ctr"/>
+          <a:lstStyle/>
+          <a:p>
+            <a:pPr algn="ctr"/>
+            <a:r>
+              <a:rPr lang="de-DE" dirty="0"/>
+              <a:t>HTTP-Server</a:t>
+            </a:r>
+          </a:p>
+        </p:txBody>
+      </p:sp>
+      <p:sp>
+        <p:nvSpPr>
+          <p:cNvPr id="4" name="Rechteck 3">
+            <a:extLst>
+              <a:ext uri="{FF2B5EF4-FFF2-40B4-BE49-F238E27FC236}">
+                <a16:creationId xmlns:a16="http://schemas.microsoft.com/office/drawing/2014/main" id="{340E1F97-72BA-6A7B-4055-920779A88029}"/>
+              </a:ext>
+            </a:extLst>
+          </p:cNvPr>
+          <p:cNvSpPr/>
+          <p:nvPr/>
+        </p:nvSpPr>
+        <p:spPr>
+          <a:xfrm>
+            <a:off x="9454929" y="1771920"/>
+            <a:ext cx="1534632" cy="619703"/>
+          </a:xfrm>
+          <a:prstGeom prst="rect">
+            <a:avLst/>
+          </a:prstGeom>
+        </p:spPr>
+        <p:style>
+          <a:lnRef idx="2">
+            <a:schemeClr val="accent1">
+              <a:shade val="15000"/>
+            </a:schemeClr>
+          </a:lnRef>
+          <a:fillRef idx="1">
+            <a:schemeClr val="accent1"/>
+          </a:fillRef>
+          <a:effectRef idx="0">
+            <a:schemeClr val="accent1"/>
+          </a:effectRef>
+          <a:fontRef idx="minor">
+            <a:schemeClr val="lt1"/>
+          </a:fontRef>
+        </p:style>
+        <p:txBody>
+          <a:bodyPr rtlCol="0" anchor="ctr"/>
+          <a:lstStyle/>
+          <a:p>
+            <a:pPr algn="ctr"/>
+            <a:r>
+              <a:rPr lang="de-DE" dirty="0" err="1"/>
+              <a:t>vLLM</a:t>
+            </a:r>
+            <a:endParaRPr lang="de-DE" dirty="0"/>
+          </a:p>
+        </p:txBody>
+      </p:sp>
+      <p:cxnSp>
+        <p:nvCxnSpPr>
+          <p:cNvPr id="7" name="Gerade Verbindung 6">
+            <a:extLst>
+              <a:ext uri="{FF2B5EF4-FFF2-40B4-BE49-F238E27FC236}">
+                <a16:creationId xmlns:a16="http://schemas.microsoft.com/office/drawing/2014/main" id="{7DDAF222-B80D-77CE-A6D4-C71FDD41CC53}"/>
+              </a:ext>
+            </a:extLst>
+          </p:cNvPr>
+          <p:cNvCxnSpPr>
+            <a:stCxn id="3" idx="1"/>
+            <a:endCxn id="5" idx="3"/>
+          </p:cNvCxnSpPr>
+          <p:nvPr/>
+        </p:nvCxnSpPr>
+        <p:spPr>
+          <a:xfrm flipH="1">
+            <a:off x="3459271" y="2939898"/>
+            <a:ext cx="205564" cy="0"/>
+          </a:xfrm>
+          <a:prstGeom prst="line">
+            <a:avLst/>
+          </a:prstGeom>
+        </p:spPr>
+        <p:style>
+          <a:lnRef idx="2">
+            <a:schemeClr val="accent1"/>
+          </a:lnRef>
+          <a:fillRef idx="0">
+            <a:schemeClr val="accent1"/>
+          </a:fillRef>
+          <a:effectRef idx="1">
+            <a:schemeClr val="accent1"/>
+          </a:effectRef>
+          <a:fontRef idx="minor">
+            <a:schemeClr val="tx1"/>
+          </a:fontRef>
+        </p:style>
+      </p:cxnSp>
+      <p:sp>
+        <p:nvSpPr>
+          <p:cNvPr id="8" name="Zylinder 7">
+            <a:extLst>
+              <a:ext uri="{FF2B5EF4-FFF2-40B4-BE49-F238E27FC236}">
+                <a16:creationId xmlns:a16="http://schemas.microsoft.com/office/drawing/2014/main" id="{CD9ED640-8222-22D6-84A9-473C540F8BB3}"/>
+              </a:ext>
+            </a:extLst>
+          </p:cNvPr>
+          <p:cNvSpPr/>
+          <p:nvPr/>
+        </p:nvSpPr>
+        <p:spPr>
+          <a:xfrm>
+            <a:off x="3664835" y="4378507"/>
+            <a:ext cx="1534631" cy="1216152"/>
+          </a:xfrm>
+          <a:prstGeom prst="can">
+            <a:avLst/>
+          </a:prstGeom>
+        </p:spPr>
+        <p:style>
+          <a:lnRef idx="2">
+            <a:schemeClr val="accent1">
+              <a:shade val="15000"/>
+            </a:schemeClr>
+          </a:lnRef>
+          <a:fillRef idx="1">
+            <a:schemeClr val="accent1"/>
+          </a:fillRef>
+          <a:effectRef idx="0">
+            <a:schemeClr val="accent1"/>
+          </a:effectRef>
+          <a:fontRef idx="minor">
+            <a:schemeClr val="lt1"/>
+          </a:fontRef>
+        </p:style>
+        <p:txBody>
+          <a:bodyPr rtlCol="0" anchor="ctr"/>
+          <a:lstStyle/>
+          <a:p>
+            <a:pPr algn="ctr"/>
+            <a:r>
+              <a:rPr lang="de-DE" dirty="0"/>
+              <a:t>User &amp; </a:t>
+            </a:r>
+            <a:r>
+              <a:rPr lang="de-DE" dirty="0" err="1"/>
+              <a:t>Usage</a:t>
+            </a:r>
+            <a:endParaRPr lang="de-DE" dirty="0"/>
+          </a:p>
+        </p:txBody>
+      </p:sp>
+      <p:cxnSp>
+        <p:nvCxnSpPr>
+          <p:cNvPr id="12" name="Gerade Verbindung 11">
+            <a:extLst>
+              <a:ext uri="{FF2B5EF4-FFF2-40B4-BE49-F238E27FC236}">
+                <a16:creationId xmlns:a16="http://schemas.microsoft.com/office/drawing/2014/main" id="{4341B0A5-5214-A54C-8FEF-5FF6020A83A5}"/>
+              </a:ext>
+            </a:extLst>
+          </p:cNvPr>
+          <p:cNvCxnSpPr>
+            <a:stCxn id="3" idx="2"/>
+            <a:endCxn id="8" idx="1"/>
+          </p:cNvCxnSpPr>
+          <p:nvPr/>
+        </p:nvCxnSpPr>
+        <p:spPr>
+          <a:xfrm>
+            <a:off x="4432151" y="4088911"/>
+            <a:ext cx="0" cy="289596"/>
+          </a:xfrm>
+          <a:prstGeom prst="line">
+            <a:avLst/>
+          </a:prstGeom>
+        </p:spPr>
+        <p:style>
+          <a:lnRef idx="2">
+            <a:schemeClr val="accent1"/>
+          </a:lnRef>
+          <a:fillRef idx="0">
+            <a:schemeClr val="accent1"/>
+          </a:fillRef>
+          <a:effectRef idx="1">
+            <a:schemeClr val="accent1"/>
+          </a:effectRef>
+          <a:fontRef idx="minor">
+            <a:schemeClr val="tx1"/>
+          </a:fontRef>
+        </p:style>
+      </p:cxnSp>
+      <p:sp>
+        <p:nvSpPr>
+          <p:cNvPr id="13" name="Textfeld 12">
+            <a:extLst>
+              <a:ext uri="{FF2B5EF4-FFF2-40B4-BE49-F238E27FC236}">
+                <a16:creationId xmlns:a16="http://schemas.microsoft.com/office/drawing/2014/main" id="{8CEC852B-1F79-39A9-7229-1D5C50625BFF}"/>
+              </a:ext>
+            </a:extLst>
+          </p:cNvPr>
+          <p:cNvSpPr txBox="1"/>
+          <p:nvPr/>
+        </p:nvSpPr>
+        <p:spPr>
+          <a:xfrm>
+            <a:off x="2910806" y="1316623"/>
+            <a:ext cx="2650021" cy="369332"/>
+          </a:xfrm>
+          <a:prstGeom prst="rect">
+            <a:avLst/>
+          </a:prstGeom>
+          <a:noFill/>
+        </p:spPr>
+        <p:txBody>
+          <a:bodyPr wrap="none" rtlCol="0">
+            <a:spAutoFit/>
+          </a:bodyPr>
+          <a:lstStyle/>
+          <a:p>
+            <a:r>
+              <a:rPr lang="de-DE" dirty="0"/>
+              <a:t>Unified interface </a:t>
+            </a:r>
+            <a:r>
+              <a:rPr lang="de-DE" dirty="0" err="1"/>
+              <a:t>to</a:t>
+            </a:r>
+            <a:r>
+              <a:rPr lang="de-DE" dirty="0"/>
+              <a:t> LLMs</a:t>
+            </a:r>
+          </a:p>
+        </p:txBody>
+      </p:sp>
+      <p:sp>
+        <p:nvSpPr>
+          <p:cNvPr id="14" name="Textfeld 13">
+            <a:extLst>
+              <a:ext uri="{FF2B5EF4-FFF2-40B4-BE49-F238E27FC236}">
+                <a16:creationId xmlns:a16="http://schemas.microsoft.com/office/drawing/2014/main" id="{C3804BB0-4F63-EE22-4647-1D3B47DB111A}"/>
+              </a:ext>
+            </a:extLst>
+          </p:cNvPr>
+          <p:cNvSpPr txBox="1"/>
+          <p:nvPr/>
+        </p:nvSpPr>
+        <p:spPr>
+          <a:xfrm>
+            <a:off x="1381487" y="4428120"/>
+            <a:ext cx="2357184" cy="2031325"/>
+          </a:xfrm>
+          <a:prstGeom prst="rect">
+            <a:avLst/>
+          </a:prstGeom>
+          <a:noFill/>
+        </p:spPr>
+        <p:txBody>
+          <a:bodyPr wrap="none" rtlCol="0">
+            <a:spAutoFit/>
+          </a:bodyPr>
+          <a:lstStyle/>
+          <a:p>
+            <a:pPr marL="285750" indent="-285750">
+              <a:buFont typeface="Arial" panose="020B0604020202020204" pitchFamily="34" charset="0"/>
+              <a:buChar char="•"/>
+            </a:pPr>
+            <a:r>
+              <a:rPr lang="de-DE" dirty="0"/>
+              <a:t>virtual </a:t>
+            </a:r>
+            <a:r>
+              <a:rPr lang="de-DE" dirty="0" err="1"/>
+              <a:t>keys</a:t>
+            </a:r>
+            <a:endParaRPr lang="de-DE" dirty="0"/>
+          </a:p>
+          <a:p>
+            <a:pPr marL="285750" indent="-285750">
+              <a:buFont typeface="Arial" panose="020B0604020202020204" pitchFamily="34" charset="0"/>
+              <a:buChar char="•"/>
+            </a:pPr>
+            <a:r>
+              <a:rPr lang="de-DE" dirty="0"/>
+              <a:t>rate </a:t>
+            </a:r>
+            <a:r>
+              <a:rPr lang="de-DE" dirty="0" err="1"/>
+              <a:t>limit</a:t>
+            </a:r>
+            <a:endParaRPr lang="de-DE" dirty="0"/>
+          </a:p>
+          <a:p>
+            <a:pPr marL="285750" indent="-285750">
+              <a:buFont typeface="Arial" panose="020B0604020202020204" pitchFamily="34" charset="0"/>
+              <a:buChar char="•"/>
+            </a:pPr>
+            <a:r>
+              <a:rPr lang="de-DE" dirty="0"/>
+              <a:t>track </a:t>
+            </a:r>
+            <a:r>
+              <a:rPr lang="de-DE" dirty="0" err="1"/>
+              <a:t>spend</a:t>
+            </a:r>
+            <a:endParaRPr lang="de-DE" dirty="0"/>
+          </a:p>
+          <a:p>
+            <a:pPr marL="285750" indent="-285750">
+              <a:buFont typeface="Arial" panose="020B0604020202020204" pitchFamily="34" charset="0"/>
+              <a:buChar char="•"/>
+            </a:pPr>
+            <a:r>
+              <a:rPr lang="de-DE" dirty="0" err="1"/>
+              <a:t>set</a:t>
+            </a:r>
+            <a:r>
+              <a:rPr lang="de-DE" dirty="0"/>
+              <a:t> </a:t>
+            </a:r>
+            <a:r>
+              <a:rPr lang="de-DE" dirty="0" err="1"/>
+              <a:t>budgets</a:t>
+            </a:r>
+            <a:r>
+              <a:rPr lang="de-DE" dirty="0"/>
+              <a:t> </a:t>
+            </a:r>
+            <a:br>
+              <a:rPr lang="de-DE" dirty="0"/>
+            </a:br>
+            <a:r>
+              <a:rPr lang="de-DE" dirty="0"/>
+              <a:t>per virtual </a:t>
+            </a:r>
+            <a:r>
+              <a:rPr lang="de-DE" dirty="0" err="1"/>
+              <a:t>key</a:t>
+            </a:r>
+            <a:r>
+              <a:rPr lang="de-DE" dirty="0"/>
+              <a:t>/</a:t>
+            </a:r>
+            <a:r>
+              <a:rPr lang="de-DE" dirty="0" err="1"/>
+              <a:t>user</a:t>
+            </a:r>
+            <a:endParaRPr lang="de-DE" dirty="0"/>
+          </a:p>
+          <a:p>
+            <a:pPr marL="285750" indent="-285750">
+              <a:buFont typeface="Arial" panose="020B0604020202020204" pitchFamily="34" charset="0"/>
+              <a:buChar char="•"/>
+            </a:pPr>
+            <a:endParaRPr lang="de-DE" dirty="0"/>
+          </a:p>
+          <a:p>
+            <a:endParaRPr lang="de-DE" dirty="0"/>
+          </a:p>
+        </p:txBody>
+      </p:sp>
+      <p:sp>
+        <p:nvSpPr>
+          <p:cNvPr id="15" name="Rechteck 14">
+            <a:extLst>
+              <a:ext uri="{FF2B5EF4-FFF2-40B4-BE49-F238E27FC236}">
+                <a16:creationId xmlns:a16="http://schemas.microsoft.com/office/drawing/2014/main" id="{066B5977-9CDF-EBB1-F1BD-5AD9A5C8B851}"/>
+              </a:ext>
+            </a:extLst>
+          </p:cNvPr>
+          <p:cNvSpPr/>
+          <p:nvPr/>
+        </p:nvSpPr>
+        <p:spPr>
+          <a:xfrm>
+            <a:off x="9454929" y="2549804"/>
+            <a:ext cx="1534632" cy="580889"/>
+          </a:xfrm>
+          <a:prstGeom prst="rect">
+            <a:avLst/>
+          </a:prstGeom>
+        </p:spPr>
+        <p:style>
+          <a:lnRef idx="2">
+            <a:schemeClr val="accent1">
+              <a:shade val="15000"/>
+            </a:schemeClr>
+          </a:lnRef>
+          <a:fillRef idx="1">
+            <a:schemeClr val="accent1"/>
+          </a:fillRef>
+          <a:effectRef idx="0">
+            <a:schemeClr val="accent1"/>
+          </a:effectRef>
+          <a:fontRef idx="minor">
+            <a:schemeClr val="lt1"/>
+          </a:fontRef>
+        </p:style>
+        <p:txBody>
+          <a:bodyPr rtlCol="0" anchor="ctr"/>
+          <a:lstStyle/>
+          <a:p>
+            <a:pPr algn="ctr"/>
+            <a:r>
+              <a:rPr lang="de-DE" dirty="0" err="1"/>
+              <a:t>Ollama</a:t>
+            </a:r>
+            <a:endParaRPr lang="de-DE" dirty="0"/>
+          </a:p>
+        </p:txBody>
+      </p:sp>
+      <p:sp>
+        <p:nvSpPr>
+          <p:cNvPr id="17" name="Textfeld 16">
+            <a:extLst>
+              <a:ext uri="{FF2B5EF4-FFF2-40B4-BE49-F238E27FC236}">
+                <a16:creationId xmlns:a16="http://schemas.microsoft.com/office/drawing/2014/main" id="{3F1F151F-3495-B957-14EA-20AFE979657E}"/>
+              </a:ext>
+            </a:extLst>
+          </p:cNvPr>
+          <p:cNvSpPr txBox="1"/>
+          <p:nvPr/>
+        </p:nvSpPr>
+        <p:spPr>
+          <a:xfrm>
+            <a:off x="7224869" y="4441202"/>
+            <a:ext cx="1911614" cy="923330"/>
+          </a:xfrm>
+          <a:prstGeom prst="rect">
+            <a:avLst/>
+          </a:prstGeom>
+          <a:noFill/>
+        </p:spPr>
+        <p:txBody>
+          <a:bodyPr wrap="none" rtlCol="0">
+            <a:spAutoFit/>
+          </a:bodyPr>
+          <a:lstStyle/>
+          <a:p>
+            <a:pPr marL="285750" indent="-285750">
+              <a:buFont typeface="Arial" panose="020B0604020202020204" pitchFamily="34" charset="0"/>
+              <a:buChar char="•"/>
+            </a:pPr>
+            <a:r>
+              <a:rPr lang="de-DE" dirty="0" err="1"/>
+              <a:t>model</a:t>
+            </a:r>
+            <a:r>
+              <a:rPr lang="de-DE" dirty="0"/>
+              <a:t> </a:t>
+            </a:r>
+            <a:r>
+              <a:rPr lang="de-DE" dirty="0" err="1"/>
+              <a:t>list</a:t>
+            </a:r>
+            <a:endParaRPr lang="de-DE" dirty="0"/>
+          </a:p>
+          <a:p>
+            <a:pPr marL="285750" indent="-285750">
+              <a:buFont typeface="Arial" panose="020B0604020202020204" pitchFamily="34" charset="0"/>
+              <a:buChar char="•"/>
+            </a:pPr>
+            <a:r>
+              <a:rPr lang="de-DE" dirty="0" err="1"/>
+              <a:t>router</a:t>
+            </a:r>
+            <a:r>
+              <a:rPr lang="de-DE" dirty="0"/>
+              <a:t> </a:t>
+            </a:r>
+            <a:r>
+              <a:rPr lang="de-DE" dirty="0" err="1"/>
+              <a:t>settings</a:t>
+            </a:r>
+            <a:endParaRPr lang="de-DE" dirty="0"/>
+          </a:p>
+          <a:p>
+            <a:endParaRPr lang="de-DE" dirty="0"/>
+          </a:p>
+        </p:txBody>
+      </p:sp>
+      <p:sp>
+        <p:nvSpPr>
+          <p:cNvPr id="19" name="Rechteck 18">
+            <a:extLst>
+              <a:ext uri="{FF2B5EF4-FFF2-40B4-BE49-F238E27FC236}">
+                <a16:creationId xmlns:a16="http://schemas.microsoft.com/office/drawing/2014/main" id="{8A318063-7FF2-BCDB-6E35-CA627FE66DE9}"/>
+              </a:ext>
+            </a:extLst>
+          </p:cNvPr>
+          <p:cNvSpPr/>
+          <p:nvPr/>
+        </p:nvSpPr>
+        <p:spPr>
+          <a:xfrm>
+            <a:off x="5631711" y="1790885"/>
+            <a:ext cx="1534632" cy="2298026"/>
+          </a:xfrm>
+          <a:prstGeom prst="rect">
+            <a:avLst/>
+          </a:prstGeom>
+        </p:spPr>
+        <p:style>
+          <a:lnRef idx="2">
+            <a:schemeClr val="accent1">
+              <a:shade val="15000"/>
+            </a:schemeClr>
+          </a:lnRef>
+          <a:fillRef idx="1">
+            <a:schemeClr val="accent1"/>
+          </a:fillRef>
+          <a:effectRef idx="0">
+            <a:schemeClr val="accent1"/>
+          </a:effectRef>
+          <a:fontRef idx="minor">
+            <a:schemeClr val="lt1"/>
+          </a:fontRef>
+        </p:style>
+        <p:txBody>
+          <a:bodyPr rtlCol="0" anchor="ctr"/>
+          <a:lstStyle/>
+          <a:p>
+            <a:pPr algn="ctr"/>
+            <a:r>
+              <a:rPr lang="de-DE" dirty="0"/>
+              <a:t>HTTP-Server</a:t>
+            </a:r>
+          </a:p>
+        </p:txBody>
+      </p:sp>
+      <p:cxnSp>
+        <p:nvCxnSpPr>
+          <p:cNvPr id="21" name="Gerade Verbindung 20">
+            <a:extLst>
+              <a:ext uri="{FF2B5EF4-FFF2-40B4-BE49-F238E27FC236}">
+                <a16:creationId xmlns:a16="http://schemas.microsoft.com/office/drawing/2014/main" id="{B04B6D5D-2580-9652-B61C-77BB410070A0}"/>
+              </a:ext>
+            </a:extLst>
+          </p:cNvPr>
+          <p:cNvCxnSpPr>
+            <a:cxnSpLocks/>
+            <a:stCxn id="19" idx="2"/>
+          </p:cNvCxnSpPr>
+          <p:nvPr/>
+        </p:nvCxnSpPr>
+        <p:spPr>
+          <a:xfrm flipH="1">
+            <a:off x="6395483" y="4088911"/>
+            <a:ext cx="3544" cy="440472"/>
+          </a:xfrm>
+          <a:prstGeom prst="line">
+            <a:avLst/>
+          </a:prstGeom>
+        </p:spPr>
+        <p:style>
+          <a:lnRef idx="2">
+            <a:schemeClr val="accent1"/>
+          </a:lnRef>
+          <a:fillRef idx="0">
+            <a:schemeClr val="accent1"/>
+          </a:fillRef>
+          <a:effectRef idx="1">
+            <a:schemeClr val="accent1"/>
+          </a:effectRef>
+          <a:fontRef idx="minor">
+            <a:schemeClr val="tx1"/>
+          </a:fontRef>
+        </p:style>
+      </p:cxnSp>
+      <p:sp>
+        <p:nvSpPr>
+          <p:cNvPr id="18" name="Rechteck 17">
+            <a:extLst>
+              <a:ext uri="{FF2B5EF4-FFF2-40B4-BE49-F238E27FC236}">
+                <a16:creationId xmlns:a16="http://schemas.microsoft.com/office/drawing/2014/main" id="{9A16E477-26D3-9664-A5AB-DD4B7C5ECFCF}"/>
+              </a:ext>
+            </a:extLst>
+          </p:cNvPr>
+          <p:cNvSpPr/>
+          <p:nvPr/>
+        </p:nvSpPr>
+        <p:spPr>
+          <a:xfrm>
+            <a:off x="3664835" y="1790885"/>
+            <a:ext cx="5309044" cy="2298023"/>
+          </a:xfrm>
+          <a:prstGeom prst="rect">
+            <a:avLst/>
+          </a:prstGeom>
+        </p:spPr>
+        <p:style>
+          <a:lnRef idx="2">
+            <a:schemeClr val="accent1">
+              <a:shade val="15000"/>
+            </a:schemeClr>
+          </a:lnRef>
+          <a:fillRef idx="1">
+            <a:schemeClr val="accent1"/>
+          </a:fillRef>
+          <a:effectRef idx="0">
+            <a:schemeClr val="accent1"/>
+          </a:effectRef>
+          <a:fontRef idx="minor">
+            <a:schemeClr val="lt1"/>
+          </a:fontRef>
+        </p:style>
+        <p:txBody>
+          <a:bodyPr rtlCol="0" anchor="ctr"/>
+          <a:lstStyle/>
+          <a:p>
+            <a:pPr algn="ctr"/>
+            <a:endParaRPr lang="de-DE"/>
+          </a:p>
+        </p:txBody>
+      </p:sp>
+      <p:sp>
+        <p:nvSpPr>
+          <p:cNvPr id="22" name="Abgerundetes Rechteck 21">
+            <a:extLst>
+              <a:ext uri="{FF2B5EF4-FFF2-40B4-BE49-F238E27FC236}">
+                <a16:creationId xmlns:a16="http://schemas.microsoft.com/office/drawing/2014/main" id="{BE915409-C71A-A46D-F6A6-453BBE64AC00}"/>
+              </a:ext>
+            </a:extLst>
+          </p:cNvPr>
+          <p:cNvSpPr/>
+          <p:nvPr/>
+        </p:nvSpPr>
+        <p:spPr>
+          <a:xfrm>
+            <a:off x="3813985" y="2171341"/>
+            <a:ext cx="983660" cy="580171"/>
+          </a:xfrm>
+          <a:prstGeom prst="roundRect">
+            <a:avLst/>
+          </a:prstGeom>
+        </p:spPr>
+        <p:style>
+          <a:lnRef idx="2">
+            <a:schemeClr val="accent6"/>
+          </a:lnRef>
+          <a:fillRef idx="1">
+            <a:schemeClr val="lt1"/>
+          </a:fillRef>
+          <a:effectRef idx="0">
+            <a:schemeClr val="accent6"/>
+          </a:effectRef>
+          <a:fontRef idx="minor">
+            <a:schemeClr val="dk1"/>
+          </a:fontRef>
+        </p:style>
+        <p:txBody>
+          <a:bodyPr rtlCol="0" anchor="ctr"/>
+          <a:lstStyle/>
+          <a:p>
+            <a:pPr algn="ctr"/>
+            <a:r>
+              <a:rPr lang="de-DE" sz="1200" dirty="0"/>
+              <a:t>check virtual </a:t>
+            </a:r>
+            <a:r>
+              <a:rPr lang="de-DE" sz="1200" dirty="0" err="1"/>
+              <a:t>key</a:t>
+            </a:r>
+            <a:r>
+              <a:rPr lang="de-DE" sz="1200" dirty="0"/>
+              <a:t> (</a:t>
+            </a:r>
+            <a:r>
+              <a:rPr lang="de-DE" sz="1200" dirty="0" err="1"/>
+              <a:t>Bearer</a:t>
+            </a:r>
+            <a:r>
+              <a:rPr lang="de-DE" sz="1200" dirty="0"/>
+              <a:t>)</a:t>
+            </a:r>
+          </a:p>
+        </p:txBody>
+      </p:sp>
+      <p:sp>
+        <p:nvSpPr>
+          <p:cNvPr id="25" name="Abgerundetes Rechteck 24">
+            <a:extLst>
+              <a:ext uri="{FF2B5EF4-FFF2-40B4-BE49-F238E27FC236}">
+                <a16:creationId xmlns:a16="http://schemas.microsoft.com/office/drawing/2014/main" id="{B699EE7E-038E-A894-569E-C5A04C87CC3A}"/>
+              </a:ext>
+            </a:extLst>
+          </p:cNvPr>
+          <p:cNvSpPr/>
+          <p:nvPr/>
+        </p:nvSpPr>
+        <p:spPr>
+          <a:xfrm>
+            <a:off x="7473004" y="2171338"/>
+            <a:ext cx="1345033" cy="580171"/>
+          </a:xfrm>
+          <a:prstGeom prst="roundRect">
+            <a:avLst/>
+          </a:prstGeom>
+        </p:spPr>
+        <p:style>
+          <a:lnRef idx="2">
+            <a:schemeClr val="accent6"/>
+          </a:lnRef>
+          <a:fillRef idx="1">
+            <a:schemeClr val="lt1"/>
+          </a:fillRef>
+          <a:effectRef idx="0">
+            <a:schemeClr val="accent6"/>
+          </a:effectRef>
+          <a:fontRef idx="minor">
+            <a:schemeClr val="dk1"/>
+          </a:fontRef>
+        </p:style>
+        <p:txBody>
+          <a:bodyPr rtlCol="0" anchor="ctr"/>
+          <a:lstStyle/>
+          <a:p>
+            <a:r>
+              <a:rPr lang="de-DE" sz="1200" dirty="0"/>
+              <a:t>Routing</a:t>
+            </a:r>
+          </a:p>
+          <a:p>
+            <a:r>
+              <a:rPr lang="de-DE" sz="800" dirty="0" err="1"/>
+              <a:t>with</a:t>
+            </a:r>
+            <a:r>
+              <a:rPr lang="de-DE" sz="800" dirty="0"/>
+              <a:t> Load </a:t>
+            </a:r>
+            <a:r>
+              <a:rPr lang="de-DE" sz="800" dirty="0" err="1"/>
+              <a:t>Balancing</a:t>
+            </a:r>
+            <a:r>
+              <a:rPr lang="de-DE" sz="800" dirty="0"/>
+              <a:t>, </a:t>
+            </a:r>
+            <a:r>
+              <a:rPr lang="de-DE" sz="800" dirty="0" err="1"/>
+              <a:t>Fallback</a:t>
+            </a:r>
+            <a:r>
+              <a:rPr lang="de-DE" sz="800" dirty="0"/>
+              <a:t> &amp; </a:t>
+            </a:r>
+            <a:r>
+              <a:rPr lang="de-DE" sz="800" dirty="0" err="1"/>
+              <a:t>Retry</a:t>
+            </a:r>
+            <a:endParaRPr lang="de-DE" sz="800" dirty="0"/>
+          </a:p>
+        </p:txBody>
+      </p:sp>
+      <p:cxnSp>
+        <p:nvCxnSpPr>
+          <p:cNvPr id="27" name="Gewinkelte Verbindung 26">
+            <a:extLst>
+              <a:ext uri="{FF2B5EF4-FFF2-40B4-BE49-F238E27FC236}">
+                <a16:creationId xmlns:a16="http://schemas.microsoft.com/office/drawing/2014/main" id="{75AD632E-92AB-7C7A-5591-1155BF7134AF}"/>
+              </a:ext>
+            </a:extLst>
+          </p:cNvPr>
+          <p:cNvCxnSpPr>
+            <a:cxnSpLocks/>
+            <a:stCxn id="25" idx="3"/>
+            <a:endCxn id="4" idx="1"/>
+          </p:cNvCxnSpPr>
+          <p:nvPr/>
+        </p:nvCxnSpPr>
+        <p:spPr>
+          <a:xfrm flipV="1">
+            <a:off x="8818037" y="2081772"/>
+            <a:ext cx="636892" cy="379652"/>
+          </a:xfrm>
+          <a:prstGeom prst="bentConnector3">
+            <a:avLst/>
+          </a:prstGeom>
+          <a:ln>
+            <a:headEnd type="triangle"/>
+            <a:tailEnd type="triangle"/>
+          </a:ln>
+        </p:spPr>
+        <p:style>
+          <a:lnRef idx="1">
+            <a:schemeClr val="accent6"/>
+          </a:lnRef>
+          <a:fillRef idx="0">
+            <a:schemeClr val="accent6"/>
+          </a:fillRef>
+          <a:effectRef idx="0">
+            <a:schemeClr val="accent6"/>
+          </a:effectRef>
+          <a:fontRef idx="minor">
+            <a:schemeClr val="tx1"/>
+          </a:fontRef>
+        </p:style>
+      </p:cxnSp>
+      <p:cxnSp>
+        <p:nvCxnSpPr>
+          <p:cNvPr id="29" name="Gewinkelte Verbindung 28">
+            <a:extLst>
+              <a:ext uri="{FF2B5EF4-FFF2-40B4-BE49-F238E27FC236}">
+                <a16:creationId xmlns:a16="http://schemas.microsoft.com/office/drawing/2014/main" id="{EC778835-7BF7-CBC2-BF75-489A7D9683D0}"/>
+              </a:ext>
+            </a:extLst>
+          </p:cNvPr>
+          <p:cNvCxnSpPr>
+            <a:cxnSpLocks/>
+            <a:stCxn id="25" idx="3"/>
+            <a:endCxn id="15" idx="1"/>
+          </p:cNvCxnSpPr>
+          <p:nvPr/>
+        </p:nvCxnSpPr>
+        <p:spPr>
+          <a:xfrm>
+            <a:off x="8818037" y="2461424"/>
+            <a:ext cx="636892" cy="378825"/>
+          </a:xfrm>
+          <a:prstGeom prst="bentConnector3">
+            <a:avLst/>
+          </a:prstGeom>
+          <a:ln>
+            <a:headEnd type="triangle"/>
+            <a:tailEnd type="triangle"/>
+          </a:ln>
+        </p:spPr>
+        <p:style>
+          <a:lnRef idx="1">
+            <a:schemeClr val="accent6"/>
+          </a:lnRef>
+          <a:fillRef idx="0">
+            <a:schemeClr val="accent6"/>
+          </a:fillRef>
+          <a:effectRef idx="0">
+            <a:schemeClr val="accent6"/>
+          </a:effectRef>
+          <a:fontRef idx="minor">
+            <a:schemeClr val="tx1"/>
+          </a:fontRef>
+        </p:style>
+      </p:cxnSp>
+      <p:sp>
+        <p:nvSpPr>
+          <p:cNvPr id="35" name="Zylinder 34">
+            <a:extLst>
+              <a:ext uri="{FF2B5EF4-FFF2-40B4-BE49-F238E27FC236}">
+                <a16:creationId xmlns:a16="http://schemas.microsoft.com/office/drawing/2014/main" id="{93BFDCE2-253C-A5B7-98CF-C4DD0696D5BF}"/>
+              </a:ext>
+            </a:extLst>
+          </p:cNvPr>
+          <p:cNvSpPr/>
+          <p:nvPr/>
+        </p:nvSpPr>
+        <p:spPr>
+          <a:xfrm rot="16200000">
+            <a:off x="5669983" y="1073857"/>
+            <a:ext cx="1043564" cy="4804395"/>
+          </a:xfrm>
+          <a:prstGeom prst="can">
+            <a:avLst/>
+          </a:prstGeom>
+        </p:spPr>
+        <p:style>
+          <a:lnRef idx="2">
+            <a:schemeClr val="accent6"/>
+          </a:lnRef>
+          <a:fillRef idx="1">
+            <a:schemeClr val="lt1"/>
+          </a:fillRef>
+          <a:effectRef idx="0">
+            <a:schemeClr val="accent6"/>
+          </a:effectRef>
+          <a:fontRef idx="minor">
+            <a:schemeClr val="dk1"/>
+          </a:fontRef>
+        </p:style>
+        <p:txBody>
+          <a:bodyPr vert="vert" rtlCol="0" anchor="t"/>
+          <a:lstStyle/>
+          <a:p>
+            <a:pPr algn="ctr"/>
+            <a:r>
+              <a:rPr lang="de-DE" sz="1200" dirty="0"/>
+              <a:t>Post </a:t>
+            </a:r>
+            <a:r>
+              <a:rPr lang="de-DE" sz="1200" dirty="0" err="1"/>
+              <a:t>Requests</a:t>
+            </a:r>
+            <a:r>
+              <a:rPr lang="de-DE" sz="1200" dirty="0"/>
+              <a:t> (</a:t>
+            </a:r>
+            <a:r>
+              <a:rPr lang="de-DE" sz="1200" dirty="0" err="1"/>
+              <a:t>async</a:t>
+            </a:r>
+            <a:r>
+              <a:rPr lang="de-DE" sz="1200" dirty="0"/>
+              <a:t> </a:t>
+            </a:r>
+            <a:r>
+              <a:rPr lang="de-DE" sz="1200" dirty="0" err="1"/>
+              <a:t>updates</a:t>
+            </a:r>
+            <a:r>
+              <a:rPr lang="de-DE" sz="1200" dirty="0"/>
+              <a:t>)</a:t>
+            </a:r>
+          </a:p>
+        </p:txBody>
+      </p:sp>
+      <p:sp>
+        <p:nvSpPr>
+          <p:cNvPr id="40" name="Abgerundetes Rechteck 39">
+            <a:extLst>
+              <a:ext uri="{FF2B5EF4-FFF2-40B4-BE49-F238E27FC236}">
+                <a16:creationId xmlns:a16="http://schemas.microsoft.com/office/drawing/2014/main" id="{711596AF-51EA-8688-F485-CFC834473B67}"/>
+              </a:ext>
+            </a:extLst>
+          </p:cNvPr>
+          <p:cNvSpPr/>
+          <p:nvPr/>
+        </p:nvSpPr>
+        <p:spPr>
+          <a:xfrm>
+            <a:off x="5759168" y="3309886"/>
+            <a:ext cx="1256708" cy="580171"/>
+          </a:xfrm>
+          <a:prstGeom prst="roundRect">
+            <a:avLst/>
+          </a:prstGeom>
+        </p:spPr>
+        <p:style>
+          <a:lnRef idx="2">
+            <a:schemeClr val="accent6"/>
+          </a:lnRef>
+          <a:fillRef idx="1">
+            <a:schemeClr val="lt1"/>
+          </a:fillRef>
+          <a:effectRef idx="0">
+            <a:schemeClr val="accent6"/>
+          </a:effectRef>
+          <a:fontRef idx="minor">
+            <a:schemeClr val="dk1"/>
+          </a:fontRef>
+        </p:style>
+        <p:txBody>
+          <a:bodyPr rtlCol="0" anchor="ctr"/>
+          <a:lstStyle/>
+          <a:p>
+            <a:r>
+              <a:rPr lang="de-DE" sz="1200" dirty="0"/>
+              <a:t>Token &amp; </a:t>
+            </a:r>
+            <a:r>
+              <a:rPr lang="de-DE" sz="1200" dirty="0" err="1"/>
+              <a:t>Usage</a:t>
+            </a:r>
+            <a:r>
+              <a:rPr lang="de-DE" sz="1200" dirty="0"/>
+              <a:t> </a:t>
+            </a:r>
+            <a:r>
+              <a:rPr lang="de-DE" sz="1200" dirty="0" err="1"/>
+              <a:t>tracking</a:t>
+            </a:r>
+            <a:endParaRPr lang="de-DE" sz="800" dirty="0"/>
+          </a:p>
+        </p:txBody>
+      </p:sp>
+      <p:sp>
+        <p:nvSpPr>
+          <p:cNvPr id="41" name="Abgerundetes Rechteck 40">
+            <a:extLst>
+              <a:ext uri="{FF2B5EF4-FFF2-40B4-BE49-F238E27FC236}">
+                <a16:creationId xmlns:a16="http://schemas.microsoft.com/office/drawing/2014/main" id="{0CDB7DB7-3E78-EE6B-B74F-095AB8A4C293}"/>
+              </a:ext>
+            </a:extLst>
+          </p:cNvPr>
+          <p:cNvSpPr/>
+          <p:nvPr/>
+        </p:nvSpPr>
+        <p:spPr>
+          <a:xfrm>
+            <a:off x="7078241" y="3319706"/>
+            <a:ext cx="1256708" cy="580171"/>
+          </a:xfrm>
+          <a:prstGeom prst="roundRect">
+            <a:avLst/>
+          </a:prstGeom>
+        </p:spPr>
+        <p:style>
+          <a:lnRef idx="2">
+            <a:schemeClr val="accent6"/>
+          </a:lnRef>
+          <a:fillRef idx="1">
+            <a:schemeClr val="lt1"/>
+          </a:fillRef>
+          <a:effectRef idx="0">
+            <a:schemeClr val="accent6"/>
+          </a:effectRef>
+          <a:fontRef idx="minor">
+            <a:schemeClr val="dk1"/>
+          </a:fontRef>
+        </p:style>
+        <p:txBody>
+          <a:bodyPr rtlCol="0" anchor="ctr"/>
+          <a:lstStyle/>
+          <a:p>
+            <a:r>
+              <a:rPr lang="de-DE" sz="1200" dirty="0" err="1"/>
+              <a:t>Logging</a:t>
+            </a:r>
+            <a:endParaRPr lang="de-DE" sz="1200" dirty="0"/>
+          </a:p>
+          <a:p>
+            <a:r>
+              <a:rPr lang="de-DE" sz="1200" dirty="0"/>
+              <a:t>(</a:t>
+            </a:r>
+            <a:r>
+              <a:rPr lang="de-DE" sz="1200" dirty="0" err="1"/>
+              <a:t>langfuse</a:t>
+            </a:r>
+            <a:r>
+              <a:rPr lang="de-DE" sz="1200" dirty="0"/>
+              <a:t> </a:t>
+            </a:r>
+            <a:r>
+              <a:rPr lang="de-DE" sz="1200" dirty="0" err="1"/>
+              <a:t>integration</a:t>
+            </a:r>
+            <a:r>
+              <a:rPr lang="de-DE" sz="1200" dirty="0"/>
+              <a:t>)</a:t>
+            </a:r>
+            <a:endParaRPr lang="de-DE" sz="800" dirty="0"/>
+          </a:p>
+        </p:txBody>
+      </p:sp>
+      <p:sp>
+        <p:nvSpPr>
+          <p:cNvPr id="43" name="Rechteck 42">
+            <a:extLst>
+              <a:ext uri="{FF2B5EF4-FFF2-40B4-BE49-F238E27FC236}">
+                <a16:creationId xmlns:a16="http://schemas.microsoft.com/office/drawing/2014/main" id="{883EAD5E-6D21-2F79-68D3-49C4A8481403}"/>
+              </a:ext>
+            </a:extLst>
+          </p:cNvPr>
+          <p:cNvSpPr/>
+          <p:nvPr/>
+        </p:nvSpPr>
+        <p:spPr>
+          <a:xfrm>
+            <a:off x="523350" y="2176105"/>
+            <a:ext cx="1534632" cy="1555923"/>
+          </a:xfrm>
+          <a:prstGeom prst="rect">
+            <a:avLst/>
+          </a:prstGeom>
+        </p:spPr>
+        <p:style>
+          <a:lnRef idx="2">
+            <a:schemeClr val="accent1">
+              <a:shade val="15000"/>
+            </a:schemeClr>
+          </a:lnRef>
+          <a:fillRef idx="1">
+            <a:schemeClr val="accent1"/>
+          </a:fillRef>
+          <a:effectRef idx="0">
+            <a:schemeClr val="accent1"/>
+          </a:effectRef>
+          <a:fontRef idx="minor">
+            <a:schemeClr val="lt1"/>
+          </a:fontRef>
+        </p:style>
+        <p:txBody>
+          <a:bodyPr rtlCol="0" anchor="ctr"/>
+          <a:lstStyle/>
+          <a:p>
+            <a:pPr algn="ctr"/>
+            <a:r>
+              <a:rPr lang="de-DE" dirty="0"/>
+              <a:t>Client</a:t>
+            </a:r>
+          </a:p>
+        </p:txBody>
+      </p:sp>
+      <p:cxnSp>
+        <p:nvCxnSpPr>
+          <p:cNvPr id="45" name="Gerade Verbindung mit Pfeil 44">
+            <a:extLst>
+              <a:ext uri="{FF2B5EF4-FFF2-40B4-BE49-F238E27FC236}">
+                <a16:creationId xmlns:a16="http://schemas.microsoft.com/office/drawing/2014/main" id="{7295A916-2BFF-F939-8B2D-1833A204CAB9}"/>
+              </a:ext>
+            </a:extLst>
+          </p:cNvPr>
+          <p:cNvCxnSpPr>
+            <a:cxnSpLocks/>
+            <a:endCxn id="22" idx="1"/>
+          </p:cNvCxnSpPr>
+          <p:nvPr/>
+        </p:nvCxnSpPr>
+        <p:spPr>
+          <a:xfrm>
+            <a:off x="2057982" y="2461427"/>
+            <a:ext cx="1756003" cy="0"/>
+          </a:xfrm>
+          <a:prstGeom prst="straightConnector1">
+            <a:avLst/>
+          </a:prstGeom>
+          <a:ln>
+            <a:tailEnd type="triangle"/>
+          </a:ln>
+        </p:spPr>
+        <p:style>
+          <a:lnRef idx="1">
+            <a:schemeClr val="accent6"/>
+          </a:lnRef>
+          <a:fillRef idx="0">
+            <a:schemeClr val="accent6"/>
+          </a:fillRef>
+          <a:effectRef idx="0">
+            <a:schemeClr val="accent6"/>
+          </a:effectRef>
+          <a:fontRef idx="minor">
+            <a:schemeClr val="tx1"/>
+          </a:fontRef>
+        </p:style>
+      </p:cxnSp>
+      <p:sp>
+        <p:nvSpPr>
+          <p:cNvPr id="48" name="Textfeld 47">
+            <a:extLst>
+              <a:ext uri="{FF2B5EF4-FFF2-40B4-BE49-F238E27FC236}">
+                <a16:creationId xmlns:a16="http://schemas.microsoft.com/office/drawing/2014/main" id="{57FDCC50-7F07-006A-C571-D58C7251E6FD}"/>
+              </a:ext>
+            </a:extLst>
+          </p:cNvPr>
+          <p:cNvSpPr txBox="1"/>
+          <p:nvPr/>
+        </p:nvSpPr>
+        <p:spPr>
+          <a:xfrm>
+            <a:off x="397627" y="6089007"/>
+            <a:ext cx="4520468" cy="369332"/>
+          </a:xfrm>
+          <a:prstGeom prst="rect">
+            <a:avLst/>
+          </a:prstGeom>
+          <a:noFill/>
+        </p:spPr>
+        <p:txBody>
+          <a:bodyPr wrap="none" rtlCol="0">
+            <a:spAutoFit/>
+          </a:bodyPr>
+          <a:lstStyle/>
+          <a:p>
+            <a:r>
+              <a:rPr lang="de-DE" dirty="0"/>
+              <a:t>In Anlehnung an </a:t>
+            </a:r>
+            <a:r>
+              <a:rPr lang="de-DE" dirty="0" err="1"/>
+              <a:t>LiteLLM.proxy</a:t>
+            </a:r>
+            <a:r>
+              <a:rPr lang="de-DE" dirty="0"/>
+              <a:t> Architektur</a:t>
+            </a:r>
+          </a:p>
+        </p:txBody>
+      </p:sp>
+      <p:sp>
+        <p:nvSpPr>
+          <p:cNvPr id="49" name="Zylinder 48">
+            <a:extLst>
+              <a:ext uri="{FF2B5EF4-FFF2-40B4-BE49-F238E27FC236}">
+                <a16:creationId xmlns:a16="http://schemas.microsoft.com/office/drawing/2014/main" id="{04DCF56F-69E0-13B9-B0C3-525DB740A7FF}"/>
+              </a:ext>
+            </a:extLst>
+          </p:cNvPr>
+          <p:cNvSpPr/>
+          <p:nvPr/>
+        </p:nvSpPr>
+        <p:spPr>
+          <a:xfrm>
+            <a:off x="5664569" y="4374042"/>
+            <a:ext cx="1534631" cy="1216152"/>
+          </a:xfrm>
+          <a:prstGeom prst="can">
+            <a:avLst/>
+          </a:prstGeom>
+        </p:spPr>
+        <p:style>
+          <a:lnRef idx="2">
+            <a:schemeClr val="accent1">
+              <a:shade val="15000"/>
+            </a:schemeClr>
+          </a:lnRef>
+          <a:fillRef idx="1">
+            <a:schemeClr val="accent1"/>
+          </a:fillRef>
+          <a:effectRef idx="0">
+            <a:schemeClr val="accent1"/>
+          </a:effectRef>
+          <a:fontRef idx="minor">
+            <a:schemeClr val="lt1"/>
+          </a:fontRef>
+        </p:style>
+        <p:txBody>
+          <a:bodyPr rtlCol="0" anchor="ctr"/>
+          <a:lstStyle/>
+          <a:p>
+            <a:pPr algn="ctr"/>
+            <a:r>
+              <a:rPr lang="de-DE" dirty="0"/>
+              <a:t>Model Registry</a:t>
+            </a:r>
+          </a:p>
+        </p:txBody>
+      </p:sp>
+      <p:sp>
+        <p:nvSpPr>
+          <p:cNvPr id="50" name="Abgerundetes Rechteck 49">
+            <a:extLst>
+              <a:ext uri="{FF2B5EF4-FFF2-40B4-BE49-F238E27FC236}">
+                <a16:creationId xmlns:a16="http://schemas.microsoft.com/office/drawing/2014/main" id="{7947DDA0-6B1A-22D7-601C-46DFBA9B22A4}"/>
+              </a:ext>
+            </a:extLst>
+          </p:cNvPr>
+          <p:cNvSpPr/>
+          <p:nvPr/>
+        </p:nvSpPr>
+        <p:spPr>
+          <a:xfrm>
+            <a:off x="4351993" y="3303728"/>
+            <a:ext cx="1256708" cy="580171"/>
+          </a:xfrm>
+          <a:prstGeom prst="roundRect">
+            <a:avLst/>
+          </a:prstGeom>
+        </p:spPr>
+        <p:style>
+          <a:lnRef idx="2">
+            <a:schemeClr val="accent6"/>
+          </a:lnRef>
+          <a:fillRef idx="1">
+            <a:schemeClr val="lt1"/>
+          </a:fillRef>
+          <a:effectRef idx="0">
+            <a:schemeClr val="accent6"/>
+          </a:effectRef>
+          <a:fontRef idx="minor">
+            <a:schemeClr val="dk1"/>
+          </a:fontRef>
+        </p:style>
+        <p:txBody>
+          <a:bodyPr rtlCol="0" anchor="ctr"/>
+          <a:lstStyle/>
+          <a:p>
+            <a:r>
+              <a:rPr lang="de-DE" sz="1200" dirty="0" err="1"/>
+              <a:t>Guardrails</a:t>
+            </a:r>
+            <a:endParaRPr lang="de-DE" sz="800" dirty="0"/>
+          </a:p>
+        </p:txBody>
+      </p:sp>
+      <p:cxnSp>
+        <p:nvCxnSpPr>
+          <p:cNvPr id="52" name="Gerade Verbindung mit Pfeil 51">
+            <a:extLst>
+              <a:ext uri="{FF2B5EF4-FFF2-40B4-BE49-F238E27FC236}">
+                <a16:creationId xmlns:a16="http://schemas.microsoft.com/office/drawing/2014/main" id="{72AC2E83-F236-7B6C-9280-C8AC4B982382}"/>
+              </a:ext>
+            </a:extLst>
+          </p:cNvPr>
+          <p:cNvCxnSpPr>
+            <a:cxnSpLocks/>
+            <a:stCxn id="25" idx="2"/>
+          </p:cNvCxnSpPr>
+          <p:nvPr/>
+        </p:nvCxnSpPr>
+        <p:spPr>
+          <a:xfrm flipH="1">
+            <a:off x="8145520" y="2751509"/>
+            <a:ext cx="1" cy="215903"/>
+          </a:xfrm>
+          <a:prstGeom prst="straightConnector1">
+            <a:avLst/>
+          </a:prstGeom>
+          <a:ln>
+            <a:tailEnd type="triangle"/>
+          </a:ln>
+        </p:spPr>
+        <p:style>
+          <a:lnRef idx="1">
+            <a:schemeClr val="accent6"/>
+          </a:lnRef>
+          <a:fillRef idx="0">
+            <a:schemeClr val="accent6"/>
+          </a:fillRef>
+          <a:effectRef idx="0">
+            <a:schemeClr val="accent6"/>
+          </a:effectRef>
+          <a:fontRef idx="minor">
+            <a:schemeClr val="tx1"/>
+          </a:fontRef>
+        </p:style>
+      </p:cxnSp>
+      <p:cxnSp>
+        <p:nvCxnSpPr>
+          <p:cNvPr id="55" name="Gerade Verbindung mit Pfeil 54">
+            <a:extLst>
+              <a:ext uri="{FF2B5EF4-FFF2-40B4-BE49-F238E27FC236}">
+                <a16:creationId xmlns:a16="http://schemas.microsoft.com/office/drawing/2014/main" id="{3D9A572A-0742-580D-9F3D-EF46D163131D}"/>
+              </a:ext>
+            </a:extLst>
+          </p:cNvPr>
+          <p:cNvCxnSpPr>
+            <a:stCxn id="35" idx="1"/>
+          </p:cNvCxnSpPr>
+          <p:nvPr/>
+        </p:nvCxnSpPr>
+        <p:spPr>
+          <a:xfrm flipH="1" flipV="1">
+            <a:off x="2057982" y="3476054"/>
+            <a:ext cx="1731586" cy="1"/>
+          </a:xfrm>
+          <a:prstGeom prst="straightConnector1">
+            <a:avLst/>
+          </a:prstGeom>
+          <a:ln>
+            <a:tailEnd type="triangle"/>
+          </a:ln>
+        </p:spPr>
+        <p:style>
+          <a:lnRef idx="1">
+            <a:schemeClr val="accent6"/>
+          </a:lnRef>
+          <a:fillRef idx="0">
+            <a:schemeClr val="accent6"/>
+          </a:fillRef>
+          <a:effectRef idx="0">
+            <a:schemeClr val="accent6"/>
+          </a:effectRef>
+          <a:fontRef idx="minor">
+            <a:schemeClr val="tx1"/>
+          </a:fontRef>
+        </p:style>
+      </p:cxnSp>
+      <p:cxnSp>
+        <p:nvCxnSpPr>
+          <p:cNvPr id="60" name="Gerade Verbindung mit Pfeil 59">
+            <a:extLst>
+              <a:ext uri="{FF2B5EF4-FFF2-40B4-BE49-F238E27FC236}">
+                <a16:creationId xmlns:a16="http://schemas.microsoft.com/office/drawing/2014/main" id="{D20920E7-B58D-BDD0-1D81-B16279DA3F07}"/>
+              </a:ext>
+            </a:extLst>
+          </p:cNvPr>
+          <p:cNvCxnSpPr>
+            <a:stCxn id="22" idx="3"/>
+            <a:endCxn id="25" idx="1"/>
+          </p:cNvCxnSpPr>
+          <p:nvPr/>
+        </p:nvCxnSpPr>
+        <p:spPr>
+          <a:xfrm flipV="1">
+            <a:off x="4797645" y="2461424"/>
+            <a:ext cx="2675359" cy="3"/>
+          </a:xfrm>
+          <a:prstGeom prst="straightConnector1">
+            <a:avLst/>
+          </a:prstGeom>
+          <a:ln>
+            <a:tailEnd type="triangle"/>
+          </a:ln>
+        </p:spPr>
+        <p:style>
+          <a:lnRef idx="1">
+            <a:schemeClr val="accent6"/>
+          </a:lnRef>
+          <a:fillRef idx="0">
+            <a:schemeClr val="accent6"/>
+          </a:fillRef>
+          <a:effectRef idx="0">
+            <a:schemeClr val="accent6"/>
+          </a:effectRef>
+          <a:fontRef idx="minor">
+            <a:schemeClr val="tx1"/>
+          </a:fontRef>
+        </p:style>
+      </p:cxnSp>
+      <p:sp>
+        <p:nvSpPr>
+          <p:cNvPr id="23" name="Abgerundetes Rechteck 22">
+            <a:extLst>
+              <a:ext uri="{FF2B5EF4-FFF2-40B4-BE49-F238E27FC236}">
+                <a16:creationId xmlns:a16="http://schemas.microsoft.com/office/drawing/2014/main" id="{B7C5D797-0E97-0B3D-D23A-898980605540}"/>
+              </a:ext>
+            </a:extLst>
+          </p:cNvPr>
+          <p:cNvSpPr/>
+          <p:nvPr/>
+        </p:nvSpPr>
+        <p:spPr>
+          <a:xfrm>
+            <a:off x="4913201" y="2171340"/>
+            <a:ext cx="983660" cy="580171"/>
+          </a:xfrm>
+          <a:prstGeom prst="roundRect">
+            <a:avLst/>
+          </a:prstGeom>
+        </p:spPr>
+        <p:style>
+          <a:lnRef idx="2">
+            <a:schemeClr val="accent6"/>
+          </a:lnRef>
+          <a:fillRef idx="1">
+            <a:schemeClr val="lt1"/>
+          </a:fillRef>
+          <a:effectRef idx="0">
+            <a:schemeClr val="accent6"/>
+          </a:effectRef>
+          <a:fontRef idx="minor">
+            <a:schemeClr val="dk1"/>
+          </a:fontRef>
+        </p:style>
+        <p:txBody>
+          <a:bodyPr rtlCol="0" anchor="ctr"/>
+          <a:lstStyle/>
+          <a:p>
+            <a:pPr algn="ctr"/>
+            <a:r>
+              <a:rPr lang="de-DE" sz="1200" dirty="0"/>
+              <a:t>check rate </a:t>
+            </a:r>
+            <a:r>
+              <a:rPr lang="de-DE" sz="1200" dirty="0" err="1"/>
+              <a:t>limit</a:t>
+            </a:r>
+            <a:endParaRPr lang="de-DE" sz="1200" dirty="0"/>
+          </a:p>
+        </p:txBody>
+      </p:sp>
+      <p:sp>
+        <p:nvSpPr>
+          <p:cNvPr id="24" name="Abgerundetes Rechteck 23">
+            <a:extLst>
+              <a:ext uri="{FF2B5EF4-FFF2-40B4-BE49-F238E27FC236}">
+                <a16:creationId xmlns:a16="http://schemas.microsoft.com/office/drawing/2014/main" id="{0189F3E6-8AA4-7CF9-4D0C-58C86E0D6D49}"/>
+              </a:ext>
+            </a:extLst>
+          </p:cNvPr>
+          <p:cNvSpPr/>
+          <p:nvPr/>
+        </p:nvSpPr>
+        <p:spPr>
+          <a:xfrm>
+            <a:off x="6012416" y="2171339"/>
+            <a:ext cx="1345033" cy="580171"/>
+          </a:xfrm>
+          <a:prstGeom prst="roundRect">
+            <a:avLst/>
+          </a:prstGeom>
+        </p:spPr>
+        <p:style>
+          <a:lnRef idx="2">
+            <a:schemeClr val="accent6"/>
+          </a:lnRef>
+          <a:fillRef idx="1">
+            <a:schemeClr val="lt1"/>
+          </a:fillRef>
+          <a:effectRef idx="0">
+            <a:schemeClr val="accent6"/>
+          </a:effectRef>
+          <a:fontRef idx="minor">
+            <a:schemeClr val="dk1"/>
+          </a:fontRef>
+        </p:style>
+        <p:txBody>
+          <a:bodyPr rtlCol="0" anchor="ctr"/>
+          <a:lstStyle/>
+          <a:p>
+            <a:r>
+              <a:rPr lang="de-DE" sz="1200" dirty="0"/>
+              <a:t>Handle</a:t>
+            </a:r>
+            <a:br>
+              <a:rPr lang="de-DE" sz="1200" dirty="0"/>
+            </a:br>
+            <a:r>
+              <a:rPr lang="de-DE" sz="800" dirty="0"/>
+              <a:t>/v1/</a:t>
+            </a:r>
+            <a:r>
+              <a:rPr lang="de-DE" sz="800" dirty="0" err="1"/>
+              <a:t>chat</a:t>
+            </a:r>
+            <a:r>
+              <a:rPr lang="de-DE" sz="800" dirty="0"/>
+              <a:t>/</a:t>
+            </a:r>
+            <a:r>
+              <a:rPr lang="de-DE" sz="800" dirty="0" err="1"/>
+              <a:t>completions</a:t>
+            </a:r>
+            <a:endParaRPr lang="de-DE" sz="800" dirty="0"/>
+          </a:p>
+          <a:p>
+            <a:r>
+              <a:rPr lang="de-DE" sz="800" dirty="0"/>
+              <a:t>/v1/</a:t>
+            </a:r>
+            <a:r>
+              <a:rPr lang="de-DE" sz="800" dirty="0" err="1"/>
+              <a:t>embeddings</a:t>
+            </a:r>
+            <a:endParaRPr lang="de-DE" sz="800" dirty="0"/>
+          </a:p>
+        </p:txBody>
+      </p:sp>
+      <p:sp>
+        <p:nvSpPr>
+          <p:cNvPr id="5" name="Rechteck 4">
+            <a:extLst>
+              <a:ext uri="{FF2B5EF4-FFF2-40B4-BE49-F238E27FC236}">
+                <a16:creationId xmlns:a16="http://schemas.microsoft.com/office/drawing/2014/main" id="{778CC6F6-8D9F-FCCD-E553-1E26F51F790A}"/>
+              </a:ext>
+            </a:extLst>
+          </p:cNvPr>
+          <p:cNvSpPr/>
+          <p:nvPr/>
+        </p:nvSpPr>
+        <p:spPr>
+          <a:xfrm>
+            <a:off x="3062176" y="1790885"/>
+            <a:ext cx="397095" cy="2298026"/>
+          </a:xfrm>
+          <a:prstGeom prst="rect">
+            <a:avLst/>
+          </a:prstGeom>
+        </p:spPr>
+        <p:style>
+          <a:lnRef idx="2">
+            <a:schemeClr val="accent1">
+              <a:shade val="15000"/>
+            </a:schemeClr>
+          </a:lnRef>
+          <a:fillRef idx="1">
+            <a:schemeClr val="accent1"/>
+          </a:fillRef>
+          <a:effectRef idx="0">
+            <a:schemeClr val="accent1"/>
+          </a:effectRef>
+          <a:fontRef idx="minor">
+            <a:schemeClr val="lt1"/>
+          </a:fontRef>
+        </p:style>
+        <p:txBody>
+          <a:bodyPr vert="vert270" rtlCol="0" anchor="ctr"/>
+          <a:lstStyle/>
+          <a:p>
+            <a:pPr algn="ctr"/>
+            <a:r>
+              <a:rPr lang="de-DE" dirty="0" err="1"/>
+              <a:t>OpenAI</a:t>
+            </a:r>
+            <a:r>
+              <a:rPr lang="de-DE" dirty="0"/>
+              <a:t> API</a:t>
+            </a:r>
+          </a:p>
+        </p:txBody>
+      </p:sp>
+    </p:spTree>
+    <p:extLst>
+      <p:ext uri="{BB962C8B-B14F-4D97-AF65-F5344CB8AC3E}">
+        <p14:creationId xmlns:p14="http://schemas.microsoft.com/office/powerpoint/2010/main" val="3358893672"/>
+      </p:ext>
+    </p:extLst>
+  </p:cSld>
+  <p:clrMapOvr>
+    <a:masterClrMapping/>
+  </p:clrMapOvr>
+</p:sld>
+</file>
+
 <file path=ppt/theme/theme1.xml><?xml version="1.0" encoding="utf-8"?>
 <a:theme xmlns:a="http://schemas.openxmlformats.org/drawingml/2006/main" name="Office">
   <a:themeElements>

</xml_diff>

<commit_message>
small changes in llm_gateway
</commit_message>
<xml_diff>
--- a/RAKIPOEV-docs/docs/ppt/Building-Blocks.pptx
+++ b/RAKIPOEV-docs/docs/ppt/Building-Blocks.pptx
@@ -12,7 +12,8 @@
     <p:sldId id="259" r:id="rId6"/>
     <p:sldId id="260" r:id="rId7"/>
     <p:sldId id="258" r:id="rId8"/>
-    <p:sldId id="263" r:id="rId9"/>
+    <p:sldId id="264" r:id="rId9"/>
+    <p:sldId id="263" r:id="rId10"/>
   </p:sldIdLst>
   <p:sldSz cx="12192000" cy="6858000"/>
   <p:notesSz cx="6858000" cy="9144000"/>
@@ -6201,6 +6202,1696 @@
         <p:cNvPr id="1" name="">
           <a:extLst>
             <a:ext uri="{FF2B5EF4-FFF2-40B4-BE49-F238E27FC236}">
+              <a16:creationId xmlns:a16="http://schemas.microsoft.com/office/drawing/2014/main" id="{06F41A03-276B-983F-CA94-025243CC4964}"/>
+            </a:ext>
+          </a:extLst>
+        </p:cNvPr>
+        <p:cNvGrpSpPr/>
+        <p:nvPr/>
+      </p:nvGrpSpPr>
+      <p:grpSpPr>
+        <a:xfrm>
+          <a:off x="0" y="0"/>
+          <a:ext cx="0" cy="0"/>
+          <a:chOff x="0" y="0"/>
+          <a:chExt cx="0" cy="0"/>
+        </a:xfrm>
+      </p:grpSpPr>
+      <p:sp>
+        <p:nvSpPr>
+          <p:cNvPr id="2" name="Textfeld 1">
+            <a:extLst>
+              <a:ext uri="{FF2B5EF4-FFF2-40B4-BE49-F238E27FC236}">
+                <a16:creationId xmlns:a16="http://schemas.microsoft.com/office/drawing/2014/main" id="{4D93E79D-ECAA-D610-93E4-409B8195162D}"/>
+              </a:ext>
+            </a:extLst>
+          </p:cNvPr>
+          <p:cNvSpPr txBox="1"/>
+          <p:nvPr/>
+        </p:nvSpPr>
+        <p:spPr>
+          <a:xfrm>
+            <a:off x="10434468" y="6127161"/>
+            <a:ext cx="1550746" cy="369332"/>
+          </a:xfrm>
+          <a:prstGeom prst="rect">
+            <a:avLst/>
+          </a:prstGeom>
+          <a:noFill/>
+        </p:spPr>
+        <p:txBody>
+          <a:bodyPr wrap="none" rtlCol="0">
+            <a:spAutoFit/>
+          </a:bodyPr>
+          <a:lstStyle/>
+          <a:p>
+            <a:r>
+              <a:rPr lang="de-DE" dirty="0"/>
+              <a:t>LLM-Gateway</a:t>
+            </a:r>
+          </a:p>
+        </p:txBody>
+      </p:sp>
+      <p:sp>
+        <p:nvSpPr>
+          <p:cNvPr id="3" name="Rechteck 2">
+            <a:extLst>
+              <a:ext uri="{FF2B5EF4-FFF2-40B4-BE49-F238E27FC236}">
+                <a16:creationId xmlns:a16="http://schemas.microsoft.com/office/drawing/2014/main" id="{8A2FC194-3B63-1CC9-7AE8-99DEE824F31D}"/>
+              </a:ext>
+            </a:extLst>
+          </p:cNvPr>
+          <p:cNvSpPr/>
+          <p:nvPr/>
+        </p:nvSpPr>
+        <p:spPr>
+          <a:xfrm>
+            <a:off x="3664835" y="1790885"/>
+            <a:ext cx="1534632" cy="2298026"/>
+          </a:xfrm>
+          <a:prstGeom prst="rect">
+            <a:avLst/>
+          </a:prstGeom>
+        </p:spPr>
+        <p:style>
+          <a:lnRef idx="2">
+            <a:schemeClr val="accent1">
+              <a:shade val="15000"/>
+            </a:schemeClr>
+          </a:lnRef>
+          <a:fillRef idx="1">
+            <a:schemeClr val="accent1"/>
+          </a:fillRef>
+          <a:effectRef idx="0">
+            <a:schemeClr val="accent1"/>
+          </a:effectRef>
+          <a:fontRef idx="minor">
+            <a:schemeClr val="lt1"/>
+          </a:fontRef>
+        </p:style>
+        <p:txBody>
+          <a:bodyPr rtlCol="0" anchor="ctr"/>
+          <a:lstStyle/>
+          <a:p>
+            <a:pPr algn="ctr"/>
+            <a:r>
+              <a:rPr lang="de-DE" dirty="0"/>
+              <a:t>HTTP-Server</a:t>
+            </a:r>
+          </a:p>
+        </p:txBody>
+      </p:sp>
+      <p:sp>
+        <p:nvSpPr>
+          <p:cNvPr id="4" name="Rechteck 3">
+            <a:extLst>
+              <a:ext uri="{FF2B5EF4-FFF2-40B4-BE49-F238E27FC236}">
+                <a16:creationId xmlns:a16="http://schemas.microsoft.com/office/drawing/2014/main" id="{42BBD9A7-CA62-D115-15A9-A1DFDB44F6A0}"/>
+              </a:ext>
+            </a:extLst>
+          </p:cNvPr>
+          <p:cNvSpPr/>
+          <p:nvPr/>
+        </p:nvSpPr>
+        <p:spPr>
+          <a:xfrm>
+            <a:off x="9454929" y="1771920"/>
+            <a:ext cx="1534632" cy="619703"/>
+          </a:xfrm>
+          <a:prstGeom prst="rect">
+            <a:avLst/>
+          </a:prstGeom>
+        </p:spPr>
+        <p:style>
+          <a:lnRef idx="2">
+            <a:schemeClr val="accent1">
+              <a:shade val="15000"/>
+            </a:schemeClr>
+          </a:lnRef>
+          <a:fillRef idx="1">
+            <a:schemeClr val="accent1"/>
+          </a:fillRef>
+          <a:effectRef idx="0">
+            <a:schemeClr val="accent1"/>
+          </a:effectRef>
+          <a:fontRef idx="minor">
+            <a:schemeClr val="lt1"/>
+          </a:fontRef>
+        </p:style>
+        <p:txBody>
+          <a:bodyPr rtlCol="0" anchor="ctr"/>
+          <a:lstStyle/>
+          <a:p>
+            <a:pPr algn="ctr"/>
+            <a:r>
+              <a:rPr lang="de-DE" dirty="0" err="1"/>
+              <a:t>vLLM</a:t>
+            </a:r>
+            <a:endParaRPr lang="de-DE" dirty="0"/>
+          </a:p>
+        </p:txBody>
+      </p:sp>
+      <p:cxnSp>
+        <p:nvCxnSpPr>
+          <p:cNvPr id="7" name="Gerade Verbindung 6">
+            <a:extLst>
+              <a:ext uri="{FF2B5EF4-FFF2-40B4-BE49-F238E27FC236}">
+                <a16:creationId xmlns:a16="http://schemas.microsoft.com/office/drawing/2014/main" id="{A75E94E8-ACC9-C201-9380-30EE5483B43C}"/>
+              </a:ext>
+            </a:extLst>
+          </p:cNvPr>
+          <p:cNvCxnSpPr>
+            <a:stCxn id="3" idx="1"/>
+            <a:endCxn id="5" idx="3"/>
+          </p:cNvCxnSpPr>
+          <p:nvPr/>
+        </p:nvCxnSpPr>
+        <p:spPr>
+          <a:xfrm flipH="1">
+            <a:off x="3459271" y="2939898"/>
+            <a:ext cx="205564" cy="0"/>
+          </a:xfrm>
+          <a:prstGeom prst="line">
+            <a:avLst/>
+          </a:prstGeom>
+        </p:spPr>
+        <p:style>
+          <a:lnRef idx="2">
+            <a:schemeClr val="accent1"/>
+          </a:lnRef>
+          <a:fillRef idx="0">
+            <a:schemeClr val="accent1"/>
+          </a:fillRef>
+          <a:effectRef idx="1">
+            <a:schemeClr val="accent1"/>
+          </a:effectRef>
+          <a:fontRef idx="minor">
+            <a:schemeClr val="tx1"/>
+          </a:fontRef>
+        </p:style>
+      </p:cxnSp>
+      <p:sp>
+        <p:nvSpPr>
+          <p:cNvPr id="8" name="Zylinder 7">
+            <a:extLst>
+              <a:ext uri="{FF2B5EF4-FFF2-40B4-BE49-F238E27FC236}">
+                <a16:creationId xmlns:a16="http://schemas.microsoft.com/office/drawing/2014/main" id="{A78513DE-A141-FEE6-BA43-29869C51B57F}"/>
+              </a:ext>
+            </a:extLst>
+          </p:cNvPr>
+          <p:cNvSpPr/>
+          <p:nvPr/>
+        </p:nvSpPr>
+        <p:spPr>
+          <a:xfrm>
+            <a:off x="3664835" y="4378507"/>
+            <a:ext cx="1534631" cy="1216152"/>
+          </a:xfrm>
+          <a:prstGeom prst="can">
+            <a:avLst/>
+          </a:prstGeom>
+        </p:spPr>
+        <p:style>
+          <a:lnRef idx="2">
+            <a:schemeClr val="accent1">
+              <a:shade val="15000"/>
+            </a:schemeClr>
+          </a:lnRef>
+          <a:fillRef idx="1">
+            <a:schemeClr val="accent1"/>
+          </a:fillRef>
+          <a:effectRef idx="0">
+            <a:schemeClr val="accent1"/>
+          </a:effectRef>
+          <a:fontRef idx="minor">
+            <a:schemeClr val="lt1"/>
+          </a:fontRef>
+        </p:style>
+        <p:txBody>
+          <a:bodyPr rtlCol="0" anchor="ctr"/>
+          <a:lstStyle/>
+          <a:p>
+            <a:pPr algn="ctr"/>
+            <a:r>
+              <a:rPr lang="de-DE" dirty="0"/>
+              <a:t>User &amp; </a:t>
+            </a:r>
+            <a:r>
+              <a:rPr lang="de-DE" dirty="0" err="1"/>
+              <a:t>Usage</a:t>
+            </a:r>
+            <a:endParaRPr lang="de-DE" dirty="0"/>
+          </a:p>
+        </p:txBody>
+      </p:sp>
+      <p:cxnSp>
+        <p:nvCxnSpPr>
+          <p:cNvPr id="12" name="Gerade Verbindung 11">
+            <a:extLst>
+              <a:ext uri="{FF2B5EF4-FFF2-40B4-BE49-F238E27FC236}">
+                <a16:creationId xmlns:a16="http://schemas.microsoft.com/office/drawing/2014/main" id="{514EDD3B-641C-CB8C-0D1C-DF044BF03CF2}"/>
+              </a:ext>
+            </a:extLst>
+          </p:cNvPr>
+          <p:cNvCxnSpPr>
+            <a:stCxn id="3" idx="2"/>
+            <a:endCxn id="8" idx="1"/>
+          </p:cNvCxnSpPr>
+          <p:nvPr/>
+        </p:nvCxnSpPr>
+        <p:spPr>
+          <a:xfrm>
+            <a:off x="4432151" y="4088911"/>
+            <a:ext cx="0" cy="289596"/>
+          </a:xfrm>
+          <a:prstGeom prst="line">
+            <a:avLst/>
+          </a:prstGeom>
+        </p:spPr>
+        <p:style>
+          <a:lnRef idx="2">
+            <a:schemeClr val="accent1"/>
+          </a:lnRef>
+          <a:fillRef idx="0">
+            <a:schemeClr val="accent1"/>
+          </a:fillRef>
+          <a:effectRef idx="1">
+            <a:schemeClr val="accent1"/>
+          </a:effectRef>
+          <a:fontRef idx="minor">
+            <a:schemeClr val="tx1"/>
+          </a:fontRef>
+        </p:style>
+      </p:cxnSp>
+      <p:sp>
+        <p:nvSpPr>
+          <p:cNvPr id="13" name="Textfeld 12">
+            <a:extLst>
+              <a:ext uri="{FF2B5EF4-FFF2-40B4-BE49-F238E27FC236}">
+                <a16:creationId xmlns:a16="http://schemas.microsoft.com/office/drawing/2014/main" id="{6691FBB9-D0E0-4E84-359C-821D8CE3DAE1}"/>
+              </a:ext>
+            </a:extLst>
+          </p:cNvPr>
+          <p:cNvSpPr txBox="1"/>
+          <p:nvPr/>
+        </p:nvSpPr>
+        <p:spPr>
+          <a:xfrm>
+            <a:off x="2910806" y="1316623"/>
+            <a:ext cx="2650021" cy="369332"/>
+          </a:xfrm>
+          <a:prstGeom prst="rect">
+            <a:avLst/>
+          </a:prstGeom>
+          <a:noFill/>
+        </p:spPr>
+        <p:txBody>
+          <a:bodyPr wrap="none" rtlCol="0">
+            <a:spAutoFit/>
+          </a:bodyPr>
+          <a:lstStyle/>
+          <a:p>
+            <a:r>
+              <a:rPr lang="de-DE" dirty="0"/>
+              <a:t>Unified interface </a:t>
+            </a:r>
+            <a:r>
+              <a:rPr lang="de-DE" dirty="0" err="1"/>
+              <a:t>to</a:t>
+            </a:r>
+            <a:r>
+              <a:rPr lang="de-DE" dirty="0"/>
+              <a:t> LLMs</a:t>
+            </a:r>
+          </a:p>
+        </p:txBody>
+      </p:sp>
+      <p:sp>
+        <p:nvSpPr>
+          <p:cNvPr id="14" name="Textfeld 13">
+            <a:extLst>
+              <a:ext uri="{FF2B5EF4-FFF2-40B4-BE49-F238E27FC236}">
+                <a16:creationId xmlns:a16="http://schemas.microsoft.com/office/drawing/2014/main" id="{9AD67A94-13A8-C773-1900-9E5DB69DC808}"/>
+              </a:ext>
+            </a:extLst>
+          </p:cNvPr>
+          <p:cNvSpPr txBox="1"/>
+          <p:nvPr/>
+        </p:nvSpPr>
+        <p:spPr>
+          <a:xfrm>
+            <a:off x="1381487" y="4428120"/>
+            <a:ext cx="2357184" cy="2031325"/>
+          </a:xfrm>
+          <a:prstGeom prst="rect">
+            <a:avLst/>
+          </a:prstGeom>
+          <a:noFill/>
+        </p:spPr>
+        <p:txBody>
+          <a:bodyPr wrap="none" rtlCol="0">
+            <a:spAutoFit/>
+          </a:bodyPr>
+          <a:lstStyle/>
+          <a:p>
+            <a:pPr marL="285750" indent="-285750">
+              <a:buFont typeface="Arial" panose="020B0604020202020204" pitchFamily="34" charset="0"/>
+              <a:buChar char="•"/>
+            </a:pPr>
+            <a:r>
+              <a:rPr lang="de-DE" dirty="0"/>
+              <a:t>virtual </a:t>
+            </a:r>
+            <a:r>
+              <a:rPr lang="de-DE" dirty="0" err="1"/>
+              <a:t>keys</a:t>
+            </a:r>
+            <a:endParaRPr lang="de-DE" dirty="0"/>
+          </a:p>
+          <a:p>
+            <a:pPr marL="285750" indent="-285750">
+              <a:buFont typeface="Arial" panose="020B0604020202020204" pitchFamily="34" charset="0"/>
+              <a:buChar char="•"/>
+            </a:pPr>
+            <a:r>
+              <a:rPr lang="de-DE" dirty="0"/>
+              <a:t>rate </a:t>
+            </a:r>
+            <a:r>
+              <a:rPr lang="de-DE" dirty="0" err="1"/>
+              <a:t>limit</a:t>
+            </a:r>
+            <a:endParaRPr lang="de-DE" dirty="0"/>
+          </a:p>
+          <a:p>
+            <a:pPr marL="285750" indent="-285750">
+              <a:buFont typeface="Arial" panose="020B0604020202020204" pitchFamily="34" charset="0"/>
+              <a:buChar char="•"/>
+            </a:pPr>
+            <a:r>
+              <a:rPr lang="de-DE" dirty="0"/>
+              <a:t>track </a:t>
+            </a:r>
+            <a:r>
+              <a:rPr lang="de-DE" dirty="0" err="1"/>
+              <a:t>spend</a:t>
+            </a:r>
+            <a:endParaRPr lang="de-DE" dirty="0"/>
+          </a:p>
+          <a:p>
+            <a:pPr marL="285750" indent="-285750">
+              <a:buFont typeface="Arial" panose="020B0604020202020204" pitchFamily="34" charset="0"/>
+              <a:buChar char="•"/>
+            </a:pPr>
+            <a:r>
+              <a:rPr lang="de-DE" dirty="0" err="1"/>
+              <a:t>set</a:t>
+            </a:r>
+            <a:r>
+              <a:rPr lang="de-DE" dirty="0"/>
+              <a:t> </a:t>
+            </a:r>
+            <a:r>
+              <a:rPr lang="de-DE" dirty="0" err="1"/>
+              <a:t>budgets</a:t>
+            </a:r>
+            <a:r>
+              <a:rPr lang="de-DE" dirty="0"/>
+              <a:t> </a:t>
+            </a:r>
+            <a:br>
+              <a:rPr lang="de-DE" dirty="0"/>
+            </a:br>
+            <a:r>
+              <a:rPr lang="de-DE" dirty="0"/>
+              <a:t>per virtual </a:t>
+            </a:r>
+            <a:r>
+              <a:rPr lang="de-DE" dirty="0" err="1"/>
+              <a:t>key</a:t>
+            </a:r>
+            <a:r>
+              <a:rPr lang="de-DE" dirty="0"/>
+              <a:t>/</a:t>
+            </a:r>
+            <a:r>
+              <a:rPr lang="de-DE" dirty="0" err="1"/>
+              <a:t>user</a:t>
+            </a:r>
+            <a:endParaRPr lang="de-DE" dirty="0"/>
+          </a:p>
+          <a:p>
+            <a:pPr marL="285750" indent="-285750">
+              <a:buFont typeface="Arial" panose="020B0604020202020204" pitchFamily="34" charset="0"/>
+              <a:buChar char="•"/>
+            </a:pPr>
+            <a:endParaRPr lang="de-DE" dirty="0"/>
+          </a:p>
+          <a:p>
+            <a:endParaRPr lang="de-DE" dirty="0"/>
+          </a:p>
+        </p:txBody>
+      </p:sp>
+      <p:sp>
+        <p:nvSpPr>
+          <p:cNvPr id="15" name="Rechteck 14">
+            <a:extLst>
+              <a:ext uri="{FF2B5EF4-FFF2-40B4-BE49-F238E27FC236}">
+                <a16:creationId xmlns:a16="http://schemas.microsoft.com/office/drawing/2014/main" id="{AA680242-2120-6486-282E-16CAA86A0564}"/>
+              </a:ext>
+            </a:extLst>
+          </p:cNvPr>
+          <p:cNvSpPr/>
+          <p:nvPr/>
+        </p:nvSpPr>
+        <p:spPr>
+          <a:xfrm>
+            <a:off x="9454929" y="2549804"/>
+            <a:ext cx="1534632" cy="580889"/>
+          </a:xfrm>
+          <a:prstGeom prst="rect">
+            <a:avLst/>
+          </a:prstGeom>
+        </p:spPr>
+        <p:style>
+          <a:lnRef idx="2">
+            <a:schemeClr val="accent1">
+              <a:shade val="15000"/>
+            </a:schemeClr>
+          </a:lnRef>
+          <a:fillRef idx="1">
+            <a:schemeClr val="accent1"/>
+          </a:fillRef>
+          <a:effectRef idx="0">
+            <a:schemeClr val="accent1"/>
+          </a:effectRef>
+          <a:fontRef idx="minor">
+            <a:schemeClr val="lt1"/>
+          </a:fontRef>
+        </p:style>
+        <p:txBody>
+          <a:bodyPr rtlCol="0" anchor="ctr"/>
+          <a:lstStyle/>
+          <a:p>
+            <a:pPr algn="ctr"/>
+            <a:r>
+              <a:rPr lang="de-DE" dirty="0" err="1"/>
+              <a:t>Ollama</a:t>
+            </a:r>
+            <a:endParaRPr lang="de-DE" dirty="0"/>
+          </a:p>
+        </p:txBody>
+      </p:sp>
+      <p:sp>
+        <p:nvSpPr>
+          <p:cNvPr id="17" name="Textfeld 16">
+            <a:extLst>
+              <a:ext uri="{FF2B5EF4-FFF2-40B4-BE49-F238E27FC236}">
+                <a16:creationId xmlns:a16="http://schemas.microsoft.com/office/drawing/2014/main" id="{D70E1B4B-20AE-A2FC-DC2B-C70EB992332C}"/>
+              </a:ext>
+            </a:extLst>
+          </p:cNvPr>
+          <p:cNvSpPr txBox="1"/>
+          <p:nvPr/>
+        </p:nvSpPr>
+        <p:spPr>
+          <a:xfrm>
+            <a:off x="7224869" y="4441202"/>
+            <a:ext cx="1911614" cy="923330"/>
+          </a:xfrm>
+          <a:prstGeom prst="rect">
+            <a:avLst/>
+          </a:prstGeom>
+          <a:noFill/>
+        </p:spPr>
+        <p:txBody>
+          <a:bodyPr wrap="none" rtlCol="0">
+            <a:spAutoFit/>
+          </a:bodyPr>
+          <a:lstStyle/>
+          <a:p>
+            <a:pPr marL="285750" indent="-285750">
+              <a:buFont typeface="Arial" panose="020B0604020202020204" pitchFamily="34" charset="0"/>
+              <a:buChar char="•"/>
+            </a:pPr>
+            <a:r>
+              <a:rPr lang="de-DE" dirty="0" err="1"/>
+              <a:t>model</a:t>
+            </a:r>
+            <a:r>
+              <a:rPr lang="de-DE" dirty="0"/>
+              <a:t> </a:t>
+            </a:r>
+            <a:r>
+              <a:rPr lang="de-DE" dirty="0" err="1"/>
+              <a:t>list</a:t>
+            </a:r>
+            <a:endParaRPr lang="de-DE" dirty="0"/>
+          </a:p>
+          <a:p>
+            <a:pPr marL="285750" indent="-285750">
+              <a:buFont typeface="Arial" panose="020B0604020202020204" pitchFamily="34" charset="0"/>
+              <a:buChar char="•"/>
+            </a:pPr>
+            <a:r>
+              <a:rPr lang="de-DE" dirty="0" err="1"/>
+              <a:t>router</a:t>
+            </a:r>
+            <a:r>
+              <a:rPr lang="de-DE" dirty="0"/>
+              <a:t> </a:t>
+            </a:r>
+            <a:r>
+              <a:rPr lang="de-DE" dirty="0" err="1"/>
+              <a:t>settings</a:t>
+            </a:r>
+            <a:endParaRPr lang="de-DE" dirty="0"/>
+          </a:p>
+          <a:p>
+            <a:endParaRPr lang="de-DE" dirty="0"/>
+          </a:p>
+        </p:txBody>
+      </p:sp>
+      <p:sp>
+        <p:nvSpPr>
+          <p:cNvPr id="19" name="Rechteck 18">
+            <a:extLst>
+              <a:ext uri="{FF2B5EF4-FFF2-40B4-BE49-F238E27FC236}">
+                <a16:creationId xmlns:a16="http://schemas.microsoft.com/office/drawing/2014/main" id="{BA141570-F14A-F6D9-9BA7-1AA8DE9B9228}"/>
+              </a:ext>
+            </a:extLst>
+          </p:cNvPr>
+          <p:cNvSpPr/>
+          <p:nvPr/>
+        </p:nvSpPr>
+        <p:spPr>
+          <a:xfrm>
+            <a:off x="5631711" y="1790885"/>
+            <a:ext cx="1534632" cy="2298026"/>
+          </a:xfrm>
+          <a:prstGeom prst="rect">
+            <a:avLst/>
+          </a:prstGeom>
+        </p:spPr>
+        <p:style>
+          <a:lnRef idx="2">
+            <a:schemeClr val="accent1">
+              <a:shade val="15000"/>
+            </a:schemeClr>
+          </a:lnRef>
+          <a:fillRef idx="1">
+            <a:schemeClr val="accent1"/>
+          </a:fillRef>
+          <a:effectRef idx="0">
+            <a:schemeClr val="accent1"/>
+          </a:effectRef>
+          <a:fontRef idx="minor">
+            <a:schemeClr val="lt1"/>
+          </a:fontRef>
+        </p:style>
+        <p:txBody>
+          <a:bodyPr rtlCol="0" anchor="ctr"/>
+          <a:lstStyle/>
+          <a:p>
+            <a:pPr algn="ctr"/>
+            <a:r>
+              <a:rPr lang="de-DE" dirty="0"/>
+              <a:t>HTTP-Server</a:t>
+            </a:r>
+          </a:p>
+        </p:txBody>
+      </p:sp>
+      <p:cxnSp>
+        <p:nvCxnSpPr>
+          <p:cNvPr id="21" name="Gerade Verbindung 20">
+            <a:extLst>
+              <a:ext uri="{FF2B5EF4-FFF2-40B4-BE49-F238E27FC236}">
+                <a16:creationId xmlns:a16="http://schemas.microsoft.com/office/drawing/2014/main" id="{9368CA87-10B9-FE4C-1668-19460C84FB4F}"/>
+              </a:ext>
+            </a:extLst>
+          </p:cNvPr>
+          <p:cNvCxnSpPr>
+            <a:cxnSpLocks/>
+            <a:stCxn id="19" idx="2"/>
+          </p:cNvCxnSpPr>
+          <p:nvPr/>
+        </p:nvCxnSpPr>
+        <p:spPr>
+          <a:xfrm flipH="1">
+            <a:off x="6395483" y="4088911"/>
+            <a:ext cx="3544" cy="440472"/>
+          </a:xfrm>
+          <a:prstGeom prst="line">
+            <a:avLst/>
+          </a:prstGeom>
+        </p:spPr>
+        <p:style>
+          <a:lnRef idx="2">
+            <a:schemeClr val="accent1"/>
+          </a:lnRef>
+          <a:fillRef idx="0">
+            <a:schemeClr val="accent1"/>
+          </a:fillRef>
+          <a:effectRef idx="1">
+            <a:schemeClr val="accent1"/>
+          </a:effectRef>
+          <a:fontRef idx="minor">
+            <a:schemeClr val="tx1"/>
+          </a:fontRef>
+        </p:style>
+      </p:cxnSp>
+      <p:sp>
+        <p:nvSpPr>
+          <p:cNvPr id="18" name="Rechteck 17">
+            <a:extLst>
+              <a:ext uri="{FF2B5EF4-FFF2-40B4-BE49-F238E27FC236}">
+                <a16:creationId xmlns:a16="http://schemas.microsoft.com/office/drawing/2014/main" id="{16187CA9-AD66-DD44-69BF-32F0AD4152D1}"/>
+              </a:ext>
+            </a:extLst>
+          </p:cNvPr>
+          <p:cNvSpPr/>
+          <p:nvPr/>
+        </p:nvSpPr>
+        <p:spPr>
+          <a:xfrm>
+            <a:off x="3664835" y="1790885"/>
+            <a:ext cx="5309044" cy="2298023"/>
+          </a:xfrm>
+          <a:prstGeom prst="rect">
+            <a:avLst/>
+          </a:prstGeom>
+        </p:spPr>
+        <p:style>
+          <a:lnRef idx="2">
+            <a:schemeClr val="accent1">
+              <a:shade val="15000"/>
+            </a:schemeClr>
+          </a:lnRef>
+          <a:fillRef idx="1">
+            <a:schemeClr val="accent1"/>
+          </a:fillRef>
+          <a:effectRef idx="0">
+            <a:schemeClr val="accent1"/>
+          </a:effectRef>
+          <a:fontRef idx="minor">
+            <a:schemeClr val="lt1"/>
+          </a:fontRef>
+        </p:style>
+        <p:txBody>
+          <a:bodyPr rtlCol="0" anchor="ctr"/>
+          <a:lstStyle/>
+          <a:p>
+            <a:pPr algn="ctr"/>
+            <a:endParaRPr lang="de-DE"/>
+          </a:p>
+        </p:txBody>
+      </p:sp>
+      <p:sp>
+        <p:nvSpPr>
+          <p:cNvPr id="22" name="Abgerundetes Rechteck 21">
+            <a:extLst>
+              <a:ext uri="{FF2B5EF4-FFF2-40B4-BE49-F238E27FC236}">
+                <a16:creationId xmlns:a16="http://schemas.microsoft.com/office/drawing/2014/main" id="{9FFE8965-B8B0-AE9D-6A67-AC64B85B8D50}"/>
+              </a:ext>
+            </a:extLst>
+          </p:cNvPr>
+          <p:cNvSpPr/>
+          <p:nvPr/>
+        </p:nvSpPr>
+        <p:spPr>
+          <a:xfrm>
+            <a:off x="3813985" y="2171341"/>
+            <a:ext cx="983660" cy="580171"/>
+          </a:xfrm>
+          <a:prstGeom prst="roundRect">
+            <a:avLst/>
+          </a:prstGeom>
+        </p:spPr>
+        <p:style>
+          <a:lnRef idx="2">
+            <a:schemeClr val="accent6"/>
+          </a:lnRef>
+          <a:fillRef idx="1">
+            <a:schemeClr val="lt1"/>
+          </a:fillRef>
+          <a:effectRef idx="0">
+            <a:schemeClr val="accent6"/>
+          </a:effectRef>
+          <a:fontRef idx="minor">
+            <a:schemeClr val="dk1"/>
+          </a:fontRef>
+        </p:style>
+        <p:txBody>
+          <a:bodyPr rtlCol="0" anchor="ctr"/>
+          <a:lstStyle/>
+          <a:p>
+            <a:pPr algn="ctr"/>
+            <a:r>
+              <a:rPr lang="de-DE" sz="1200" dirty="0"/>
+              <a:t>check virtual </a:t>
+            </a:r>
+            <a:r>
+              <a:rPr lang="de-DE" sz="1200" dirty="0" err="1"/>
+              <a:t>key</a:t>
+            </a:r>
+            <a:r>
+              <a:rPr lang="de-DE" sz="1200" dirty="0"/>
+              <a:t> (</a:t>
+            </a:r>
+            <a:r>
+              <a:rPr lang="de-DE" sz="1200" dirty="0" err="1"/>
+              <a:t>Bearer</a:t>
+            </a:r>
+            <a:r>
+              <a:rPr lang="de-DE" sz="1200" dirty="0"/>
+              <a:t>)</a:t>
+            </a:r>
+          </a:p>
+        </p:txBody>
+      </p:sp>
+      <p:sp>
+        <p:nvSpPr>
+          <p:cNvPr id="25" name="Abgerundetes Rechteck 24">
+            <a:extLst>
+              <a:ext uri="{FF2B5EF4-FFF2-40B4-BE49-F238E27FC236}">
+                <a16:creationId xmlns:a16="http://schemas.microsoft.com/office/drawing/2014/main" id="{C393F13F-31E8-EF41-BB67-8C41C450364D}"/>
+              </a:ext>
+            </a:extLst>
+          </p:cNvPr>
+          <p:cNvSpPr/>
+          <p:nvPr/>
+        </p:nvSpPr>
+        <p:spPr>
+          <a:xfrm>
+            <a:off x="7473004" y="2171338"/>
+            <a:ext cx="1345033" cy="580171"/>
+          </a:xfrm>
+          <a:prstGeom prst="roundRect">
+            <a:avLst/>
+          </a:prstGeom>
+        </p:spPr>
+        <p:style>
+          <a:lnRef idx="2">
+            <a:schemeClr val="accent6"/>
+          </a:lnRef>
+          <a:fillRef idx="1">
+            <a:schemeClr val="lt1"/>
+          </a:fillRef>
+          <a:effectRef idx="0">
+            <a:schemeClr val="accent6"/>
+          </a:effectRef>
+          <a:fontRef idx="minor">
+            <a:schemeClr val="dk1"/>
+          </a:fontRef>
+        </p:style>
+        <p:txBody>
+          <a:bodyPr rtlCol="0" anchor="ctr"/>
+          <a:lstStyle/>
+          <a:p>
+            <a:r>
+              <a:rPr lang="de-DE" sz="1200" dirty="0"/>
+              <a:t>Routing</a:t>
+            </a:r>
+          </a:p>
+          <a:p>
+            <a:r>
+              <a:rPr lang="de-DE" sz="800" dirty="0" err="1"/>
+              <a:t>with</a:t>
+            </a:r>
+            <a:r>
+              <a:rPr lang="de-DE" sz="800" dirty="0"/>
+              <a:t> Load </a:t>
+            </a:r>
+            <a:r>
+              <a:rPr lang="de-DE" sz="800" dirty="0" err="1"/>
+              <a:t>Balancing</a:t>
+            </a:r>
+            <a:r>
+              <a:rPr lang="de-DE" sz="800" dirty="0"/>
+              <a:t>, </a:t>
+            </a:r>
+            <a:r>
+              <a:rPr lang="de-DE" sz="800" dirty="0" err="1"/>
+              <a:t>Fallback</a:t>
+            </a:r>
+            <a:r>
+              <a:rPr lang="de-DE" sz="800" dirty="0"/>
+              <a:t> &amp; </a:t>
+            </a:r>
+            <a:r>
+              <a:rPr lang="de-DE" sz="800" dirty="0" err="1"/>
+              <a:t>Retry</a:t>
+            </a:r>
+            <a:endParaRPr lang="de-DE" sz="800" dirty="0"/>
+          </a:p>
+        </p:txBody>
+      </p:sp>
+      <p:cxnSp>
+        <p:nvCxnSpPr>
+          <p:cNvPr id="27" name="Gewinkelte Verbindung 26">
+            <a:extLst>
+              <a:ext uri="{FF2B5EF4-FFF2-40B4-BE49-F238E27FC236}">
+                <a16:creationId xmlns:a16="http://schemas.microsoft.com/office/drawing/2014/main" id="{A1C30941-E972-8C2C-E00F-2DD8DFBF0C17}"/>
+              </a:ext>
+            </a:extLst>
+          </p:cNvPr>
+          <p:cNvCxnSpPr>
+            <a:cxnSpLocks/>
+            <a:stCxn id="25" idx="3"/>
+            <a:endCxn id="4" idx="1"/>
+          </p:cNvCxnSpPr>
+          <p:nvPr/>
+        </p:nvCxnSpPr>
+        <p:spPr>
+          <a:xfrm flipV="1">
+            <a:off x="8818037" y="2081772"/>
+            <a:ext cx="636892" cy="379652"/>
+          </a:xfrm>
+          <a:prstGeom prst="bentConnector3">
+            <a:avLst/>
+          </a:prstGeom>
+          <a:ln>
+            <a:headEnd type="triangle"/>
+            <a:tailEnd type="triangle"/>
+          </a:ln>
+        </p:spPr>
+        <p:style>
+          <a:lnRef idx="1">
+            <a:schemeClr val="accent6"/>
+          </a:lnRef>
+          <a:fillRef idx="0">
+            <a:schemeClr val="accent6"/>
+          </a:fillRef>
+          <a:effectRef idx="0">
+            <a:schemeClr val="accent6"/>
+          </a:effectRef>
+          <a:fontRef idx="minor">
+            <a:schemeClr val="tx1"/>
+          </a:fontRef>
+        </p:style>
+      </p:cxnSp>
+      <p:cxnSp>
+        <p:nvCxnSpPr>
+          <p:cNvPr id="29" name="Gewinkelte Verbindung 28">
+            <a:extLst>
+              <a:ext uri="{FF2B5EF4-FFF2-40B4-BE49-F238E27FC236}">
+                <a16:creationId xmlns:a16="http://schemas.microsoft.com/office/drawing/2014/main" id="{4D443C9D-BEE2-E866-EC2D-19BA978F679B}"/>
+              </a:ext>
+            </a:extLst>
+          </p:cNvPr>
+          <p:cNvCxnSpPr>
+            <a:cxnSpLocks/>
+            <a:stCxn id="25" idx="3"/>
+            <a:endCxn id="15" idx="1"/>
+          </p:cNvCxnSpPr>
+          <p:nvPr/>
+        </p:nvCxnSpPr>
+        <p:spPr>
+          <a:xfrm>
+            <a:off x="8818037" y="2461424"/>
+            <a:ext cx="636892" cy="378825"/>
+          </a:xfrm>
+          <a:prstGeom prst="bentConnector3">
+            <a:avLst/>
+          </a:prstGeom>
+          <a:ln>
+            <a:headEnd type="triangle"/>
+            <a:tailEnd type="triangle"/>
+          </a:ln>
+        </p:spPr>
+        <p:style>
+          <a:lnRef idx="1">
+            <a:schemeClr val="accent6"/>
+          </a:lnRef>
+          <a:fillRef idx="0">
+            <a:schemeClr val="accent6"/>
+          </a:fillRef>
+          <a:effectRef idx="0">
+            <a:schemeClr val="accent6"/>
+          </a:effectRef>
+          <a:fontRef idx="minor">
+            <a:schemeClr val="tx1"/>
+          </a:fontRef>
+        </p:style>
+      </p:cxnSp>
+      <p:sp>
+        <p:nvSpPr>
+          <p:cNvPr id="35" name="Zylinder 34">
+            <a:extLst>
+              <a:ext uri="{FF2B5EF4-FFF2-40B4-BE49-F238E27FC236}">
+                <a16:creationId xmlns:a16="http://schemas.microsoft.com/office/drawing/2014/main" id="{592B9945-3F75-D8F5-8EA5-33524BEDF887}"/>
+              </a:ext>
+            </a:extLst>
+          </p:cNvPr>
+          <p:cNvSpPr/>
+          <p:nvPr/>
+        </p:nvSpPr>
+        <p:spPr>
+          <a:xfrm rot="16200000">
+            <a:off x="5669983" y="1073857"/>
+            <a:ext cx="1043564" cy="4804395"/>
+          </a:xfrm>
+          <a:prstGeom prst="can">
+            <a:avLst/>
+          </a:prstGeom>
+        </p:spPr>
+        <p:style>
+          <a:lnRef idx="2">
+            <a:schemeClr val="accent6"/>
+          </a:lnRef>
+          <a:fillRef idx="1">
+            <a:schemeClr val="lt1"/>
+          </a:fillRef>
+          <a:effectRef idx="0">
+            <a:schemeClr val="accent6"/>
+          </a:effectRef>
+          <a:fontRef idx="minor">
+            <a:schemeClr val="dk1"/>
+          </a:fontRef>
+        </p:style>
+        <p:txBody>
+          <a:bodyPr vert="vert" rtlCol="0" anchor="t"/>
+          <a:lstStyle/>
+          <a:p>
+            <a:pPr algn="ctr"/>
+            <a:r>
+              <a:rPr lang="de-DE" sz="1200" dirty="0"/>
+              <a:t>Post </a:t>
+            </a:r>
+            <a:r>
+              <a:rPr lang="de-DE" sz="1200" dirty="0" err="1"/>
+              <a:t>Requests</a:t>
+            </a:r>
+            <a:r>
+              <a:rPr lang="de-DE" sz="1200" dirty="0"/>
+              <a:t> (</a:t>
+            </a:r>
+            <a:r>
+              <a:rPr lang="de-DE" sz="1200" dirty="0" err="1"/>
+              <a:t>async</a:t>
+            </a:r>
+            <a:r>
+              <a:rPr lang="de-DE" sz="1200" dirty="0"/>
+              <a:t> </a:t>
+            </a:r>
+            <a:r>
+              <a:rPr lang="de-DE" sz="1200" dirty="0" err="1"/>
+              <a:t>updates</a:t>
+            </a:r>
+            <a:r>
+              <a:rPr lang="de-DE" sz="1200" dirty="0"/>
+              <a:t>)</a:t>
+            </a:r>
+          </a:p>
+        </p:txBody>
+      </p:sp>
+      <p:sp>
+        <p:nvSpPr>
+          <p:cNvPr id="40" name="Abgerundetes Rechteck 39">
+            <a:extLst>
+              <a:ext uri="{FF2B5EF4-FFF2-40B4-BE49-F238E27FC236}">
+                <a16:creationId xmlns:a16="http://schemas.microsoft.com/office/drawing/2014/main" id="{D6C802E4-FB49-DAA7-1ED4-679E53807D68}"/>
+              </a:ext>
+            </a:extLst>
+          </p:cNvPr>
+          <p:cNvSpPr/>
+          <p:nvPr/>
+        </p:nvSpPr>
+        <p:spPr>
+          <a:xfrm>
+            <a:off x="5759168" y="3309886"/>
+            <a:ext cx="1256708" cy="580171"/>
+          </a:xfrm>
+          <a:prstGeom prst="roundRect">
+            <a:avLst/>
+          </a:prstGeom>
+        </p:spPr>
+        <p:style>
+          <a:lnRef idx="2">
+            <a:schemeClr val="accent6"/>
+          </a:lnRef>
+          <a:fillRef idx="1">
+            <a:schemeClr val="lt1"/>
+          </a:fillRef>
+          <a:effectRef idx="0">
+            <a:schemeClr val="accent6"/>
+          </a:effectRef>
+          <a:fontRef idx="minor">
+            <a:schemeClr val="dk1"/>
+          </a:fontRef>
+        </p:style>
+        <p:txBody>
+          <a:bodyPr rtlCol="0" anchor="ctr"/>
+          <a:lstStyle/>
+          <a:p>
+            <a:r>
+              <a:rPr lang="de-DE" sz="1200" dirty="0"/>
+              <a:t>Token &amp; </a:t>
+            </a:r>
+            <a:r>
+              <a:rPr lang="de-DE" sz="1200" dirty="0" err="1"/>
+              <a:t>Usage</a:t>
+            </a:r>
+            <a:r>
+              <a:rPr lang="de-DE" sz="1200" dirty="0"/>
+              <a:t> </a:t>
+            </a:r>
+            <a:r>
+              <a:rPr lang="de-DE" sz="1200" dirty="0" err="1"/>
+              <a:t>tracking</a:t>
+            </a:r>
+            <a:endParaRPr lang="de-DE" sz="800" dirty="0"/>
+          </a:p>
+        </p:txBody>
+      </p:sp>
+      <p:sp>
+        <p:nvSpPr>
+          <p:cNvPr id="41" name="Abgerundetes Rechteck 40">
+            <a:extLst>
+              <a:ext uri="{FF2B5EF4-FFF2-40B4-BE49-F238E27FC236}">
+                <a16:creationId xmlns:a16="http://schemas.microsoft.com/office/drawing/2014/main" id="{9050511B-CE33-7916-6984-FE7BAABE1928}"/>
+              </a:ext>
+            </a:extLst>
+          </p:cNvPr>
+          <p:cNvSpPr/>
+          <p:nvPr/>
+        </p:nvSpPr>
+        <p:spPr>
+          <a:xfrm>
+            <a:off x="7078241" y="3319706"/>
+            <a:ext cx="1256708" cy="580171"/>
+          </a:xfrm>
+          <a:prstGeom prst="roundRect">
+            <a:avLst/>
+          </a:prstGeom>
+        </p:spPr>
+        <p:style>
+          <a:lnRef idx="2">
+            <a:schemeClr val="accent6"/>
+          </a:lnRef>
+          <a:fillRef idx="1">
+            <a:schemeClr val="lt1"/>
+          </a:fillRef>
+          <a:effectRef idx="0">
+            <a:schemeClr val="accent6"/>
+          </a:effectRef>
+          <a:fontRef idx="minor">
+            <a:schemeClr val="dk1"/>
+          </a:fontRef>
+        </p:style>
+        <p:txBody>
+          <a:bodyPr rtlCol="0" anchor="ctr"/>
+          <a:lstStyle/>
+          <a:p>
+            <a:r>
+              <a:rPr lang="de-DE" sz="1200" dirty="0" err="1"/>
+              <a:t>Logging</a:t>
+            </a:r>
+            <a:endParaRPr lang="de-DE" sz="1200" dirty="0"/>
+          </a:p>
+          <a:p>
+            <a:r>
+              <a:rPr lang="de-DE" sz="1200" dirty="0"/>
+              <a:t>(</a:t>
+            </a:r>
+            <a:r>
+              <a:rPr lang="de-DE" sz="1200" dirty="0" err="1"/>
+              <a:t>langfuse</a:t>
+            </a:r>
+            <a:r>
+              <a:rPr lang="de-DE" sz="1200" dirty="0"/>
+              <a:t> </a:t>
+            </a:r>
+            <a:r>
+              <a:rPr lang="de-DE" sz="1200" dirty="0" err="1"/>
+              <a:t>integration</a:t>
+            </a:r>
+            <a:r>
+              <a:rPr lang="de-DE" sz="1200" dirty="0"/>
+              <a:t>)</a:t>
+            </a:r>
+            <a:endParaRPr lang="de-DE" sz="800" dirty="0"/>
+          </a:p>
+        </p:txBody>
+      </p:sp>
+      <p:sp>
+        <p:nvSpPr>
+          <p:cNvPr id="43" name="Rechteck 42">
+            <a:extLst>
+              <a:ext uri="{FF2B5EF4-FFF2-40B4-BE49-F238E27FC236}">
+                <a16:creationId xmlns:a16="http://schemas.microsoft.com/office/drawing/2014/main" id="{56404238-B9D9-0E5B-225F-48F2E21F4A25}"/>
+              </a:ext>
+            </a:extLst>
+          </p:cNvPr>
+          <p:cNvSpPr/>
+          <p:nvPr/>
+        </p:nvSpPr>
+        <p:spPr>
+          <a:xfrm>
+            <a:off x="523350" y="2176105"/>
+            <a:ext cx="1534632" cy="1555923"/>
+          </a:xfrm>
+          <a:prstGeom prst="rect">
+            <a:avLst/>
+          </a:prstGeom>
+        </p:spPr>
+        <p:style>
+          <a:lnRef idx="2">
+            <a:schemeClr val="accent1">
+              <a:shade val="15000"/>
+            </a:schemeClr>
+          </a:lnRef>
+          <a:fillRef idx="1">
+            <a:schemeClr val="accent1"/>
+          </a:fillRef>
+          <a:effectRef idx="0">
+            <a:schemeClr val="accent1"/>
+          </a:effectRef>
+          <a:fontRef idx="minor">
+            <a:schemeClr val="lt1"/>
+          </a:fontRef>
+        </p:style>
+        <p:txBody>
+          <a:bodyPr rtlCol="0" anchor="ctr"/>
+          <a:lstStyle/>
+          <a:p>
+            <a:pPr algn="ctr"/>
+            <a:r>
+              <a:rPr lang="de-DE" dirty="0"/>
+              <a:t>Client</a:t>
+            </a:r>
+          </a:p>
+        </p:txBody>
+      </p:sp>
+      <p:cxnSp>
+        <p:nvCxnSpPr>
+          <p:cNvPr id="45" name="Gerade Verbindung mit Pfeil 44">
+            <a:extLst>
+              <a:ext uri="{FF2B5EF4-FFF2-40B4-BE49-F238E27FC236}">
+                <a16:creationId xmlns:a16="http://schemas.microsoft.com/office/drawing/2014/main" id="{302203D0-DFF0-E3BF-AD2F-B3A6C378D89D}"/>
+              </a:ext>
+            </a:extLst>
+          </p:cNvPr>
+          <p:cNvCxnSpPr>
+            <a:cxnSpLocks/>
+            <a:endCxn id="22" idx="1"/>
+          </p:cNvCxnSpPr>
+          <p:nvPr/>
+        </p:nvCxnSpPr>
+        <p:spPr>
+          <a:xfrm>
+            <a:off x="2057982" y="2461427"/>
+            <a:ext cx="1756003" cy="0"/>
+          </a:xfrm>
+          <a:prstGeom prst="straightConnector1">
+            <a:avLst/>
+          </a:prstGeom>
+          <a:ln>
+            <a:tailEnd type="triangle"/>
+          </a:ln>
+        </p:spPr>
+        <p:style>
+          <a:lnRef idx="1">
+            <a:schemeClr val="accent6"/>
+          </a:lnRef>
+          <a:fillRef idx="0">
+            <a:schemeClr val="accent6"/>
+          </a:fillRef>
+          <a:effectRef idx="0">
+            <a:schemeClr val="accent6"/>
+          </a:effectRef>
+          <a:fontRef idx="minor">
+            <a:schemeClr val="tx1"/>
+          </a:fontRef>
+        </p:style>
+      </p:cxnSp>
+      <p:sp>
+        <p:nvSpPr>
+          <p:cNvPr id="48" name="Textfeld 47">
+            <a:extLst>
+              <a:ext uri="{FF2B5EF4-FFF2-40B4-BE49-F238E27FC236}">
+                <a16:creationId xmlns:a16="http://schemas.microsoft.com/office/drawing/2014/main" id="{B31ADDFA-CFD9-5783-52C3-6FB591084045}"/>
+              </a:ext>
+            </a:extLst>
+          </p:cNvPr>
+          <p:cNvSpPr txBox="1"/>
+          <p:nvPr/>
+        </p:nvSpPr>
+        <p:spPr>
+          <a:xfrm>
+            <a:off x="397627" y="6089007"/>
+            <a:ext cx="4520468" cy="369332"/>
+          </a:xfrm>
+          <a:prstGeom prst="rect">
+            <a:avLst/>
+          </a:prstGeom>
+          <a:noFill/>
+        </p:spPr>
+        <p:txBody>
+          <a:bodyPr wrap="none" rtlCol="0">
+            <a:spAutoFit/>
+          </a:bodyPr>
+          <a:lstStyle/>
+          <a:p>
+            <a:r>
+              <a:rPr lang="de-DE" dirty="0"/>
+              <a:t>In Anlehnung an </a:t>
+            </a:r>
+            <a:r>
+              <a:rPr lang="de-DE" dirty="0" err="1"/>
+              <a:t>LiteLLM.proxy</a:t>
+            </a:r>
+            <a:r>
+              <a:rPr lang="de-DE" dirty="0"/>
+              <a:t> Architektur</a:t>
+            </a:r>
+          </a:p>
+        </p:txBody>
+      </p:sp>
+      <p:sp>
+        <p:nvSpPr>
+          <p:cNvPr id="49" name="Zylinder 48">
+            <a:extLst>
+              <a:ext uri="{FF2B5EF4-FFF2-40B4-BE49-F238E27FC236}">
+                <a16:creationId xmlns:a16="http://schemas.microsoft.com/office/drawing/2014/main" id="{55BB0E58-0765-EFA2-DBC0-999F7B07DCC5}"/>
+              </a:ext>
+            </a:extLst>
+          </p:cNvPr>
+          <p:cNvSpPr/>
+          <p:nvPr/>
+        </p:nvSpPr>
+        <p:spPr>
+          <a:xfrm>
+            <a:off x="5664569" y="4374042"/>
+            <a:ext cx="1534631" cy="1216152"/>
+          </a:xfrm>
+          <a:prstGeom prst="can">
+            <a:avLst/>
+          </a:prstGeom>
+        </p:spPr>
+        <p:style>
+          <a:lnRef idx="2">
+            <a:schemeClr val="accent1">
+              <a:shade val="15000"/>
+            </a:schemeClr>
+          </a:lnRef>
+          <a:fillRef idx="1">
+            <a:schemeClr val="accent1"/>
+          </a:fillRef>
+          <a:effectRef idx="0">
+            <a:schemeClr val="accent1"/>
+          </a:effectRef>
+          <a:fontRef idx="minor">
+            <a:schemeClr val="lt1"/>
+          </a:fontRef>
+        </p:style>
+        <p:txBody>
+          <a:bodyPr rtlCol="0" anchor="ctr"/>
+          <a:lstStyle/>
+          <a:p>
+            <a:pPr algn="ctr"/>
+            <a:r>
+              <a:rPr lang="de-DE" dirty="0"/>
+              <a:t>Model Registry</a:t>
+            </a:r>
+          </a:p>
+        </p:txBody>
+      </p:sp>
+      <p:sp>
+        <p:nvSpPr>
+          <p:cNvPr id="50" name="Abgerundetes Rechteck 49">
+            <a:extLst>
+              <a:ext uri="{FF2B5EF4-FFF2-40B4-BE49-F238E27FC236}">
+                <a16:creationId xmlns:a16="http://schemas.microsoft.com/office/drawing/2014/main" id="{CDC12B9F-B551-FF58-FE65-6DB30A25C289}"/>
+              </a:ext>
+            </a:extLst>
+          </p:cNvPr>
+          <p:cNvSpPr/>
+          <p:nvPr/>
+        </p:nvSpPr>
+        <p:spPr>
+          <a:xfrm>
+            <a:off x="4351993" y="3303728"/>
+            <a:ext cx="1256708" cy="580171"/>
+          </a:xfrm>
+          <a:prstGeom prst="roundRect">
+            <a:avLst/>
+          </a:prstGeom>
+        </p:spPr>
+        <p:style>
+          <a:lnRef idx="2">
+            <a:schemeClr val="accent6"/>
+          </a:lnRef>
+          <a:fillRef idx="1">
+            <a:schemeClr val="lt1"/>
+          </a:fillRef>
+          <a:effectRef idx="0">
+            <a:schemeClr val="accent6"/>
+          </a:effectRef>
+          <a:fontRef idx="minor">
+            <a:schemeClr val="dk1"/>
+          </a:fontRef>
+        </p:style>
+        <p:txBody>
+          <a:bodyPr rtlCol="0" anchor="ctr"/>
+          <a:lstStyle/>
+          <a:p>
+            <a:r>
+              <a:rPr lang="de-DE" sz="1200" dirty="0" err="1"/>
+              <a:t>Guardrails</a:t>
+            </a:r>
+            <a:endParaRPr lang="de-DE" sz="800" dirty="0"/>
+          </a:p>
+        </p:txBody>
+      </p:sp>
+      <p:cxnSp>
+        <p:nvCxnSpPr>
+          <p:cNvPr id="52" name="Gerade Verbindung mit Pfeil 51">
+            <a:extLst>
+              <a:ext uri="{FF2B5EF4-FFF2-40B4-BE49-F238E27FC236}">
+                <a16:creationId xmlns:a16="http://schemas.microsoft.com/office/drawing/2014/main" id="{ED45F491-D47A-5BAE-4C22-7F20CDCFABBF}"/>
+              </a:ext>
+            </a:extLst>
+          </p:cNvPr>
+          <p:cNvCxnSpPr>
+            <a:cxnSpLocks/>
+            <a:stCxn id="25" idx="2"/>
+          </p:cNvCxnSpPr>
+          <p:nvPr/>
+        </p:nvCxnSpPr>
+        <p:spPr>
+          <a:xfrm flipH="1">
+            <a:off x="8145520" y="2751509"/>
+            <a:ext cx="1" cy="215903"/>
+          </a:xfrm>
+          <a:prstGeom prst="straightConnector1">
+            <a:avLst/>
+          </a:prstGeom>
+          <a:ln>
+            <a:tailEnd type="triangle"/>
+          </a:ln>
+        </p:spPr>
+        <p:style>
+          <a:lnRef idx="1">
+            <a:schemeClr val="accent6"/>
+          </a:lnRef>
+          <a:fillRef idx="0">
+            <a:schemeClr val="accent6"/>
+          </a:fillRef>
+          <a:effectRef idx="0">
+            <a:schemeClr val="accent6"/>
+          </a:effectRef>
+          <a:fontRef idx="minor">
+            <a:schemeClr val="tx1"/>
+          </a:fontRef>
+        </p:style>
+      </p:cxnSp>
+      <p:cxnSp>
+        <p:nvCxnSpPr>
+          <p:cNvPr id="55" name="Gerade Verbindung mit Pfeil 54">
+            <a:extLst>
+              <a:ext uri="{FF2B5EF4-FFF2-40B4-BE49-F238E27FC236}">
+                <a16:creationId xmlns:a16="http://schemas.microsoft.com/office/drawing/2014/main" id="{165EF593-BAC9-9AE0-E832-12DF48335EAC}"/>
+              </a:ext>
+            </a:extLst>
+          </p:cNvPr>
+          <p:cNvCxnSpPr>
+            <a:stCxn id="35" idx="1"/>
+          </p:cNvCxnSpPr>
+          <p:nvPr/>
+        </p:nvCxnSpPr>
+        <p:spPr>
+          <a:xfrm flipH="1" flipV="1">
+            <a:off x="2057982" y="3476054"/>
+            <a:ext cx="1731586" cy="1"/>
+          </a:xfrm>
+          <a:prstGeom prst="straightConnector1">
+            <a:avLst/>
+          </a:prstGeom>
+          <a:ln>
+            <a:tailEnd type="triangle"/>
+          </a:ln>
+        </p:spPr>
+        <p:style>
+          <a:lnRef idx="1">
+            <a:schemeClr val="accent6"/>
+          </a:lnRef>
+          <a:fillRef idx="0">
+            <a:schemeClr val="accent6"/>
+          </a:fillRef>
+          <a:effectRef idx="0">
+            <a:schemeClr val="accent6"/>
+          </a:effectRef>
+          <a:fontRef idx="minor">
+            <a:schemeClr val="tx1"/>
+          </a:fontRef>
+        </p:style>
+      </p:cxnSp>
+      <p:cxnSp>
+        <p:nvCxnSpPr>
+          <p:cNvPr id="60" name="Gerade Verbindung mit Pfeil 59">
+            <a:extLst>
+              <a:ext uri="{FF2B5EF4-FFF2-40B4-BE49-F238E27FC236}">
+                <a16:creationId xmlns:a16="http://schemas.microsoft.com/office/drawing/2014/main" id="{87DBA12C-145F-0EE9-B3FF-C5D28B60DA8F}"/>
+              </a:ext>
+            </a:extLst>
+          </p:cNvPr>
+          <p:cNvCxnSpPr>
+            <a:stCxn id="22" idx="3"/>
+            <a:endCxn id="25" idx="1"/>
+          </p:cNvCxnSpPr>
+          <p:nvPr/>
+        </p:nvCxnSpPr>
+        <p:spPr>
+          <a:xfrm flipV="1">
+            <a:off x="4797645" y="2461424"/>
+            <a:ext cx="2675359" cy="3"/>
+          </a:xfrm>
+          <a:prstGeom prst="straightConnector1">
+            <a:avLst/>
+          </a:prstGeom>
+          <a:ln>
+            <a:tailEnd type="triangle"/>
+          </a:ln>
+        </p:spPr>
+        <p:style>
+          <a:lnRef idx="1">
+            <a:schemeClr val="accent6"/>
+          </a:lnRef>
+          <a:fillRef idx="0">
+            <a:schemeClr val="accent6"/>
+          </a:fillRef>
+          <a:effectRef idx="0">
+            <a:schemeClr val="accent6"/>
+          </a:effectRef>
+          <a:fontRef idx="minor">
+            <a:schemeClr val="tx1"/>
+          </a:fontRef>
+        </p:style>
+      </p:cxnSp>
+      <p:sp>
+        <p:nvSpPr>
+          <p:cNvPr id="23" name="Abgerundetes Rechteck 22">
+            <a:extLst>
+              <a:ext uri="{FF2B5EF4-FFF2-40B4-BE49-F238E27FC236}">
+                <a16:creationId xmlns:a16="http://schemas.microsoft.com/office/drawing/2014/main" id="{10A9674F-D4C8-EF44-143C-58DE7412E80D}"/>
+              </a:ext>
+            </a:extLst>
+          </p:cNvPr>
+          <p:cNvSpPr/>
+          <p:nvPr/>
+        </p:nvSpPr>
+        <p:spPr>
+          <a:xfrm>
+            <a:off x="4913201" y="2171340"/>
+            <a:ext cx="983660" cy="580171"/>
+          </a:xfrm>
+          <a:prstGeom prst="roundRect">
+            <a:avLst/>
+          </a:prstGeom>
+        </p:spPr>
+        <p:style>
+          <a:lnRef idx="2">
+            <a:schemeClr val="accent6"/>
+          </a:lnRef>
+          <a:fillRef idx="1">
+            <a:schemeClr val="lt1"/>
+          </a:fillRef>
+          <a:effectRef idx="0">
+            <a:schemeClr val="accent6"/>
+          </a:effectRef>
+          <a:fontRef idx="minor">
+            <a:schemeClr val="dk1"/>
+          </a:fontRef>
+        </p:style>
+        <p:txBody>
+          <a:bodyPr rtlCol="0" anchor="ctr"/>
+          <a:lstStyle/>
+          <a:p>
+            <a:pPr algn="ctr"/>
+            <a:r>
+              <a:rPr lang="de-DE" sz="1200" dirty="0"/>
+              <a:t>check rate </a:t>
+            </a:r>
+            <a:r>
+              <a:rPr lang="de-DE" sz="1200" dirty="0" err="1"/>
+              <a:t>limit</a:t>
+            </a:r>
+            <a:endParaRPr lang="de-DE" sz="1200" dirty="0"/>
+          </a:p>
+        </p:txBody>
+      </p:sp>
+      <p:sp>
+        <p:nvSpPr>
+          <p:cNvPr id="24" name="Abgerundetes Rechteck 23">
+            <a:extLst>
+              <a:ext uri="{FF2B5EF4-FFF2-40B4-BE49-F238E27FC236}">
+                <a16:creationId xmlns:a16="http://schemas.microsoft.com/office/drawing/2014/main" id="{8254989A-15C6-7F0F-13DA-AFA52B4053B2}"/>
+              </a:ext>
+            </a:extLst>
+          </p:cNvPr>
+          <p:cNvSpPr/>
+          <p:nvPr/>
+        </p:nvSpPr>
+        <p:spPr>
+          <a:xfrm>
+            <a:off x="6012416" y="2171339"/>
+            <a:ext cx="1345033" cy="580171"/>
+          </a:xfrm>
+          <a:prstGeom prst="roundRect">
+            <a:avLst/>
+          </a:prstGeom>
+        </p:spPr>
+        <p:style>
+          <a:lnRef idx="2">
+            <a:schemeClr val="accent6"/>
+          </a:lnRef>
+          <a:fillRef idx="1">
+            <a:schemeClr val="lt1"/>
+          </a:fillRef>
+          <a:effectRef idx="0">
+            <a:schemeClr val="accent6"/>
+          </a:effectRef>
+          <a:fontRef idx="minor">
+            <a:schemeClr val="dk1"/>
+          </a:fontRef>
+        </p:style>
+        <p:txBody>
+          <a:bodyPr rtlCol="0" anchor="ctr"/>
+          <a:lstStyle/>
+          <a:p>
+            <a:r>
+              <a:rPr lang="de-DE" sz="1200" dirty="0"/>
+              <a:t>Handle</a:t>
+            </a:r>
+            <a:br>
+              <a:rPr lang="de-DE" sz="1200" dirty="0"/>
+            </a:br>
+            <a:r>
+              <a:rPr lang="de-DE" sz="800" dirty="0"/>
+              <a:t>/v1/</a:t>
+            </a:r>
+            <a:r>
+              <a:rPr lang="de-DE" sz="800" dirty="0" err="1"/>
+              <a:t>chat</a:t>
+            </a:r>
+            <a:r>
+              <a:rPr lang="de-DE" sz="800" dirty="0"/>
+              <a:t>/</a:t>
+            </a:r>
+            <a:r>
+              <a:rPr lang="de-DE" sz="800" dirty="0" err="1"/>
+              <a:t>completions</a:t>
+            </a:r>
+            <a:endParaRPr lang="de-DE" sz="800" dirty="0"/>
+          </a:p>
+          <a:p>
+            <a:r>
+              <a:rPr lang="de-DE" sz="800" dirty="0"/>
+              <a:t>/v1/</a:t>
+            </a:r>
+            <a:r>
+              <a:rPr lang="de-DE" sz="800" dirty="0" err="1"/>
+              <a:t>embeddings</a:t>
+            </a:r>
+            <a:endParaRPr lang="de-DE" sz="800" dirty="0"/>
+          </a:p>
+        </p:txBody>
+      </p:sp>
+      <p:sp>
+        <p:nvSpPr>
+          <p:cNvPr id="5" name="Rechteck 4">
+            <a:extLst>
+              <a:ext uri="{FF2B5EF4-FFF2-40B4-BE49-F238E27FC236}">
+                <a16:creationId xmlns:a16="http://schemas.microsoft.com/office/drawing/2014/main" id="{686960DB-31E6-22C2-9F54-63F342F85476}"/>
+              </a:ext>
+            </a:extLst>
+          </p:cNvPr>
+          <p:cNvSpPr/>
+          <p:nvPr/>
+        </p:nvSpPr>
+        <p:spPr>
+          <a:xfrm>
+            <a:off x="3062176" y="1790885"/>
+            <a:ext cx="397095" cy="2298026"/>
+          </a:xfrm>
+          <a:prstGeom prst="rect">
+            <a:avLst/>
+          </a:prstGeom>
+        </p:spPr>
+        <p:style>
+          <a:lnRef idx="2">
+            <a:schemeClr val="accent1">
+              <a:shade val="15000"/>
+            </a:schemeClr>
+          </a:lnRef>
+          <a:fillRef idx="1">
+            <a:schemeClr val="accent1"/>
+          </a:fillRef>
+          <a:effectRef idx="0">
+            <a:schemeClr val="accent1"/>
+          </a:effectRef>
+          <a:fontRef idx="minor">
+            <a:schemeClr val="lt1"/>
+          </a:fontRef>
+        </p:style>
+        <p:txBody>
+          <a:bodyPr vert="vert270" rtlCol="0" anchor="ctr"/>
+          <a:lstStyle/>
+          <a:p>
+            <a:pPr algn="ctr"/>
+            <a:r>
+              <a:rPr lang="de-DE" dirty="0" err="1"/>
+              <a:t>OpenAI</a:t>
+            </a:r>
+            <a:r>
+              <a:rPr lang="de-DE" dirty="0"/>
+              <a:t> API</a:t>
+            </a:r>
+          </a:p>
+        </p:txBody>
+      </p:sp>
+    </p:spTree>
+    <p:extLst>
+      <p:ext uri="{BB962C8B-B14F-4D97-AF65-F5344CB8AC3E}">
+        <p14:creationId xmlns:p14="http://schemas.microsoft.com/office/powerpoint/2010/main" val="1666102649"/>
+      </p:ext>
+    </p:extLst>
+  </p:cSld>
+  <p:clrMapOvr>
+    <a:masterClrMapping/>
+  </p:clrMapOvr>
+</p:sld>
+</file>
+
+<file path=ppt/slides/slide9.xml><?xml version="1.0" encoding="utf-8"?>
+<p:sld xmlns:a="http://schemas.openxmlformats.org/drawingml/2006/main" xmlns:r="http://schemas.openxmlformats.org/officeDocument/2006/relationships" xmlns:p="http://schemas.openxmlformats.org/presentationml/2006/main">
+  <p:cSld>
+    <p:spTree>
+      <p:nvGrpSpPr>
+        <p:cNvPr id="1" name="">
+          <a:extLst>
+            <a:ext uri="{FF2B5EF4-FFF2-40B4-BE49-F238E27FC236}">
               <a16:creationId xmlns:a16="http://schemas.microsoft.com/office/drawing/2014/main" id="{C5AA740A-B22E-267E-685E-57A569EAA693}"/>
             </a:ext>
           </a:extLst>
@@ -6218,6 +7909,196 @@
       </p:grpSpPr>
       <p:sp>
         <p:nvSpPr>
+          <p:cNvPr id="79" name="Rechteck 78">
+            <a:extLst>
+              <a:ext uri="{FF2B5EF4-FFF2-40B4-BE49-F238E27FC236}">
+                <a16:creationId xmlns:a16="http://schemas.microsoft.com/office/drawing/2014/main" id="{4B3E0AAE-2699-86BB-A4EC-67E30A66A1AA}"/>
+              </a:ext>
+            </a:extLst>
+          </p:cNvPr>
+          <p:cNvSpPr/>
+          <p:nvPr/>
+        </p:nvSpPr>
+        <p:spPr>
+          <a:xfrm>
+            <a:off x="7556204" y="276512"/>
+            <a:ext cx="1713693" cy="5979206"/>
+          </a:xfrm>
+          <a:prstGeom prst="rect">
+            <a:avLst/>
+          </a:prstGeom>
+          <a:solidFill>
+            <a:schemeClr val="accent3">
+              <a:lumMod val="40000"/>
+              <a:lumOff val="60000"/>
+              <a:alpha val="10870"/>
+            </a:schemeClr>
+          </a:solidFill>
+          <a:ln w="9525" cap="flat" cmpd="sng" algn="ctr">
+            <a:solidFill>
+              <a:schemeClr val="accent2"/>
+            </a:solidFill>
+            <a:prstDash val="solid"/>
+            <a:round/>
+            <a:headEnd type="none" w="med" len="med"/>
+            <a:tailEnd type="none" w="med" len="med"/>
+          </a:ln>
+        </p:spPr>
+        <p:style>
+          <a:lnRef idx="0">
+            <a:scrgbClr r="0" g="0" b="0"/>
+          </a:lnRef>
+          <a:fillRef idx="0">
+            <a:scrgbClr r="0" g="0" b="0"/>
+          </a:fillRef>
+          <a:effectRef idx="0">
+            <a:scrgbClr r="0" g="0" b="0"/>
+          </a:effectRef>
+          <a:fontRef idx="minor">
+            <a:schemeClr val="accent2"/>
+          </a:fontRef>
+        </p:style>
+        <p:txBody>
+          <a:bodyPr rtlCol="0" anchor="t"/>
+          <a:lstStyle/>
+          <a:p>
+            <a:pPr algn="ctr"/>
+            <a:endParaRPr lang="de-DE" dirty="0"/>
+          </a:p>
+        </p:txBody>
+      </p:sp>
+      <p:sp>
+        <p:nvSpPr>
+          <p:cNvPr id="63" name="Rechteck 62">
+            <a:extLst>
+              <a:ext uri="{FF2B5EF4-FFF2-40B4-BE49-F238E27FC236}">
+                <a16:creationId xmlns:a16="http://schemas.microsoft.com/office/drawing/2014/main" id="{F385F5DB-B773-29B1-44C4-F6936739CFD2}"/>
+              </a:ext>
+            </a:extLst>
+          </p:cNvPr>
+          <p:cNvSpPr/>
+          <p:nvPr/>
+        </p:nvSpPr>
+        <p:spPr>
+          <a:xfrm>
+            <a:off x="2780825" y="3514752"/>
+            <a:ext cx="4692180" cy="2766615"/>
+          </a:xfrm>
+          <a:prstGeom prst="rect">
+            <a:avLst/>
+          </a:prstGeom>
+          <a:solidFill>
+            <a:schemeClr val="accent1">
+              <a:lumMod val="20000"/>
+              <a:lumOff val="80000"/>
+              <a:alpha val="10870"/>
+            </a:schemeClr>
+          </a:solidFill>
+          <a:ln w="9525" cap="flat" cmpd="sng" algn="ctr">
+            <a:solidFill>
+              <a:schemeClr val="accent2"/>
+            </a:solidFill>
+            <a:prstDash val="solid"/>
+            <a:round/>
+            <a:headEnd type="none" w="med" len="med"/>
+            <a:tailEnd type="none" w="med" len="med"/>
+          </a:ln>
+        </p:spPr>
+        <p:style>
+          <a:lnRef idx="0">
+            <a:scrgbClr r="0" g="0" b="0"/>
+          </a:lnRef>
+          <a:fillRef idx="0">
+            <a:scrgbClr r="0" g="0" b="0"/>
+          </a:fillRef>
+          <a:effectRef idx="0">
+            <a:scrgbClr r="0" g="0" b="0"/>
+          </a:effectRef>
+          <a:fontRef idx="minor">
+            <a:schemeClr val="accent2"/>
+          </a:fontRef>
+        </p:style>
+        <p:txBody>
+          <a:bodyPr rtlCol="0" anchor="b"/>
+          <a:lstStyle/>
+          <a:p>
+            <a:pPr algn="r"/>
+            <a:r>
+              <a:rPr lang="de-DE" dirty="0" err="1"/>
+              <a:t>Managed</a:t>
+            </a:r>
+            <a:r>
+              <a:rPr lang="de-DE" dirty="0"/>
+              <a:t> PostgreSQL</a:t>
+            </a:r>
+          </a:p>
+        </p:txBody>
+      </p:sp>
+      <p:sp>
+        <p:nvSpPr>
+          <p:cNvPr id="68" name="Rechteck 67">
+            <a:extLst>
+              <a:ext uri="{FF2B5EF4-FFF2-40B4-BE49-F238E27FC236}">
+                <a16:creationId xmlns:a16="http://schemas.microsoft.com/office/drawing/2014/main" id="{0CB8904B-0BD5-8C40-47C5-01585EECF6D0}"/>
+              </a:ext>
+            </a:extLst>
+          </p:cNvPr>
+          <p:cNvSpPr/>
+          <p:nvPr/>
+        </p:nvSpPr>
+        <p:spPr>
+          <a:xfrm>
+            <a:off x="9324877" y="2693042"/>
+            <a:ext cx="2758471" cy="3588325"/>
+          </a:xfrm>
+          <a:prstGeom prst="rect">
+            <a:avLst/>
+          </a:prstGeom>
+          <a:solidFill>
+            <a:schemeClr val="accent5">
+              <a:lumMod val="40000"/>
+              <a:lumOff val="60000"/>
+              <a:alpha val="10870"/>
+            </a:schemeClr>
+          </a:solidFill>
+          <a:ln w="9525" cap="flat" cmpd="sng" algn="ctr">
+            <a:solidFill>
+              <a:schemeClr val="accent2"/>
+            </a:solidFill>
+            <a:prstDash val="solid"/>
+            <a:round/>
+            <a:headEnd type="none" w="med" len="med"/>
+            <a:tailEnd type="none" w="med" len="med"/>
+          </a:ln>
+        </p:spPr>
+        <p:style>
+          <a:lnRef idx="0">
+            <a:scrgbClr r="0" g="0" b="0"/>
+          </a:lnRef>
+          <a:fillRef idx="0">
+            <a:scrgbClr r="0" g="0" b="0"/>
+          </a:fillRef>
+          <a:effectRef idx="0">
+            <a:scrgbClr r="0" g="0" b="0"/>
+          </a:effectRef>
+          <a:fontRef idx="minor">
+            <a:schemeClr val="accent2"/>
+          </a:fontRef>
+        </p:style>
+        <p:txBody>
+          <a:bodyPr rtlCol="0" anchor="b"/>
+          <a:lstStyle/>
+          <a:p>
+            <a:pPr algn="ctr"/>
+            <a:r>
+              <a:rPr lang="de-DE" dirty="0"/>
+              <a:t>S3 Storage</a:t>
+            </a:r>
+          </a:p>
+        </p:txBody>
+      </p:sp>
+      <p:sp>
+        <p:nvSpPr>
           <p:cNvPr id="2" name="Textfeld 1">
             <a:extLst>
               <a:ext uri="{FF2B5EF4-FFF2-40B4-BE49-F238E27FC236}">
@@ -6230,7 +8111,7 @@
         </p:nvSpPr>
         <p:spPr>
           <a:xfrm>
-            <a:off x="10434468" y="6127161"/>
+            <a:off x="67883" y="546173"/>
             <a:ext cx="1550746" cy="369332"/>
           </a:xfrm>
           <a:prstGeom prst="rect">
@@ -6265,7 +8146,7 @@
         </p:nvSpPr>
         <p:spPr>
           <a:xfrm>
-            <a:off x="3664835" y="1790885"/>
+            <a:off x="3664835" y="1110399"/>
             <a:ext cx="1534632" cy="2298026"/>
           </a:xfrm>
           <a:prstGeom prst="rect">
@@ -6314,7 +8195,7 @@
         </p:nvSpPr>
         <p:spPr>
           <a:xfrm>
-            <a:off x="9454929" y="1771920"/>
+            <a:off x="9454929" y="1091434"/>
             <a:ext cx="1534632" cy="619703"/>
           </a:xfrm>
           <a:prstGeom prst="rect">
@@ -6367,7 +8248,7 @@
         </p:nvCxnSpPr>
         <p:spPr>
           <a:xfrm flipH="1">
-            <a:off x="3459271" y="2939898"/>
+            <a:off x="3459271" y="2259412"/>
             <a:ext cx="205564" cy="0"/>
           </a:xfrm>
           <a:prstGeom prst="line">
@@ -6403,7 +8284,7 @@
         </p:nvSpPr>
         <p:spPr>
           <a:xfrm>
-            <a:off x="3664835" y="4378507"/>
+            <a:off x="3664835" y="3698021"/>
             <a:ext cx="1534631" cy="1216152"/>
           </a:xfrm>
           <a:prstGeom prst="can">
@@ -6460,7 +8341,7 @@
         </p:nvCxnSpPr>
         <p:spPr>
           <a:xfrm>
-            <a:off x="4432151" y="4088911"/>
+            <a:off x="4432151" y="3408425"/>
             <a:ext cx="0" cy="289596"/>
           </a:xfrm>
           <a:prstGeom prst="line">
@@ -6496,7 +8377,7 @@
         </p:nvSpPr>
         <p:spPr>
           <a:xfrm>
-            <a:off x="2910806" y="1316623"/>
+            <a:off x="69198" y="176841"/>
             <a:ext cx="2650021" cy="369332"/>
           </a:xfrm>
           <a:prstGeom prst="rect">
@@ -6539,8 +8420,8 @@
         </p:nvSpPr>
         <p:spPr>
           <a:xfrm>
-            <a:off x="1381487" y="4428120"/>
-            <a:ext cx="2357184" cy="2031325"/>
+            <a:off x="3597016" y="4838456"/>
+            <a:ext cx="1682512" cy="1754326"/>
           </a:xfrm>
           <a:prstGeom prst="rect">
             <a:avLst/>
@@ -6613,29 +8494,6 @@
             <a:r>
               <a:rPr lang="de-DE" dirty="0" err="1"/>
               <a:t>budgets</a:t>
-            </a:r>
-            <a:r>
-              <a:rPr lang="de-DE" dirty="0"/>
-              <a:t> </a:t>
-            </a:r>
-            <a:br>
-              <a:rPr lang="de-DE" dirty="0"/>
-            </a:br>
-            <a:r>
-              <a:rPr lang="de-DE" dirty="0"/>
-              <a:t>per virtual </a:t>
-            </a:r>
-            <a:r>
-              <a:rPr lang="de-DE" dirty="0" err="1"/>
-              <a:t>key</a:t>
-            </a:r>
-            <a:r>
-              <a:rPr lang="de-DE" dirty="0"/>
-              <a:t>/</a:t>
-            </a:r>
-            <a:r>
-              <a:rPr lang="de-DE" dirty="0" err="1"/>
-              <a:t>user</a:t>
             </a:r>
             <a:endParaRPr lang="de-DE" dirty="0"/>
           </a:p>
@@ -6665,7 +8523,7 @@
         </p:nvSpPr>
         <p:spPr>
           <a:xfrm>
-            <a:off x="9454929" y="2549804"/>
+            <a:off x="9454929" y="1869318"/>
             <a:ext cx="1534632" cy="580889"/>
           </a:xfrm>
           <a:prstGeom prst="rect">
@@ -6715,8 +8573,8 @@
         </p:nvSpPr>
         <p:spPr>
           <a:xfrm>
-            <a:off x="7224869" y="4441202"/>
-            <a:ext cx="1911614" cy="923330"/>
+            <a:off x="5561390" y="4859262"/>
+            <a:ext cx="1911614" cy="646331"/>
           </a:xfrm>
           <a:prstGeom prst="rect">
             <a:avLst/>
@@ -6766,9 +8624,6 @@
             </a:r>
             <a:endParaRPr lang="de-DE" dirty="0"/>
           </a:p>
-          <a:p>
-            <a:endParaRPr lang="de-DE" dirty="0"/>
-          </a:p>
         </p:txBody>
       </p:sp>
       <p:sp>
@@ -6785,7 +8640,7 @@
         </p:nvSpPr>
         <p:spPr>
           <a:xfrm>
-            <a:off x="5631711" y="1790885"/>
+            <a:off x="5631711" y="1110399"/>
             <a:ext cx="1534632" cy="2298026"/>
           </a:xfrm>
           <a:prstGeom prst="rect">
@@ -6837,7 +8692,7 @@
         </p:nvCxnSpPr>
         <p:spPr>
           <a:xfrm flipH="1">
-            <a:off x="6395483" y="4088911"/>
+            <a:off x="6395483" y="3408425"/>
             <a:ext cx="3544" cy="440472"/>
           </a:xfrm>
           <a:prstGeom prst="line">
@@ -6873,7 +8728,7 @@
         </p:nvSpPr>
         <p:spPr>
           <a:xfrm>
-            <a:off x="3664835" y="1790885"/>
+            <a:off x="3664835" y="1110399"/>
             <a:ext cx="5309044" cy="2298023"/>
           </a:xfrm>
           <a:prstGeom prst="rect">
@@ -6919,7 +8774,7 @@
         </p:nvSpPr>
         <p:spPr>
           <a:xfrm>
-            <a:off x="3813985" y="2171341"/>
+            <a:off x="3813985" y="1490855"/>
             <a:ext cx="983660" cy="580171"/>
           </a:xfrm>
           <a:prstGeom prst="roundRect">
@@ -6982,7 +8837,7 @@
         </p:nvSpPr>
         <p:spPr>
           <a:xfrm>
-            <a:off x="7473004" y="2171338"/>
+            <a:off x="7473004" y="1490852"/>
             <a:ext cx="1345033" cy="580171"/>
           </a:xfrm>
           <a:prstGeom prst="roundRect">
@@ -7063,7 +8918,7 @@
         </p:nvCxnSpPr>
         <p:spPr>
           <a:xfrm flipV="1">
-            <a:off x="8818037" y="2081772"/>
+            <a:off x="8818037" y="1401286"/>
             <a:ext cx="636892" cy="379652"/>
           </a:xfrm>
           <a:prstGeom prst="bentConnector3">
@@ -7107,7 +8962,7 @@
         </p:nvCxnSpPr>
         <p:spPr>
           <a:xfrm>
-            <a:off x="8818037" y="2461424"/>
+            <a:off x="8818037" y="1780938"/>
             <a:ext cx="636892" cy="378825"/>
           </a:xfrm>
           <a:prstGeom prst="bentConnector3">
@@ -7147,7 +9002,7 @@
         </p:nvSpPr>
         <p:spPr>
           <a:xfrm rot="16200000">
-            <a:off x="5669983" y="1073857"/>
+            <a:off x="5669983" y="393371"/>
             <a:ext cx="1043564" cy="4804395"/>
           </a:xfrm>
           <a:prstGeom prst="can">
@@ -7218,7 +9073,7 @@
         </p:nvSpPr>
         <p:spPr>
           <a:xfrm>
-            <a:off x="5759168" y="3309886"/>
+            <a:off x="5759168" y="2629400"/>
             <a:ext cx="1256708" cy="580171"/>
           </a:xfrm>
           <a:prstGeom prst="roundRect">
@@ -7277,7 +9132,7 @@
         </p:nvSpPr>
         <p:spPr>
           <a:xfrm>
-            <a:off x="7078241" y="3319706"/>
+            <a:off x="7078241" y="2639220"/>
             <a:ext cx="1256708" cy="580171"/>
           </a:xfrm>
           <a:prstGeom prst="roundRect">
@@ -7347,7 +9202,7 @@
         </p:nvSpPr>
         <p:spPr>
           <a:xfrm>
-            <a:off x="523350" y="2176105"/>
+            <a:off x="481315" y="1508964"/>
             <a:ext cx="1534632" cy="1555923"/>
           </a:xfrm>
           <a:prstGeom prst="rect">
@@ -7380,6 +9235,13 @@
               <a:t>Client</a:t>
             </a:r>
           </a:p>
+          <a:p>
+            <a:pPr algn="ctr"/>
+            <a:r>
+              <a:rPr lang="de-DE" dirty="0"/>
+              <a:t>(Chat, RAG)</a:t>
+            </a:r>
+          </a:p>
         </p:txBody>
       </p:sp>
       <p:cxnSp>
@@ -7399,7 +9261,7 @@
         </p:nvCxnSpPr>
         <p:spPr>
           <a:xfrm>
-            <a:off x="2057982" y="2461427"/>
+            <a:off x="2057982" y="1780941"/>
             <a:ext cx="1756003" cy="0"/>
           </a:xfrm>
           <a:prstGeom prst="straightConnector1">
@@ -7438,7 +9300,7 @@
         </p:nvSpPr>
         <p:spPr>
           <a:xfrm>
-            <a:off x="397627" y="6089007"/>
+            <a:off x="71928" y="6396823"/>
             <a:ext cx="4520468" cy="369332"/>
           </a:xfrm>
           <a:prstGeom prst="rect">
@@ -7481,7 +9343,7 @@
         </p:nvSpPr>
         <p:spPr>
           <a:xfrm>
-            <a:off x="5664569" y="4374042"/>
+            <a:off x="5664569" y="3693556"/>
             <a:ext cx="1534631" cy="1216152"/>
           </a:xfrm>
           <a:prstGeom prst="can">
@@ -7530,7 +9392,7 @@
         </p:nvSpPr>
         <p:spPr>
           <a:xfrm>
-            <a:off x="4351993" y="3303728"/>
+            <a:off x="4351993" y="2623242"/>
             <a:ext cx="1256708" cy="580171"/>
           </a:xfrm>
           <a:prstGeom prst="roundRect">
@@ -7580,7 +9442,7 @@
         </p:nvCxnSpPr>
         <p:spPr>
           <a:xfrm flipH="1">
-            <a:off x="8145520" y="2751509"/>
+            <a:off x="8145520" y="2071023"/>
             <a:ext cx="1" cy="215903"/>
           </a:xfrm>
           <a:prstGeom prst="straightConnector1">
@@ -7621,7 +9483,7 @@
         </p:nvCxnSpPr>
         <p:spPr>
           <a:xfrm flipH="1" flipV="1">
-            <a:off x="2057982" y="3476054"/>
+            <a:off x="2057982" y="2795568"/>
             <a:ext cx="1731586" cy="1"/>
           </a:xfrm>
           <a:prstGeom prst="straightConnector1">
@@ -7663,7 +9525,7 @@
         </p:nvCxnSpPr>
         <p:spPr>
           <a:xfrm flipV="1">
-            <a:off x="4797645" y="2461424"/>
+            <a:off x="4797645" y="1780938"/>
             <a:ext cx="2675359" cy="3"/>
           </a:xfrm>
           <a:prstGeom prst="straightConnector1">
@@ -7702,7 +9564,7 @@
         </p:nvSpPr>
         <p:spPr>
           <a:xfrm>
-            <a:off x="4913201" y="2171340"/>
+            <a:off x="4913201" y="1490854"/>
             <a:ext cx="983660" cy="580171"/>
           </a:xfrm>
           <a:prstGeom prst="roundRect">
@@ -7754,7 +9616,7 @@
         </p:nvSpPr>
         <p:spPr>
           <a:xfrm>
-            <a:off x="6012416" y="2171339"/>
+            <a:off x="6012416" y="1490853"/>
             <a:ext cx="1345033" cy="580171"/>
           </a:xfrm>
           <a:prstGeom prst="roundRect">
@@ -7831,7 +9693,7 @@
         </p:nvSpPr>
         <p:spPr>
           <a:xfrm>
-            <a:off x="3062176" y="1790885"/>
+            <a:off x="3062176" y="1110399"/>
             <a:ext cx="397095" cy="2298026"/>
           </a:xfrm>
           <a:prstGeom prst="rect">
@@ -7866,6 +9728,750 @@
             <a:r>
               <a:rPr lang="de-DE" dirty="0"/>
               <a:t> API</a:t>
+            </a:r>
+          </a:p>
+        </p:txBody>
+      </p:sp>
+      <p:sp>
+        <p:nvSpPr>
+          <p:cNvPr id="64" name="Rechteck 63">
+            <a:extLst>
+              <a:ext uri="{FF2B5EF4-FFF2-40B4-BE49-F238E27FC236}">
+                <a16:creationId xmlns:a16="http://schemas.microsoft.com/office/drawing/2014/main" id="{21AD584E-3CC9-4198-155C-0B17CAA0D443}"/>
+              </a:ext>
+            </a:extLst>
+          </p:cNvPr>
+          <p:cNvSpPr/>
+          <p:nvPr/>
+        </p:nvSpPr>
+        <p:spPr>
+          <a:xfrm>
+            <a:off x="2780826" y="276511"/>
+            <a:ext cx="6482444" cy="3187240"/>
+          </a:xfrm>
+          <a:prstGeom prst="rect">
+            <a:avLst/>
+          </a:prstGeom>
+          <a:solidFill>
+            <a:schemeClr val="accent3">
+              <a:lumMod val="40000"/>
+              <a:lumOff val="60000"/>
+              <a:alpha val="10870"/>
+            </a:schemeClr>
+          </a:solidFill>
+          <a:ln w="9525" cap="flat" cmpd="sng" algn="ctr">
+            <a:solidFill>
+              <a:schemeClr val="accent2"/>
+            </a:solidFill>
+            <a:prstDash val="solid"/>
+            <a:round/>
+            <a:headEnd type="none" w="med" len="med"/>
+            <a:tailEnd type="none" w="med" len="med"/>
+          </a:ln>
+        </p:spPr>
+        <p:style>
+          <a:lnRef idx="0">
+            <a:scrgbClr r="0" g="0" b="0"/>
+          </a:lnRef>
+          <a:fillRef idx="0">
+            <a:scrgbClr r="0" g="0" b="0"/>
+          </a:fillRef>
+          <a:effectRef idx="0">
+            <a:scrgbClr r="0" g="0" b="0"/>
+          </a:effectRef>
+          <a:fontRef idx="minor">
+            <a:schemeClr val="accent2"/>
+          </a:fontRef>
+        </p:style>
+        <p:txBody>
+          <a:bodyPr rtlCol="0" anchor="t"/>
+          <a:lstStyle/>
+          <a:p>
+            <a:pPr algn="ctr"/>
+            <a:r>
+              <a:rPr lang="de-DE" dirty="0" err="1"/>
+              <a:t>Managed</a:t>
+            </a:r>
+            <a:r>
+              <a:rPr lang="de-DE" dirty="0"/>
+              <a:t> </a:t>
+            </a:r>
+            <a:r>
+              <a:rPr lang="de-DE" dirty="0" err="1"/>
+              <a:t>Kubernetes</a:t>
+            </a:r>
+            <a:r>
+              <a:rPr lang="de-DE" dirty="0"/>
+              <a:t> </a:t>
+            </a:r>
+            <a:r>
+              <a:rPr lang="de-DE" dirty="0" err="1"/>
+              <a:t>with</a:t>
+            </a:r>
+            <a:r>
+              <a:rPr lang="de-DE" dirty="0"/>
+              <a:t> CPU support</a:t>
+            </a:r>
+          </a:p>
+        </p:txBody>
+      </p:sp>
+      <p:sp>
+        <p:nvSpPr>
+          <p:cNvPr id="65" name="Rechteck 64">
+            <a:extLst>
+              <a:ext uri="{FF2B5EF4-FFF2-40B4-BE49-F238E27FC236}">
+                <a16:creationId xmlns:a16="http://schemas.microsoft.com/office/drawing/2014/main" id="{4E039A2E-6B3C-2D62-0F29-07D88844C160}"/>
+              </a:ext>
+            </a:extLst>
+          </p:cNvPr>
+          <p:cNvSpPr/>
+          <p:nvPr/>
+        </p:nvSpPr>
+        <p:spPr>
+          <a:xfrm>
+            <a:off x="9320779" y="276511"/>
+            <a:ext cx="2758471" cy="2346731"/>
+          </a:xfrm>
+          <a:prstGeom prst="rect">
+            <a:avLst/>
+          </a:prstGeom>
+          <a:solidFill>
+            <a:schemeClr val="accent2">
+              <a:lumMod val="40000"/>
+              <a:lumOff val="60000"/>
+              <a:alpha val="10870"/>
+            </a:schemeClr>
+          </a:solidFill>
+          <a:ln w="9525" cap="flat" cmpd="sng" algn="ctr">
+            <a:solidFill>
+              <a:schemeClr val="accent2"/>
+            </a:solidFill>
+            <a:prstDash val="solid"/>
+            <a:round/>
+            <a:headEnd type="none" w="med" len="med"/>
+            <a:tailEnd type="none" w="med" len="med"/>
+          </a:ln>
+        </p:spPr>
+        <p:style>
+          <a:lnRef idx="0">
+            <a:scrgbClr r="0" g="0" b="0"/>
+          </a:lnRef>
+          <a:fillRef idx="0">
+            <a:scrgbClr r="0" g="0" b="0"/>
+          </a:fillRef>
+          <a:effectRef idx="0">
+            <a:scrgbClr r="0" g="0" b="0"/>
+          </a:effectRef>
+          <a:fontRef idx="minor">
+            <a:schemeClr val="accent2"/>
+          </a:fontRef>
+        </p:style>
+        <p:txBody>
+          <a:bodyPr rtlCol="0" anchor="t"/>
+          <a:lstStyle/>
+          <a:p>
+            <a:pPr algn="ctr"/>
+            <a:r>
+              <a:rPr lang="de-DE" dirty="0" err="1"/>
+              <a:t>Kubernetes</a:t>
+            </a:r>
+            <a:r>
+              <a:rPr lang="de-DE" dirty="0"/>
+              <a:t> </a:t>
+            </a:r>
+            <a:r>
+              <a:rPr lang="de-DE" dirty="0" err="1"/>
+              <a:t>with</a:t>
+            </a:r>
+            <a:r>
+              <a:rPr lang="de-DE" dirty="0"/>
+              <a:t> GPU support</a:t>
+            </a:r>
+          </a:p>
+        </p:txBody>
+      </p:sp>
+      <p:sp>
+        <p:nvSpPr>
+          <p:cNvPr id="69" name="Rechteck 68">
+            <a:extLst>
+              <a:ext uri="{FF2B5EF4-FFF2-40B4-BE49-F238E27FC236}">
+                <a16:creationId xmlns:a16="http://schemas.microsoft.com/office/drawing/2014/main" id="{75329B37-8B0D-908F-DD0F-24CED6DB4CAD}"/>
+              </a:ext>
+            </a:extLst>
+          </p:cNvPr>
+          <p:cNvSpPr/>
+          <p:nvPr/>
+        </p:nvSpPr>
+        <p:spPr>
+          <a:xfrm>
+            <a:off x="215842" y="3489126"/>
+            <a:ext cx="2493134" cy="2766615"/>
+          </a:xfrm>
+          <a:prstGeom prst="rect">
+            <a:avLst/>
+          </a:prstGeom>
+          <a:solidFill>
+            <a:schemeClr val="accent2">
+              <a:lumMod val="40000"/>
+              <a:lumOff val="60000"/>
+              <a:alpha val="10870"/>
+            </a:schemeClr>
+          </a:solidFill>
+          <a:ln w="9525" cap="flat" cmpd="sng" algn="ctr">
+            <a:solidFill>
+              <a:schemeClr val="accent2"/>
+            </a:solidFill>
+            <a:prstDash val="solid"/>
+            <a:round/>
+            <a:headEnd type="none" w="med" len="med"/>
+            <a:tailEnd type="none" w="med" len="med"/>
+          </a:ln>
+        </p:spPr>
+        <p:style>
+          <a:lnRef idx="0">
+            <a:scrgbClr r="0" g="0" b="0"/>
+          </a:lnRef>
+          <a:fillRef idx="0">
+            <a:scrgbClr r="0" g="0" b="0"/>
+          </a:fillRef>
+          <a:effectRef idx="0">
+            <a:scrgbClr r="0" g="0" b="0"/>
+          </a:effectRef>
+          <a:fontRef idx="minor">
+            <a:schemeClr val="accent2"/>
+          </a:fontRef>
+        </p:style>
+        <p:txBody>
+          <a:bodyPr rtlCol="0" anchor="b"/>
+          <a:lstStyle/>
+          <a:p>
+            <a:pPr algn="ctr"/>
+            <a:r>
+              <a:rPr lang="de-DE" dirty="0"/>
+              <a:t>Identity Provider</a:t>
+            </a:r>
+          </a:p>
+        </p:txBody>
+      </p:sp>
+      <p:sp>
+        <p:nvSpPr>
+          <p:cNvPr id="70" name="Rechteck 69">
+            <a:extLst>
+              <a:ext uri="{FF2B5EF4-FFF2-40B4-BE49-F238E27FC236}">
+                <a16:creationId xmlns:a16="http://schemas.microsoft.com/office/drawing/2014/main" id="{B05C0D7E-C24D-BAE7-1418-7CD4119A336E}"/>
+              </a:ext>
+            </a:extLst>
+          </p:cNvPr>
+          <p:cNvSpPr/>
+          <p:nvPr/>
+        </p:nvSpPr>
+        <p:spPr>
+          <a:xfrm>
+            <a:off x="993502" y="4027678"/>
+            <a:ext cx="1022445" cy="767080"/>
+          </a:xfrm>
+          <a:prstGeom prst="rect">
+            <a:avLst/>
+          </a:prstGeom>
+        </p:spPr>
+        <p:style>
+          <a:lnRef idx="2">
+            <a:schemeClr val="accent1">
+              <a:shade val="15000"/>
+            </a:schemeClr>
+          </a:lnRef>
+          <a:fillRef idx="1">
+            <a:schemeClr val="accent1"/>
+          </a:fillRef>
+          <a:effectRef idx="0">
+            <a:schemeClr val="accent1"/>
+          </a:effectRef>
+          <a:fontRef idx="minor">
+            <a:schemeClr val="lt1"/>
+          </a:fontRef>
+        </p:style>
+        <p:txBody>
+          <a:bodyPr rtlCol="0" anchor="ctr"/>
+          <a:lstStyle/>
+          <a:p>
+            <a:pPr algn="ctr"/>
+            <a:r>
+              <a:rPr lang="de-DE" dirty="0"/>
+              <a:t>IDP</a:t>
+            </a:r>
+          </a:p>
+        </p:txBody>
+      </p:sp>
+      <p:cxnSp>
+        <p:nvCxnSpPr>
+          <p:cNvPr id="72" name="Gerade Verbindung 71">
+            <a:extLst>
+              <a:ext uri="{FF2B5EF4-FFF2-40B4-BE49-F238E27FC236}">
+                <a16:creationId xmlns:a16="http://schemas.microsoft.com/office/drawing/2014/main" id="{B802D437-85CB-FBB4-B703-A0F3FDB54FD1}"/>
+              </a:ext>
+            </a:extLst>
+          </p:cNvPr>
+          <p:cNvCxnSpPr>
+            <a:stCxn id="70" idx="3"/>
+          </p:cNvCxnSpPr>
+          <p:nvPr/>
+        </p:nvCxnSpPr>
+        <p:spPr>
+          <a:xfrm>
+            <a:off x="2015947" y="4411218"/>
+            <a:ext cx="1648888" cy="0"/>
+          </a:xfrm>
+          <a:prstGeom prst="line">
+            <a:avLst/>
+          </a:prstGeom>
+        </p:spPr>
+        <p:style>
+          <a:lnRef idx="2">
+            <a:schemeClr val="accent1"/>
+          </a:lnRef>
+          <a:fillRef idx="0">
+            <a:schemeClr val="accent1"/>
+          </a:fillRef>
+          <a:effectRef idx="1">
+            <a:schemeClr val="accent1"/>
+          </a:effectRef>
+          <a:fontRef idx="minor">
+            <a:schemeClr val="tx1"/>
+          </a:fontRef>
+        </p:style>
+      </p:cxnSp>
+      <p:sp>
+        <p:nvSpPr>
+          <p:cNvPr id="74" name="Rechteck 73">
+            <a:extLst>
+              <a:ext uri="{FF2B5EF4-FFF2-40B4-BE49-F238E27FC236}">
+                <a16:creationId xmlns:a16="http://schemas.microsoft.com/office/drawing/2014/main" id="{4C03CE99-560A-ADAE-5CFE-50EC27DA80CB}"/>
+              </a:ext>
+            </a:extLst>
+          </p:cNvPr>
+          <p:cNvSpPr/>
+          <p:nvPr/>
+        </p:nvSpPr>
+        <p:spPr>
+          <a:xfrm>
+            <a:off x="7758935" y="4411218"/>
+            <a:ext cx="1229688" cy="767080"/>
+          </a:xfrm>
+          <a:prstGeom prst="rect">
+            <a:avLst/>
+          </a:prstGeom>
+        </p:spPr>
+        <p:style>
+          <a:lnRef idx="2">
+            <a:schemeClr val="accent1">
+              <a:shade val="15000"/>
+            </a:schemeClr>
+          </a:lnRef>
+          <a:fillRef idx="1">
+            <a:schemeClr val="accent1"/>
+          </a:fillRef>
+          <a:effectRef idx="0">
+            <a:schemeClr val="accent1"/>
+          </a:effectRef>
+          <a:fontRef idx="minor">
+            <a:schemeClr val="lt1"/>
+          </a:fontRef>
+        </p:style>
+        <p:txBody>
+          <a:bodyPr rtlCol="0" anchor="ctr"/>
+          <a:lstStyle/>
+          <a:p>
+            <a:pPr algn="ctr"/>
+            <a:r>
+              <a:rPr lang="de-DE" dirty="0" err="1"/>
+              <a:t>Langfuse</a:t>
+            </a:r>
+            <a:r>
+              <a:rPr lang="de-DE" dirty="0"/>
+              <a:t> </a:t>
+            </a:r>
+            <a:r>
+              <a:rPr lang="de-DE" dirty="0" err="1"/>
+              <a:t>server</a:t>
+            </a:r>
+            <a:endParaRPr lang="de-DE" dirty="0"/>
+          </a:p>
+        </p:txBody>
+      </p:sp>
+      <p:sp>
+        <p:nvSpPr>
+          <p:cNvPr id="75" name="Rechteck 74">
+            <a:extLst>
+              <a:ext uri="{FF2B5EF4-FFF2-40B4-BE49-F238E27FC236}">
+                <a16:creationId xmlns:a16="http://schemas.microsoft.com/office/drawing/2014/main" id="{ABF437C1-13C4-8E3A-E8F9-58817ED192C2}"/>
+              </a:ext>
+            </a:extLst>
+          </p:cNvPr>
+          <p:cNvSpPr/>
+          <p:nvPr/>
+        </p:nvSpPr>
+        <p:spPr>
+          <a:xfrm>
+            <a:off x="9388002" y="2884830"/>
+            <a:ext cx="2588156" cy="1214345"/>
+          </a:xfrm>
+          <a:prstGeom prst="rect">
+            <a:avLst/>
+          </a:prstGeom>
+        </p:spPr>
+        <p:style>
+          <a:lnRef idx="2">
+            <a:schemeClr val="accent6"/>
+          </a:lnRef>
+          <a:fillRef idx="1">
+            <a:schemeClr val="lt1"/>
+          </a:fillRef>
+          <a:effectRef idx="0">
+            <a:schemeClr val="accent6"/>
+          </a:effectRef>
+          <a:fontRef idx="minor">
+            <a:schemeClr val="dk1"/>
+          </a:fontRef>
+        </p:style>
+        <p:txBody>
+          <a:bodyPr rtlCol="0" anchor="t"/>
+          <a:lstStyle/>
+          <a:p>
+            <a:pPr algn="ctr"/>
+            <a:r>
+              <a:rPr lang="de-DE" dirty="0"/>
+              <a:t>Modelle</a:t>
+            </a:r>
+          </a:p>
+        </p:txBody>
+      </p:sp>
+      <p:sp>
+        <p:nvSpPr>
+          <p:cNvPr id="76" name="Abgerundetes Rechteck 75">
+            <a:extLst>
+              <a:ext uri="{FF2B5EF4-FFF2-40B4-BE49-F238E27FC236}">
+                <a16:creationId xmlns:a16="http://schemas.microsoft.com/office/drawing/2014/main" id="{799164B6-4130-6B63-FA20-903DC5C084DC}"/>
+              </a:ext>
+            </a:extLst>
+          </p:cNvPr>
+          <p:cNvSpPr/>
+          <p:nvPr/>
+        </p:nvSpPr>
+        <p:spPr>
+          <a:xfrm>
+            <a:off x="9484455" y="3377923"/>
+            <a:ext cx="914400" cy="580889"/>
+          </a:xfrm>
+          <a:prstGeom prst="roundRect">
+            <a:avLst/>
+          </a:prstGeom>
+        </p:spPr>
+        <p:style>
+          <a:lnRef idx="2">
+            <a:schemeClr val="accent1">
+              <a:shade val="15000"/>
+            </a:schemeClr>
+          </a:lnRef>
+          <a:fillRef idx="1">
+            <a:schemeClr val="accent1"/>
+          </a:fillRef>
+          <a:effectRef idx="0">
+            <a:schemeClr val="accent1"/>
+          </a:effectRef>
+          <a:fontRef idx="minor">
+            <a:schemeClr val="lt1"/>
+          </a:fontRef>
+        </p:style>
+        <p:txBody>
+          <a:bodyPr rtlCol="0" anchor="ctr"/>
+          <a:lstStyle/>
+          <a:p>
+            <a:pPr algn="ctr"/>
+            <a:r>
+              <a:rPr lang="de-DE" dirty="0" err="1"/>
+              <a:t>Mixtral</a:t>
+            </a:r>
+            <a:endParaRPr lang="de-DE" dirty="0"/>
+          </a:p>
+        </p:txBody>
+      </p:sp>
+      <p:sp>
+        <p:nvSpPr>
+          <p:cNvPr id="77" name="Abgerundetes Rechteck 76">
+            <a:extLst>
+              <a:ext uri="{FF2B5EF4-FFF2-40B4-BE49-F238E27FC236}">
+                <a16:creationId xmlns:a16="http://schemas.microsoft.com/office/drawing/2014/main" id="{34E12740-C513-C14A-E7ED-04BBC745E150}"/>
+              </a:ext>
+            </a:extLst>
+          </p:cNvPr>
+          <p:cNvSpPr/>
+          <p:nvPr/>
+        </p:nvSpPr>
+        <p:spPr>
+          <a:xfrm>
+            <a:off x="10537654" y="3377923"/>
+            <a:ext cx="914400" cy="580889"/>
+          </a:xfrm>
+          <a:prstGeom prst="roundRect">
+            <a:avLst/>
+          </a:prstGeom>
+        </p:spPr>
+        <p:style>
+          <a:lnRef idx="2">
+            <a:schemeClr val="accent1">
+              <a:shade val="15000"/>
+            </a:schemeClr>
+          </a:lnRef>
+          <a:fillRef idx="1">
+            <a:schemeClr val="accent1"/>
+          </a:fillRef>
+          <a:effectRef idx="0">
+            <a:schemeClr val="accent1"/>
+          </a:effectRef>
+          <a:fontRef idx="minor">
+            <a:schemeClr val="lt1"/>
+          </a:fontRef>
+        </p:style>
+        <p:txBody>
+          <a:bodyPr rtlCol="0" anchor="ctr"/>
+          <a:lstStyle/>
+          <a:p>
+            <a:pPr algn="ctr"/>
+            <a:r>
+              <a:rPr lang="de-DE" dirty="0" err="1"/>
+              <a:t>Llama</a:t>
+            </a:r>
+            <a:endParaRPr lang="de-DE" dirty="0"/>
+          </a:p>
+        </p:txBody>
+      </p:sp>
+      <p:sp>
+        <p:nvSpPr>
+          <p:cNvPr id="78" name="Rechteck 77">
+            <a:extLst>
+              <a:ext uri="{FF2B5EF4-FFF2-40B4-BE49-F238E27FC236}">
+                <a16:creationId xmlns:a16="http://schemas.microsoft.com/office/drawing/2014/main" id="{94F92B63-013F-E8D4-E0D0-58F3588946C5}"/>
+              </a:ext>
+            </a:extLst>
+          </p:cNvPr>
+          <p:cNvSpPr/>
+          <p:nvPr/>
+        </p:nvSpPr>
+        <p:spPr>
+          <a:xfrm>
+            <a:off x="9383148" y="4243203"/>
+            <a:ext cx="2588156" cy="1110676"/>
+          </a:xfrm>
+          <a:prstGeom prst="rect">
+            <a:avLst/>
+          </a:prstGeom>
+        </p:spPr>
+        <p:style>
+          <a:lnRef idx="2">
+            <a:schemeClr val="accent6"/>
+          </a:lnRef>
+          <a:fillRef idx="1">
+            <a:schemeClr val="lt1"/>
+          </a:fillRef>
+          <a:effectRef idx="0">
+            <a:schemeClr val="accent6"/>
+          </a:effectRef>
+          <a:fontRef idx="minor">
+            <a:schemeClr val="dk1"/>
+          </a:fontRef>
+        </p:style>
+        <p:txBody>
+          <a:bodyPr rtlCol="0" anchor="t"/>
+          <a:lstStyle/>
+          <a:p>
+            <a:pPr algn="ctr"/>
+            <a:r>
+              <a:rPr lang="de-DE" dirty="0" err="1"/>
+              <a:t>Logging</a:t>
+            </a:r>
+            <a:endParaRPr lang="de-DE" dirty="0"/>
+          </a:p>
+        </p:txBody>
+      </p:sp>
+      <p:cxnSp>
+        <p:nvCxnSpPr>
+          <p:cNvPr id="81" name="Gewinkelte Verbindung 80">
+            <a:extLst>
+              <a:ext uri="{FF2B5EF4-FFF2-40B4-BE49-F238E27FC236}">
+                <a16:creationId xmlns:a16="http://schemas.microsoft.com/office/drawing/2014/main" id="{D0A24F84-C2C5-A41B-EC86-E6DA6E296ED1}"/>
+              </a:ext>
+            </a:extLst>
+          </p:cNvPr>
+          <p:cNvCxnSpPr>
+            <a:cxnSpLocks/>
+            <a:endCxn id="74" idx="0"/>
+          </p:cNvCxnSpPr>
+          <p:nvPr/>
+        </p:nvCxnSpPr>
+        <p:spPr>
+          <a:xfrm rot="16200000" flipH="1">
+            <a:off x="7462455" y="3499893"/>
+            <a:ext cx="1207805" cy="614844"/>
+          </a:xfrm>
+          <a:prstGeom prst="bentConnector3">
+            <a:avLst/>
+          </a:prstGeom>
+          <a:ln>
+            <a:tailEnd type="triangle"/>
+          </a:ln>
+        </p:spPr>
+        <p:style>
+          <a:lnRef idx="1">
+            <a:schemeClr val="accent6"/>
+          </a:lnRef>
+          <a:fillRef idx="0">
+            <a:schemeClr val="accent6"/>
+          </a:fillRef>
+          <a:effectRef idx="0">
+            <a:schemeClr val="accent6"/>
+          </a:effectRef>
+          <a:fontRef idx="minor">
+            <a:schemeClr val="tx1"/>
+          </a:fontRef>
+        </p:style>
+      </p:cxnSp>
+      <p:cxnSp>
+        <p:nvCxnSpPr>
+          <p:cNvPr id="84" name="Gerade Verbindung mit Pfeil 83">
+            <a:extLst>
+              <a:ext uri="{FF2B5EF4-FFF2-40B4-BE49-F238E27FC236}">
+                <a16:creationId xmlns:a16="http://schemas.microsoft.com/office/drawing/2014/main" id="{6C87FA22-3240-4501-1F16-E8C690106ED9}"/>
+              </a:ext>
+            </a:extLst>
+          </p:cNvPr>
+          <p:cNvCxnSpPr>
+            <a:cxnSpLocks/>
+            <a:stCxn id="74" idx="3"/>
+            <a:endCxn id="78" idx="1"/>
+          </p:cNvCxnSpPr>
+          <p:nvPr/>
+        </p:nvCxnSpPr>
+        <p:spPr>
+          <a:xfrm>
+            <a:off x="8988623" y="4794758"/>
+            <a:ext cx="394525" cy="3783"/>
+          </a:xfrm>
+          <a:prstGeom prst="straightConnector1">
+            <a:avLst/>
+          </a:prstGeom>
+          <a:ln>
+            <a:tailEnd type="triangle"/>
+          </a:ln>
+        </p:spPr>
+        <p:style>
+          <a:lnRef idx="1">
+            <a:schemeClr val="accent6"/>
+          </a:lnRef>
+          <a:fillRef idx="0">
+            <a:schemeClr val="accent6"/>
+          </a:fillRef>
+          <a:effectRef idx="0">
+            <a:schemeClr val="accent6"/>
+          </a:effectRef>
+          <a:fontRef idx="minor">
+            <a:schemeClr val="tx1"/>
+          </a:fontRef>
+        </p:style>
+      </p:cxnSp>
+      <p:sp>
+        <p:nvSpPr>
+          <p:cNvPr id="87" name="Zylinder 86">
+            <a:extLst>
+              <a:ext uri="{FF2B5EF4-FFF2-40B4-BE49-F238E27FC236}">
+                <a16:creationId xmlns:a16="http://schemas.microsoft.com/office/drawing/2014/main" id="{D11C88FE-31A4-BB6B-071D-86E02A4EF9C0}"/>
+              </a:ext>
+            </a:extLst>
+          </p:cNvPr>
+          <p:cNvSpPr/>
+          <p:nvPr/>
+        </p:nvSpPr>
+        <p:spPr>
+          <a:xfrm>
+            <a:off x="11075937" y="1100916"/>
+            <a:ext cx="865784" cy="600738"/>
+          </a:xfrm>
+          <a:prstGeom prst="can">
+            <a:avLst/>
+          </a:prstGeom>
+        </p:spPr>
+        <p:style>
+          <a:lnRef idx="2">
+            <a:schemeClr val="accent1">
+              <a:shade val="15000"/>
+            </a:schemeClr>
+          </a:lnRef>
+          <a:fillRef idx="1">
+            <a:schemeClr val="accent1"/>
+          </a:fillRef>
+          <a:effectRef idx="0">
+            <a:schemeClr val="accent1"/>
+          </a:effectRef>
+          <a:fontRef idx="minor">
+            <a:schemeClr val="lt1"/>
+          </a:fontRef>
+        </p:style>
+        <p:txBody>
+          <a:bodyPr rtlCol="0" anchor="ctr"/>
+          <a:lstStyle/>
+          <a:p>
+            <a:pPr algn="ctr"/>
+            <a:r>
+              <a:rPr lang="de-DE" sz="1200" dirty="0"/>
+              <a:t>KV-Cache</a:t>
+            </a:r>
+          </a:p>
+        </p:txBody>
+      </p:sp>
+      <p:sp>
+        <p:nvSpPr>
+          <p:cNvPr id="88" name="Zylinder 87">
+            <a:extLst>
+              <a:ext uri="{FF2B5EF4-FFF2-40B4-BE49-F238E27FC236}">
+                <a16:creationId xmlns:a16="http://schemas.microsoft.com/office/drawing/2014/main" id="{73EB3829-BB86-7879-23D0-4E68DDA7671E}"/>
+              </a:ext>
+            </a:extLst>
+          </p:cNvPr>
+          <p:cNvSpPr/>
+          <p:nvPr/>
+        </p:nvSpPr>
+        <p:spPr>
+          <a:xfrm>
+            <a:off x="11075937" y="1849469"/>
+            <a:ext cx="865784" cy="600738"/>
+          </a:xfrm>
+          <a:prstGeom prst="can">
+            <a:avLst/>
+          </a:prstGeom>
+        </p:spPr>
+        <p:style>
+          <a:lnRef idx="2">
+            <a:schemeClr val="accent1">
+              <a:shade val="15000"/>
+            </a:schemeClr>
+          </a:lnRef>
+          <a:fillRef idx="1">
+            <a:schemeClr val="accent1"/>
+          </a:fillRef>
+          <a:effectRef idx="0">
+            <a:schemeClr val="accent1"/>
+          </a:effectRef>
+          <a:fontRef idx="minor">
+            <a:schemeClr val="lt1"/>
+          </a:fontRef>
+        </p:style>
+        <p:txBody>
+          <a:bodyPr rtlCol="0" anchor="ctr"/>
+          <a:lstStyle/>
+          <a:p>
+            <a:pPr algn="ctr"/>
+            <a:r>
+              <a:rPr lang="de-DE" sz="1200" dirty="0"/>
+              <a:t>KV-Cache</a:t>
             </a:r>
           </a:p>
         </p:txBody>

</xml_diff>

<commit_message>
inference server and engine
</commit_message>
<xml_diff>
--- a/RAKIPOEV-docs/docs/ppt/Building-Blocks.pptx
+++ b/RAKIPOEV-docs/docs/ppt/Building-Blocks.pptx
@@ -18,6 +18,7 @@
     <p:sldId id="268" r:id="rId12"/>
     <p:sldId id="264" r:id="rId13"/>
     <p:sldId id="263" r:id="rId14"/>
+    <p:sldId id="269" r:id="rId15"/>
   </p:sldIdLst>
   <p:sldSz cx="12192000" cy="6858000"/>
   <p:notesSz cx="6858000" cy="9144000"/>
@@ -271,7 +272,7 @@
           <a:p>
             <a:fld id="{BA6DBFC3-540E-6444-9571-9AC72F552CFB}" type="datetimeFigureOut">
               <a:rPr lang="de-DE" smtClean="0"/>
-              <a:t>27.01.25</a:t>
+              <a:t>02.02.25</a:t>
             </a:fld>
             <a:endParaRPr lang="de-DE"/>
           </a:p>
@@ -469,7 +470,7 @@
           <a:p>
             <a:fld id="{BA6DBFC3-540E-6444-9571-9AC72F552CFB}" type="datetimeFigureOut">
               <a:rPr lang="de-DE" smtClean="0"/>
-              <a:t>27.01.25</a:t>
+              <a:t>02.02.25</a:t>
             </a:fld>
             <a:endParaRPr lang="de-DE"/>
           </a:p>
@@ -677,7 +678,7 @@
           <a:p>
             <a:fld id="{BA6DBFC3-540E-6444-9571-9AC72F552CFB}" type="datetimeFigureOut">
               <a:rPr lang="de-DE" smtClean="0"/>
-              <a:t>27.01.25</a:t>
+              <a:t>02.02.25</a:t>
             </a:fld>
             <a:endParaRPr lang="de-DE"/>
           </a:p>
@@ -875,7 +876,7 @@
           <a:p>
             <a:fld id="{BA6DBFC3-540E-6444-9571-9AC72F552CFB}" type="datetimeFigureOut">
               <a:rPr lang="de-DE" smtClean="0"/>
-              <a:t>27.01.25</a:t>
+              <a:t>02.02.25</a:t>
             </a:fld>
             <a:endParaRPr lang="de-DE"/>
           </a:p>
@@ -1150,7 +1151,7 @@
           <a:p>
             <a:fld id="{BA6DBFC3-540E-6444-9571-9AC72F552CFB}" type="datetimeFigureOut">
               <a:rPr lang="de-DE" smtClean="0"/>
-              <a:t>27.01.25</a:t>
+              <a:t>02.02.25</a:t>
             </a:fld>
             <a:endParaRPr lang="de-DE"/>
           </a:p>
@@ -1415,7 +1416,7 @@
           <a:p>
             <a:fld id="{BA6DBFC3-540E-6444-9571-9AC72F552CFB}" type="datetimeFigureOut">
               <a:rPr lang="de-DE" smtClean="0"/>
-              <a:t>27.01.25</a:t>
+              <a:t>02.02.25</a:t>
             </a:fld>
             <a:endParaRPr lang="de-DE"/>
           </a:p>
@@ -1827,7 +1828,7 @@
           <a:p>
             <a:fld id="{BA6DBFC3-540E-6444-9571-9AC72F552CFB}" type="datetimeFigureOut">
               <a:rPr lang="de-DE" smtClean="0"/>
-              <a:t>27.01.25</a:t>
+              <a:t>02.02.25</a:t>
             </a:fld>
             <a:endParaRPr lang="de-DE"/>
           </a:p>
@@ -1968,7 +1969,7 @@
           <a:p>
             <a:fld id="{BA6DBFC3-540E-6444-9571-9AC72F552CFB}" type="datetimeFigureOut">
               <a:rPr lang="de-DE" smtClean="0"/>
-              <a:t>27.01.25</a:t>
+              <a:t>02.02.25</a:t>
             </a:fld>
             <a:endParaRPr lang="de-DE"/>
           </a:p>
@@ -2081,7 +2082,7 @@
           <a:p>
             <a:fld id="{BA6DBFC3-540E-6444-9571-9AC72F552CFB}" type="datetimeFigureOut">
               <a:rPr lang="de-DE" smtClean="0"/>
-              <a:t>27.01.25</a:t>
+              <a:t>02.02.25</a:t>
             </a:fld>
             <a:endParaRPr lang="de-DE"/>
           </a:p>
@@ -2392,7 +2393,7 @@
           <a:p>
             <a:fld id="{BA6DBFC3-540E-6444-9571-9AC72F552CFB}" type="datetimeFigureOut">
               <a:rPr lang="de-DE" smtClean="0"/>
-              <a:t>27.01.25</a:t>
+              <a:t>02.02.25</a:t>
             </a:fld>
             <a:endParaRPr lang="de-DE"/>
           </a:p>
@@ -2680,7 +2681,7 @@
           <a:p>
             <a:fld id="{BA6DBFC3-540E-6444-9571-9AC72F552CFB}" type="datetimeFigureOut">
               <a:rPr lang="de-DE" smtClean="0"/>
-              <a:t>27.01.25</a:t>
+              <a:t>02.02.25</a:t>
             </a:fld>
             <a:endParaRPr lang="de-DE"/>
           </a:p>
@@ -2921,7 +2922,7 @@
           <a:p>
             <a:fld id="{BA6DBFC3-540E-6444-9571-9AC72F552CFB}" type="datetimeFigureOut">
               <a:rPr lang="de-DE" smtClean="0"/>
-              <a:t>27.01.25</a:t>
+              <a:t>02.02.25</a:t>
             </a:fld>
             <a:endParaRPr lang="de-DE"/>
           </a:p>
@@ -9464,6 +9465,1095 @@
 </p:sld>
 </file>
 
+<file path=ppt/slides/slide14.xml><?xml version="1.0" encoding="utf-8"?>
+<p:sld xmlns:a="http://schemas.openxmlformats.org/drawingml/2006/main" xmlns:r="http://schemas.openxmlformats.org/officeDocument/2006/relationships" xmlns:p="http://schemas.openxmlformats.org/presentationml/2006/main">
+  <p:cSld>
+    <p:spTree>
+      <p:nvGrpSpPr>
+        <p:cNvPr id="1" name=""/>
+        <p:cNvGrpSpPr/>
+        <p:nvPr/>
+      </p:nvGrpSpPr>
+      <p:grpSpPr>
+        <a:xfrm>
+          <a:off x="0" y="0"/>
+          <a:ext cx="0" cy="0"/>
+          <a:chOff x="0" y="0"/>
+          <a:chExt cx="0" cy="0"/>
+        </a:xfrm>
+      </p:grpSpPr>
+      <p:sp>
+        <p:nvSpPr>
+          <p:cNvPr id="2" name="Textfeld 1">
+            <a:extLst>
+              <a:ext uri="{FF2B5EF4-FFF2-40B4-BE49-F238E27FC236}">
+                <a16:creationId xmlns:a16="http://schemas.microsoft.com/office/drawing/2014/main" id="{9B582775-FF59-6B78-0305-BD3FCB234491}"/>
+              </a:ext>
+            </a:extLst>
+          </p:cNvPr>
+          <p:cNvSpPr txBox="1"/>
+          <p:nvPr/>
+        </p:nvSpPr>
+        <p:spPr>
+          <a:xfrm>
+            <a:off x="10434468" y="6127161"/>
+            <a:ext cx="1124347" cy="369332"/>
+          </a:xfrm>
+          <a:prstGeom prst="rect">
+            <a:avLst/>
+          </a:prstGeom>
+          <a:noFill/>
+        </p:spPr>
+        <p:txBody>
+          <a:bodyPr wrap="none" rtlCol="0">
+            <a:spAutoFit/>
+          </a:bodyPr>
+          <a:lstStyle/>
+          <a:p>
+            <a:r>
+              <a:rPr lang="de-DE" dirty="0" err="1"/>
+              <a:t>Inference</a:t>
+            </a:r>
+            <a:endParaRPr lang="de-DE" dirty="0"/>
+          </a:p>
+        </p:txBody>
+      </p:sp>
+      <p:sp>
+        <p:nvSpPr>
+          <p:cNvPr id="3" name="Rechteck 2">
+            <a:extLst>
+              <a:ext uri="{FF2B5EF4-FFF2-40B4-BE49-F238E27FC236}">
+                <a16:creationId xmlns:a16="http://schemas.microsoft.com/office/drawing/2014/main" id="{402181A9-3C3D-5E48-EF19-73B15C6D9CD7}"/>
+              </a:ext>
+            </a:extLst>
+          </p:cNvPr>
+          <p:cNvSpPr/>
+          <p:nvPr/>
+        </p:nvSpPr>
+        <p:spPr>
+          <a:xfrm>
+            <a:off x="988825" y="1152929"/>
+            <a:ext cx="397095" cy="3323370"/>
+          </a:xfrm>
+          <a:prstGeom prst="rect">
+            <a:avLst/>
+          </a:prstGeom>
+        </p:spPr>
+        <p:style>
+          <a:lnRef idx="2">
+            <a:schemeClr val="accent1">
+              <a:shade val="15000"/>
+            </a:schemeClr>
+          </a:lnRef>
+          <a:fillRef idx="1">
+            <a:schemeClr val="accent1"/>
+          </a:fillRef>
+          <a:effectRef idx="0">
+            <a:schemeClr val="accent1"/>
+          </a:effectRef>
+          <a:fontRef idx="minor">
+            <a:schemeClr val="lt1"/>
+          </a:fontRef>
+        </p:style>
+        <p:txBody>
+          <a:bodyPr vert="vert270" rtlCol="0" anchor="ctr"/>
+          <a:lstStyle/>
+          <a:p>
+            <a:pPr algn="ctr"/>
+            <a:r>
+              <a:rPr lang="de-DE" dirty="0"/>
+              <a:t>LLM Gateway</a:t>
+            </a:r>
+          </a:p>
+        </p:txBody>
+      </p:sp>
+      <p:sp>
+        <p:nvSpPr>
+          <p:cNvPr id="4" name="Rechteck 3">
+            <a:extLst>
+              <a:ext uri="{FF2B5EF4-FFF2-40B4-BE49-F238E27FC236}">
+                <a16:creationId xmlns:a16="http://schemas.microsoft.com/office/drawing/2014/main" id="{F24FC566-0F97-CA29-89F3-854D5B1A2109}"/>
+              </a:ext>
+            </a:extLst>
+          </p:cNvPr>
+          <p:cNvSpPr/>
+          <p:nvPr/>
+        </p:nvSpPr>
+        <p:spPr>
+          <a:xfrm>
+            <a:off x="2392323" y="1152928"/>
+            <a:ext cx="7325834" cy="3323371"/>
+          </a:xfrm>
+          <a:prstGeom prst="rect">
+            <a:avLst/>
+          </a:prstGeom>
+        </p:spPr>
+        <p:style>
+          <a:lnRef idx="2">
+            <a:schemeClr val="accent1">
+              <a:shade val="15000"/>
+            </a:schemeClr>
+          </a:lnRef>
+          <a:fillRef idx="1">
+            <a:schemeClr val="accent1"/>
+          </a:fillRef>
+          <a:effectRef idx="0">
+            <a:schemeClr val="accent1"/>
+          </a:effectRef>
+          <a:fontRef idx="minor">
+            <a:schemeClr val="lt1"/>
+          </a:fontRef>
+        </p:style>
+        <p:txBody>
+          <a:bodyPr rtlCol="0" anchor="ctr"/>
+          <a:lstStyle/>
+          <a:p>
+            <a:pPr algn="ctr"/>
+            <a:endParaRPr lang="de-DE"/>
+          </a:p>
+        </p:txBody>
+      </p:sp>
+      <p:sp>
+        <p:nvSpPr>
+          <p:cNvPr id="5" name="Abgerundetes Rechteck 4">
+            <a:extLst>
+              <a:ext uri="{FF2B5EF4-FFF2-40B4-BE49-F238E27FC236}">
+                <a16:creationId xmlns:a16="http://schemas.microsoft.com/office/drawing/2014/main" id="{F89F3C77-079C-3600-FA69-67144CDB21BC}"/>
+              </a:ext>
+            </a:extLst>
+          </p:cNvPr>
+          <p:cNvSpPr/>
+          <p:nvPr/>
+        </p:nvSpPr>
+        <p:spPr>
+          <a:xfrm>
+            <a:off x="2867685" y="2025561"/>
+            <a:ext cx="983660" cy="580171"/>
+          </a:xfrm>
+          <a:prstGeom prst="roundRect">
+            <a:avLst/>
+          </a:prstGeom>
+        </p:spPr>
+        <p:style>
+          <a:lnRef idx="2">
+            <a:schemeClr val="accent6"/>
+          </a:lnRef>
+          <a:fillRef idx="1">
+            <a:schemeClr val="lt1"/>
+          </a:fillRef>
+          <a:effectRef idx="0">
+            <a:schemeClr val="accent6"/>
+          </a:effectRef>
+          <a:fontRef idx="minor">
+            <a:schemeClr val="dk1"/>
+          </a:fontRef>
+        </p:style>
+        <p:txBody>
+          <a:bodyPr rtlCol="0" anchor="ctr"/>
+          <a:lstStyle/>
+          <a:p>
+            <a:pPr algn="ctr"/>
+            <a:r>
+              <a:rPr lang="de-DE" sz="1200" dirty="0"/>
+              <a:t>Queue Scheduler</a:t>
+            </a:r>
+          </a:p>
+        </p:txBody>
+      </p:sp>
+      <p:cxnSp>
+        <p:nvCxnSpPr>
+          <p:cNvPr id="7" name="Gerade Verbindung mit Pfeil 6">
+            <a:extLst>
+              <a:ext uri="{FF2B5EF4-FFF2-40B4-BE49-F238E27FC236}">
+                <a16:creationId xmlns:a16="http://schemas.microsoft.com/office/drawing/2014/main" id="{C0C414BD-BD45-3CAE-088F-563DB7F4ACC3}"/>
+              </a:ext>
+            </a:extLst>
+          </p:cNvPr>
+          <p:cNvCxnSpPr>
+            <a:endCxn id="5" idx="1"/>
+          </p:cNvCxnSpPr>
+          <p:nvPr/>
+        </p:nvCxnSpPr>
+        <p:spPr>
+          <a:xfrm>
+            <a:off x="1385920" y="2315646"/>
+            <a:ext cx="1481765" cy="1"/>
+          </a:xfrm>
+          <a:prstGeom prst="straightConnector1">
+            <a:avLst/>
+          </a:prstGeom>
+          <a:ln>
+            <a:tailEnd type="triangle"/>
+          </a:ln>
+        </p:spPr>
+        <p:style>
+          <a:lnRef idx="1">
+            <a:schemeClr val="accent6"/>
+          </a:lnRef>
+          <a:fillRef idx="0">
+            <a:schemeClr val="accent6"/>
+          </a:fillRef>
+          <a:effectRef idx="0">
+            <a:schemeClr val="accent6"/>
+          </a:effectRef>
+          <a:fontRef idx="minor">
+            <a:schemeClr val="tx1"/>
+          </a:fontRef>
+        </p:style>
+      </p:cxnSp>
+      <p:sp>
+        <p:nvSpPr>
+          <p:cNvPr id="8" name="Textfeld 7">
+            <a:extLst>
+              <a:ext uri="{FF2B5EF4-FFF2-40B4-BE49-F238E27FC236}">
+                <a16:creationId xmlns:a16="http://schemas.microsoft.com/office/drawing/2014/main" id="{7352304F-500E-65AE-2EB1-A6C27D8DD6DB}"/>
+              </a:ext>
+            </a:extLst>
+          </p:cNvPr>
+          <p:cNvSpPr txBox="1"/>
+          <p:nvPr/>
+        </p:nvSpPr>
+        <p:spPr>
+          <a:xfrm>
+            <a:off x="1438661" y="2025561"/>
+            <a:ext cx="1008609" cy="276999"/>
+          </a:xfrm>
+          <a:prstGeom prst="rect">
+            <a:avLst/>
+          </a:prstGeom>
+          <a:noFill/>
+        </p:spPr>
+        <p:txBody>
+          <a:bodyPr wrap="none" rtlCol="0">
+            <a:spAutoFit/>
+          </a:bodyPr>
+          <a:lstStyle/>
+          <a:p>
+            <a:r>
+              <a:rPr lang="de-DE" sz="1200" dirty="0"/>
+              <a:t>HTTP / gRPC</a:t>
+            </a:r>
+          </a:p>
+        </p:txBody>
+      </p:sp>
+      <p:sp>
+        <p:nvSpPr>
+          <p:cNvPr id="9" name="Abgerundetes Rechteck 8">
+            <a:extLst>
+              <a:ext uri="{FF2B5EF4-FFF2-40B4-BE49-F238E27FC236}">
+                <a16:creationId xmlns:a16="http://schemas.microsoft.com/office/drawing/2014/main" id="{BEB5CC34-EA08-C911-A809-9DE8678CCB67}"/>
+              </a:ext>
+            </a:extLst>
+          </p:cNvPr>
+          <p:cNvSpPr/>
+          <p:nvPr/>
+        </p:nvSpPr>
+        <p:spPr>
+          <a:xfrm>
+            <a:off x="4426328" y="1588449"/>
+            <a:ext cx="3994656" cy="1903839"/>
+          </a:xfrm>
+          <a:prstGeom prst="roundRect">
+            <a:avLst/>
+          </a:prstGeom>
+        </p:spPr>
+        <p:style>
+          <a:lnRef idx="2">
+            <a:schemeClr val="accent6"/>
+          </a:lnRef>
+          <a:fillRef idx="1">
+            <a:schemeClr val="lt1"/>
+          </a:fillRef>
+          <a:effectRef idx="0">
+            <a:schemeClr val="accent6"/>
+          </a:effectRef>
+          <a:fontRef idx="minor">
+            <a:schemeClr val="dk1"/>
+          </a:fontRef>
+        </p:style>
+        <p:txBody>
+          <a:bodyPr rtlCol="0" anchor="t"/>
+          <a:lstStyle/>
+          <a:p>
+            <a:pPr algn="ctr"/>
+            <a:r>
+              <a:rPr lang="de-DE" sz="1200" dirty="0" err="1"/>
+              <a:t>Inference</a:t>
+            </a:r>
+            <a:r>
+              <a:rPr lang="de-DE" sz="1200" dirty="0"/>
+              <a:t> Engine</a:t>
+            </a:r>
+          </a:p>
+        </p:txBody>
+      </p:sp>
+      <p:sp>
+        <p:nvSpPr>
+          <p:cNvPr id="10" name="Abgerundetes Rechteck 9">
+            <a:extLst>
+              <a:ext uri="{FF2B5EF4-FFF2-40B4-BE49-F238E27FC236}">
+                <a16:creationId xmlns:a16="http://schemas.microsoft.com/office/drawing/2014/main" id="{4178716A-37B9-5E2F-B43B-2A0439C77673}"/>
+              </a:ext>
+            </a:extLst>
+          </p:cNvPr>
+          <p:cNvSpPr/>
+          <p:nvPr/>
+        </p:nvSpPr>
+        <p:spPr>
+          <a:xfrm>
+            <a:off x="4532862" y="2019488"/>
+            <a:ext cx="983660" cy="580171"/>
+          </a:xfrm>
+          <a:prstGeom prst="roundRect">
+            <a:avLst/>
+          </a:prstGeom>
+        </p:spPr>
+        <p:style>
+          <a:lnRef idx="2">
+            <a:schemeClr val="accent6"/>
+          </a:lnRef>
+          <a:fillRef idx="1">
+            <a:schemeClr val="lt1"/>
+          </a:fillRef>
+          <a:effectRef idx="0">
+            <a:schemeClr val="accent6"/>
+          </a:effectRef>
+          <a:fontRef idx="minor">
+            <a:schemeClr val="dk1"/>
+          </a:fontRef>
+        </p:style>
+        <p:txBody>
+          <a:bodyPr rtlCol="0" anchor="ctr"/>
+          <a:lstStyle/>
+          <a:p>
+            <a:pPr algn="ctr"/>
+            <a:r>
+              <a:rPr lang="de-DE" sz="1200" dirty="0"/>
+              <a:t>Dynamic </a:t>
+            </a:r>
+            <a:r>
+              <a:rPr lang="de-DE" sz="1200" dirty="0" err="1"/>
+              <a:t>Batching</a:t>
+            </a:r>
+            <a:endParaRPr lang="de-DE" sz="1200" dirty="0"/>
+          </a:p>
+        </p:txBody>
+      </p:sp>
+      <p:sp>
+        <p:nvSpPr>
+          <p:cNvPr id="11" name="Abgerundetes Rechteck 10">
+            <a:extLst>
+              <a:ext uri="{FF2B5EF4-FFF2-40B4-BE49-F238E27FC236}">
+                <a16:creationId xmlns:a16="http://schemas.microsoft.com/office/drawing/2014/main" id="{0D5A8207-2898-E14E-9979-AD3A421C6B43}"/>
+              </a:ext>
+            </a:extLst>
+          </p:cNvPr>
+          <p:cNvSpPr/>
+          <p:nvPr/>
+        </p:nvSpPr>
+        <p:spPr>
+          <a:xfrm>
+            <a:off x="4532862" y="2777659"/>
+            <a:ext cx="983660" cy="580171"/>
+          </a:xfrm>
+          <a:prstGeom prst="roundRect">
+            <a:avLst/>
+          </a:prstGeom>
+        </p:spPr>
+        <p:style>
+          <a:lnRef idx="2">
+            <a:schemeClr val="accent6"/>
+          </a:lnRef>
+          <a:fillRef idx="1">
+            <a:schemeClr val="lt1"/>
+          </a:fillRef>
+          <a:effectRef idx="0">
+            <a:schemeClr val="accent6"/>
+          </a:effectRef>
+          <a:fontRef idx="minor">
+            <a:schemeClr val="dk1"/>
+          </a:fontRef>
+        </p:style>
+        <p:txBody>
+          <a:bodyPr rtlCol="0" anchor="ctr"/>
+          <a:lstStyle/>
+          <a:p>
+            <a:pPr algn="ctr"/>
+            <a:r>
+              <a:rPr lang="de-DE" sz="1200" dirty="0"/>
+              <a:t>Response</a:t>
+            </a:r>
+          </a:p>
+        </p:txBody>
+      </p:sp>
+      <p:sp>
+        <p:nvSpPr>
+          <p:cNvPr id="12" name="Abgerundetes Rechteck 11">
+            <a:extLst>
+              <a:ext uri="{FF2B5EF4-FFF2-40B4-BE49-F238E27FC236}">
+                <a16:creationId xmlns:a16="http://schemas.microsoft.com/office/drawing/2014/main" id="{9AAC590D-D263-1955-BFC4-CB0BD9E204E7}"/>
+              </a:ext>
+            </a:extLst>
+          </p:cNvPr>
+          <p:cNvSpPr/>
+          <p:nvPr/>
+        </p:nvSpPr>
+        <p:spPr>
+          <a:xfrm>
+            <a:off x="7067514" y="2011662"/>
+            <a:ext cx="974510" cy="580171"/>
+          </a:xfrm>
+          <a:prstGeom prst="roundRect">
+            <a:avLst/>
+          </a:prstGeom>
+        </p:spPr>
+        <p:style>
+          <a:lnRef idx="2">
+            <a:schemeClr val="accent6"/>
+          </a:lnRef>
+          <a:fillRef idx="1">
+            <a:schemeClr val="lt1"/>
+          </a:fillRef>
+          <a:effectRef idx="0">
+            <a:schemeClr val="accent6"/>
+          </a:effectRef>
+          <a:fontRef idx="minor">
+            <a:schemeClr val="dk1"/>
+          </a:fontRef>
+        </p:style>
+        <p:txBody>
+          <a:bodyPr rtlCol="0" anchor="ctr"/>
+          <a:lstStyle/>
+          <a:p>
+            <a:pPr algn="ctr"/>
+            <a:r>
+              <a:rPr lang="de-DE" sz="1200" dirty="0"/>
+              <a:t>Model</a:t>
+            </a:r>
+          </a:p>
+        </p:txBody>
+      </p:sp>
+      <p:sp>
+        <p:nvSpPr>
+          <p:cNvPr id="13" name="Abgerundetes Rechteck 12">
+            <a:extLst>
+              <a:ext uri="{FF2B5EF4-FFF2-40B4-BE49-F238E27FC236}">
+                <a16:creationId xmlns:a16="http://schemas.microsoft.com/office/drawing/2014/main" id="{7F38D1E1-4A6C-95BA-12F4-C57BE9BEE7EA}"/>
+              </a:ext>
+            </a:extLst>
+          </p:cNvPr>
+          <p:cNvSpPr/>
+          <p:nvPr/>
+        </p:nvSpPr>
+        <p:spPr>
+          <a:xfrm>
+            <a:off x="5675877" y="2019487"/>
+            <a:ext cx="983660" cy="580171"/>
+          </a:xfrm>
+          <a:prstGeom prst="roundRect">
+            <a:avLst/>
+          </a:prstGeom>
+        </p:spPr>
+        <p:style>
+          <a:lnRef idx="2">
+            <a:schemeClr val="accent6"/>
+          </a:lnRef>
+          <a:fillRef idx="1">
+            <a:schemeClr val="lt1"/>
+          </a:fillRef>
+          <a:effectRef idx="0">
+            <a:schemeClr val="accent6"/>
+          </a:effectRef>
+          <a:fontRef idx="minor">
+            <a:schemeClr val="dk1"/>
+          </a:fontRef>
+        </p:style>
+        <p:txBody>
+          <a:bodyPr rtlCol="0" anchor="ctr"/>
+          <a:lstStyle/>
+          <a:p>
+            <a:pPr algn="ctr"/>
+            <a:r>
+              <a:rPr lang="de-DE" sz="1200" dirty="0"/>
+              <a:t>Generate</a:t>
+            </a:r>
+          </a:p>
+        </p:txBody>
+      </p:sp>
+      <p:cxnSp>
+        <p:nvCxnSpPr>
+          <p:cNvPr id="15" name="Gerade Verbindung mit Pfeil 14">
+            <a:extLst>
+              <a:ext uri="{FF2B5EF4-FFF2-40B4-BE49-F238E27FC236}">
+                <a16:creationId xmlns:a16="http://schemas.microsoft.com/office/drawing/2014/main" id="{84528BD7-E1E1-C71C-4232-2EE2E37D8928}"/>
+              </a:ext>
+            </a:extLst>
+          </p:cNvPr>
+          <p:cNvCxnSpPr>
+            <a:stCxn id="13" idx="3"/>
+            <a:endCxn id="12" idx="1"/>
+          </p:cNvCxnSpPr>
+          <p:nvPr/>
+        </p:nvCxnSpPr>
+        <p:spPr>
+          <a:xfrm flipV="1">
+            <a:off x="6659537" y="2301748"/>
+            <a:ext cx="407977" cy="7825"/>
+          </a:xfrm>
+          <a:prstGeom prst="straightConnector1">
+            <a:avLst/>
+          </a:prstGeom>
+          <a:ln>
+            <a:headEnd type="triangle"/>
+            <a:tailEnd type="triangle"/>
+          </a:ln>
+        </p:spPr>
+        <p:style>
+          <a:lnRef idx="2">
+            <a:schemeClr val="accent1"/>
+          </a:lnRef>
+          <a:fillRef idx="0">
+            <a:schemeClr val="accent1"/>
+          </a:fillRef>
+          <a:effectRef idx="1">
+            <a:schemeClr val="accent1"/>
+          </a:effectRef>
+          <a:fontRef idx="minor">
+            <a:schemeClr val="tx1"/>
+          </a:fontRef>
+        </p:style>
+      </p:cxnSp>
+      <p:sp>
+        <p:nvSpPr>
+          <p:cNvPr id="16" name="Textfeld 15">
+            <a:extLst>
+              <a:ext uri="{FF2B5EF4-FFF2-40B4-BE49-F238E27FC236}">
+                <a16:creationId xmlns:a16="http://schemas.microsoft.com/office/drawing/2014/main" id="{79C1AA3E-E327-A921-0FDD-1C26205CBB41}"/>
+              </a:ext>
+            </a:extLst>
+          </p:cNvPr>
+          <p:cNvSpPr txBox="1"/>
+          <p:nvPr/>
+        </p:nvSpPr>
+        <p:spPr>
+          <a:xfrm>
+            <a:off x="6622914" y="2024748"/>
+            <a:ext cx="481222" cy="276999"/>
+          </a:xfrm>
+          <a:prstGeom prst="rect">
+            <a:avLst/>
+          </a:prstGeom>
+          <a:noFill/>
+        </p:spPr>
+        <p:txBody>
+          <a:bodyPr wrap="none" rtlCol="0">
+            <a:spAutoFit/>
+          </a:bodyPr>
+          <a:lstStyle/>
+          <a:p>
+            <a:r>
+              <a:rPr lang="de-DE" sz="1200" dirty="0"/>
+              <a:t>loop</a:t>
+            </a:r>
+          </a:p>
+        </p:txBody>
+      </p:sp>
+      <p:cxnSp>
+        <p:nvCxnSpPr>
+          <p:cNvPr id="18" name="Gerade Verbindung mit Pfeil 17">
+            <a:extLst>
+              <a:ext uri="{FF2B5EF4-FFF2-40B4-BE49-F238E27FC236}">
+                <a16:creationId xmlns:a16="http://schemas.microsoft.com/office/drawing/2014/main" id="{62176BB9-79AB-F7EC-2EE3-BC291D5201F4}"/>
+              </a:ext>
+            </a:extLst>
+          </p:cNvPr>
+          <p:cNvCxnSpPr>
+            <a:stCxn id="10" idx="3"/>
+            <a:endCxn id="13" idx="1"/>
+          </p:cNvCxnSpPr>
+          <p:nvPr/>
+        </p:nvCxnSpPr>
+        <p:spPr>
+          <a:xfrm flipV="1">
+            <a:off x="5516522" y="2309573"/>
+            <a:ext cx="159355" cy="1"/>
+          </a:xfrm>
+          <a:prstGeom prst="straightConnector1">
+            <a:avLst/>
+          </a:prstGeom>
+          <a:ln>
+            <a:tailEnd type="triangle"/>
+          </a:ln>
+        </p:spPr>
+        <p:style>
+          <a:lnRef idx="2">
+            <a:schemeClr val="accent1"/>
+          </a:lnRef>
+          <a:fillRef idx="0">
+            <a:schemeClr val="accent1"/>
+          </a:fillRef>
+          <a:effectRef idx="1">
+            <a:schemeClr val="accent1"/>
+          </a:effectRef>
+          <a:fontRef idx="minor">
+            <a:schemeClr val="tx1"/>
+          </a:fontRef>
+        </p:style>
+      </p:cxnSp>
+      <p:cxnSp>
+        <p:nvCxnSpPr>
+          <p:cNvPr id="20" name="Gewinkelte Verbindung 19">
+            <a:extLst>
+              <a:ext uri="{FF2B5EF4-FFF2-40B4-BE49-F238E27FC236}">
+                <a16:creationId xmlns:a16="http://schemas.microsoft.com/office/drawing/2014/main" id="{59F9F2C6-5B00-CAEA-C6DB-FF520E0A85B2}"/>
+              </a:ext>
+            </a:extLst>
+          </p:cNvPr>
+          <p:cNvCxnSpPr>
+            <a:stCxn id="13" idx="2"/>
+            <a:endCxn id="11" idx="3"/>
+          </p:cNvCxnSpPr>
+          <p:nvPr/>
+        </p:nvCxnSpPr>
+        <p:spPr>
+          <a:xfrm rot="5400000">
+            <a:off x="5608072" y="2508109"/>
+            <a:ext cx="468087" cy="651185"/>
+          </a:xfrm>
+          <a:prstGeom prst="bentConnector2">
+            <a:avLst/>
+          </a:prstGeom>
+          <a:ln>
+            <a:tailEnd type="triangle"/>
+          </a:ln>
+        </p:spPr>
+        <p:style>
+          <a:lnRef idx="2">
+            <a:schemeClr val="accent1"/>
+          </a:lnRef>
+          <a:fillRef idx="0">
+            <a:schemeClr val="accent1"/>
+          </a:fillRef>
+          <a:effectRef idx="1">
+            <a:schemeClr val="accent1"/>
+          </a:effectRef>
+          <a:fontRef idx="minor">
+            <a:schemeClr val="tx1"/>
+          </a:fontRef>
+        </p:style>
+      </p:cxnSp>
+      <p:cxnSp>
+        <p:nvCxnSpPr>
+          <p:cNvPr id="22" name="Gerade Verbindung mit Pfeil 21">
+            <a:extLst>
+              <a:ext uri="{FF2B5EF4-FFF2-40B4-BE49-F238E27FC236}">
+                <a16:creationId xmlns:a16="http://schemas.microsoft.com/office/drawing/2014/main" id="{72BAC15D-BBCC-9DB6-2276-4539444E3F40}"/>
+              </a:ext>
+            </a:extLst>
+          </p:cNvPr>
+          <p:cNvCxnSpPr>
+            <a:stCxn id="5" idx="3"/>
+            <a:endCxn id="10" idx="1"/>
+          </p:cNvCxnSpPr>
+          <p:nvPr/>
+        </p:nvCxnSpPr>
+        <p:spPr>
+          <a:xfrm flipV="1">
+            <a:off x="3851345" y="2309574"/>
+            <a:ext cx="681517" cy="6073"/>
+          </a:xfrm>
+          <a:prstGeom prst="straightConnector1">
+            <a:avLst/>
+          </a:prstGeom>
+          <a:ln>
+            <a:tailEnd type="triangle"/>
+          </a:ln>
+        </p:spPr>
+        <p:style>
+          <a:lnRef idx="1">
+            <a:schemeClr val="accent6"/>
+          </a:lnRef>
+          <a:fillRef idx="0">
+            <a:schemeClr val="accent6"/>
+          </a:fillRef>
+          <a:effectRef idx="0">
+            <a:schemeClr val="accent6"/>
+          </a:effectRef>
+          <a:fontRef idx="minor">
+            <a:schemeClr val="tx1"/>
+          </a:fontRef>
+        </p:style>
+      </p:cxnSp>
+      <p:cxnSp>
+        <p:nvCxnSpPr>
+          <p:cNvPr id="24" name="Gerade Verbindung mit Pfeil 23">
+            <a:extLst>
+              <a:ext uri="{FF2B5EF4-FFF2-40B4-BE49-F238E27FC236}">
+                <a16:creationId xmlns:a16="http://schemas.microsoft.com/office/drawing/2014/main" id="{A9973DEF-1CFA-9DAE-EDF5-31AB2A3D2152}"/>
+              </a:ext>
+            </a:extLst>
+          </p:cNvPr>
+          <p:cNvCxnSpPr>
+            <a:stCxn id="11" idx="1"/>
+          </p:cNvCxnSpPr>
+          <p:nvPr/>
+        </p:nvCxnSpPr>
+        <p:spPr>
+          <a:xfrm flipH="1" flipV="1">
+            <a:off x="1385920" y="3067744"/>
+            <a:ext cx="3146942" cy="1"/>
+          </a:xfrm>
+          <a:prstGeom prst="straightConnector1">
+            <a:avLst/>
+          </a:prstGeom>
+          <a:ln>
+            <a:tailEnd type="triangle"/>
+          </a:ln>
+        </p:spPr>
+        <p:style>
+          <a:lnRef idx="1">
+            <a:schemeClr val="accent6"/>
+          </a:lnRef>
+          <a:fillRef idx="0">
+            <a:schemeClr val="accent6"/>
+          </a:fillRef>
+          <a:effectRef idx="0">
+            <a:schemeClr val="accent6"/>
+          </a:effectRef>
+          <a:fontRef idx="minor">
+            <a:schemeClr val="tx1"/>
+          </a:fontRef>
+        </p:style>
+      </p:cxnSp>
+      <p:sp>
+        <p:nvSpPr>
+          <p:cNvPr id="25" name="Textfeld 24">
+            <a:extLst>
+              <a:ext uri="{FF2B5EF4-FFF2-40B4-BE49-F238E27FC236}">
+                <a16:creationId xmlns:a16="http://schemas.microsoft.com/office/drawing/2014/main" id="{565310B2-977C-512F-9847-A489FAB03222}"/>
+              </a:ext>
+            </a:extLst>
+          </p:cNvPr>
+          <p:cNvSpPr txBox="1"/>
+          <p:nvPr/>
+        </p:nvSpPr>
+        <p:spPr>
+          <a:xfrm>
+            <a:off x="1449545" y="3114135"/>
+            <a:ext cx="1008609" cy="276999"/>
+          </a:xfrm>
+          <a:prstGeom prst="rect">
+            <a:avLst/>
+          </a:prstGeom>
+          <a:noFill/>
+        </p:spPr>
+        <p:txBody>
+          <a:bodyPr wrap="none" rtlCol="0">
+            <a:spAutoFit/>
+          </a:bodyPr>
+          <a:lstStyle/>
+          <a:p>
+            <a:r>
+              <a:rPr lang="de-DE" sz="1200" dirty="0"/>
+              <a:t>HTTP / gRPC</a:t>
+            </a:r>
+          </a:p>
+        </p:txBody>
+      </p:sp>
+      <p:sp>
+        <p:nvSpPr>
+          <p:cNvPr id="26" name="Abgerundetes Rechteck 25">
+            <a:extLst>
+              <a:ext uri="{FF2B5EF4-FFF2-40B4-BE49-F238E27FC236}">
+                <a16:creationId xmlns:a16="http://schemas.microsoft.com/office/drawing/2014/main" id="{7FCFCC05-2906-3F64-BAA7-694D22B8C7E7}"/>
+              </a:ext>
+            </a:extLst>
+          </p:cNvPr>
+          <p:cNvSpPr/>
+          <p:nvPr/>
+        </p:nvSpPr>
+        <p:spPr>
+          <a:xfrm>
+            <a:off x="2788448" y="3748049"/>
+            <a:ext cx="3266792" cy="580171"/>
+          </a:xfrm>
+          <a:prstGeom prst="roundRect">
+            <a:avLst/>
+          </a:prstGeom>
+        </p:spPr>
+        <p:style>
+          <a:lnRef idx="2">
+            <a:schemeClr val="accent6"/>
+          </a:lnRef>
+          <a:fillRef idx="1">
+            <a:schemeClr val="lt1"/>
+          </a:fillRef>
+          <a:effectRef idx="0">
+            <a:schemeClr val="accent6"/>
+          </a:effectRef>
+          <a:fontRef idx="minor">
+            <a:schemeClr val="dk1"/>
+          </a:fontRef>
+        </p:style>
+        <p:txBody>
+          <a:bodyPr rtlCol="0" anchor="ctr"/>
+          <a:lstStyle/>
+          <a:p>
+            <a:pPr algn="ctr"/>
+            <a:r>
+              <a:rPr lang="de-DE" sz="1200" dirty="0" err="1"/>
+              <a:t>Metrics</a:t>
+            </a:r>
+            <a:r>
+              <a:rPr lang="de-DE" sz="1200" dirty="0"/>
+              <a:t> (Durchsatz &amp; Latenz)</a:t>
+            </a:r>
+          </a:p>
+        </p:txBody>
+      </p:sp>
+      <p:sp>
+        <p:nvSpPr>
+          <p:cNvPr id="27" name="Abgerundetes Rechteck 26">
+            <a:extLst>
+              <a:ext uri="{FF2B5EF4-FFF2-40B4-BE49-F238E27FC236}">
+                <a16:creationId xmlns:a16="http://schemas.microsoft.com/office/drawing/2014/main" id="{96156987-7718-A741-19A5-09610FA08715}"/>
+              </a:ext>
+            </a:extLst>
+          </p:cNvPr>
+          <p:cNvSpPr/>
+          <p:nvPr/>
+        </p:nvSpPr>
+        <p:spPr>
+          <a:xfrm>
+            <a:off x="8508430" y="1588449"/>
+            <a:ext cx="974510" cy="1903839"/>
+          </a:xfrm>
+          <a:prstGeom prst="roundRect">
+            <a:avLst/>
+          </a:prstGeom>
+        </p:spPr>
+        <p:style>
+          <a:lnRef idx="2">
+            <a:schemeClr val="accent6"/>
+          </a:lnRef>
+          <a:fillRef idx="1">
+            <a:schemeClr val="lt1"/>
+          </a:fillRef>
+          <a:effectRef idx="0">
+            <a:schemeClr val="accent6"/>
+          </a:effectRef>
+          <a:fontRef idx="minor">
+            <a:schemeClr val="dk1"/>
+          </a:fontRef>
+        </p:style>
+        <p:txBody>
+          <a:bodyPr vert="vert270" rtlCol="0" anchor="ctr"/>
+          <a:lstStyle/>
+          <a:p>
+            <a:pPr algn="ctr"/>
+            <a:r>
+              <a:rPr lang="de-DE" sz="1200" dirty="0"/>
+              <a:t>Multi-Model Management</a:t>
+            </a:r>
+          </a:p>
+        </p:txBody>
+      </p:sp>
+      <p:sp>
+        <p:nvSpPr>
+          <p:cNvPr id="28" name="Rechteck 27">
+            <a:extLst>
+              <a:ext uri="{FF2B5EF4-FFF2-40B4-BE49-F238E27FC236}">
+                <a16:creationId xmlns:a16="http://schemas.microsoft.com/office/drawing/2014/main" id="{978E31BD-50AF-E96C-B401-6154BE28C1CD}"/>
+              </a:ext>
+            </a:extLst>
+          </p:cNvPr>
+          <p:cNvSpPr/>
+          <p:nvPr/>
+        </p:nvSpPr>
+        <p:spPr>
+          <a:xfrm>
+            <a:off x="10242417" y="1152929"/>
+            <a:ext cx="1026732" cy="2791749"/>
+          </a:xfrm>
+          <a:prstGeom prst="rect">
+            <a:avLst/>
+          </a:prstGeom>
+        </p:spPr>
+        <p:style>
+          <a:lnRef idx="2">
+            <a:schemeClr val="accent1">
+              <a:shade val="15000"/>
+            </a:schemeClr>
+          </a:lnRef>
+          <a:fillRef idx="1">
+            <a:schemeClr val="accent1"/>
+          </a:fillRef>
+          <a:effectRef idx="0">
+            <a:schemeClr val="accent1"/>
+          </a:effectRef>
+          <a:fontRef idx="minor">
+            <a:schemeClr val="lt1"/>
+          </a:fontRef>
+        </p:style>
+        <p:txBody>
+          <a:bodyPr vert="vert270" rtlCol="0" anchor="ctr"/>
+          <a:lstStyle/>
+          <a:p>
+            <a:pPr algn="ctr"/>
+            <a:r>
+              <a:rPr lang="de-DE" dirty="0"/>
+              <a:t>Model Registry</a:t>
+            </a:r>
+          </a:p>
+        </p:txBody>
+      </p:sp>
+      <p:cxnSp>
+        <p:nvCxnSpPr>
+          <p:cNvPr id="30" name="Gerade Verbindung mit Pfeil 29">
+            <a:extLst>
+              <a:ext uri="{FF2B5EF4-FFF2-40B4-BE49-F238E27FC236}">
+                <a16:creationId xmlns:a16="http://schemas.microsoft.com/office/drawing/2014/main" id="{607ADCEE-C847-92DE-8011-FEA72C586452}"/>
+              </a:ext>
+            </a:extLst>
+          </p:cNvPr>
+          <p:cNvCxnSpPr>
+            <a:cxnSpLocks/>
+            <a:stCxn id="27" idx="3"/>
+          </p:cNvCxnSpPr>
+          <p:nvPr/>
+        </p:nvCxnSpPr>
+        <p:spPr>
+          <a:xfrm>
+            <a:off x="9482940" y="2540369"/>
+            <a:ext cx="759477" cy="0"/>
+          </a:xfrm>
+          <a:prstGeom prst="straightConnector1">
+            <a:avLst/>
+          </a:prstGeom>
+          <a:ln>
+            <a:solidFill>
+              <a:schemeClr val="accent6"/>
+            </a:solidFill>
+            <a:headEnd type="triangle"/>
+            <a:tailEnd type="triangle"/>
+          </a:ln>
+        </p:spPr>
+        <p:style>
+          <a:lnRef idx="2">
+            <a:schemeClr val="accent1"/>
+          </a:lnRef>
+          <a:fillRef idx="0">
+            <a:schemeClr val="accent1"/>
+          </a:fillRef>
+          <a:effectRef idx="1">
+            <a:schemeClr val="accent1"/>
+          </a:effectRef>
+          <a:fontRef idx="minor">
+            <a:schemeClr val="tx1"/>
+          </a:fontRef>
+        </p:style>
+      </p:cxnSp>
+      <p:sp>
+        <p:nvSpPr>
+          <p:cNvPr id="32" name="Rechteck 31">
+            <a:extLst>
+              <a:ext uri="{FF2B5EF4-FFF2-40B4-BE49-F238E27FC236}">
+                <a16:creationId xmlns:a16="http://schemas.microsoft.com/office/drawing/2014/main" id="{1E79F723-EE87-0E9C-8C9C-8143DDBF4581}"/>
+              </a:ext>
+            </a:extLst>
+          </p:cNvPr>
+          <p:cNvSpPr/>
+          <p:nvPr/>
+        </p:nvSpPr>
+        <p:spPr>
+          <a:xfrm>
+            <a:off x="2458153" y="4859078"/>
+            <a:ext cx="7260003" cy="914400"/>
+          </a:xfrm>
+          <a:prstGeom prst="rect">
+            <a:avLst/>
+          </a:prstGeom>
+        </p:spPr>
+        <p:style>
+          <a:lnRef idx="2">
+            <a:schemeClr val="accent1">
+              <a:shade val="15000"/>
+            </a:schemeClr>
+          </a:lnRef>
+          <a:fillRef idx="1">
+            <a:schemeClr val="accent1"/>
+          </a:fillRef>
+          <a:effectRef idx="0">
+            <a:schemeClr val="accent1"/>
+          </a:effectRef>
+          <a:fontRef idx="minor">
+            <a:schemeClr val="lt1"/>
+          </a:fontRef>
+        </p:style>
+        <p:txBody>
+          <a:bodyPr rtlCol="0" anchor="ctr"/>
+          <a:lstStyle/>
+          <a:p>
+            <a:pPr algn="ctr"/>
+            <a:r>
+              <a:rPr lang="de-DE" dirty="0"/>
+              <a:t>Hardware GPU</a:t>
+            </a:r>
+          </a:p>
+        </p:txBody>
+      </p:sp>
+      <p:cxnSp>
+        <p:nvCxnSpPr>
+          <p:cNvPr id="34" name="Gerade Verbindung mit Pfeil 33">
+            <a:extLst>
+              <a:ext uri="{FF2B5EF4-FFF2-40B4-BE49-F238E27FC236}">
+                <a16:creationId xmlns:a16="http://schemas.microsoft.com/office/drawing/2014/main" id="{FB25368E-55D7-71CE-1EFA-1C25BB30EC11}"/>
+              </a:ext>
+            </a:extLst>
+          </p:cNvPr>
+          <p:cNvCxnSpPr/>
+          <p:nvPr/>
+        </p:nvCxnSpPr>
+        <p:spPr>
+          <a:xfrm>
+            <a:off x="7581012" y="2599658"/>
+            <a:ext cx="0" cy="2259420"/>
+          </a:xfrm>
+          <a:prstGeom prst="straightConnector1">
+            <a:avLst/>
+          </a:prstGeom>
+          <a:ln>
+            <a:tailEnd type="triangle"/>
+          </a:ln>
+        </p:spPr>
+        <p:style>
+          <a:lnRef idx="1">
+            <a:schemeClr val="accent6"/>
+          </a:lnRef>
+          <a:fillRef idx="0">
+            <a:schemeClr val="accent6"/>
+          </a:fillRef>
+          <a:effectRef idx="0">
+            <a:schemeClr val="accent6"/>
+          </a:effectRef>
+          <a:fontRef idx="minor">
+            <a:schemeClr val="tx1"/>
+          </a:fontRef>
+        </p:style>
+      </p:cxnSp>
+    </p:spTree>
+    <p:extLst>
+      <p:ext uri="{BB962C8B-B14F-4D97-AF65-F5344CB8AC3E}">
+        <p14:creationId xmlns:p14="http://schemas.microsoft.com/office/powerpoint/2010/main" val="4025392899"/>
+      </p:ext>
+    </p:extLst>
+  </p:cSld>
+  <p:clrMapOvr>
+    <a:masterClrMapping/>
+  </p:clrMapOvr>
+</p:sld>
+</file>
+
 <file path=ppt/slides/slide2.xml><?xml version="1.0" encoding="utf-8"?>
 <p:sld xmlns:a="http://schemas.openxmlformats.org/drawingml/2006/main" xmlns:r="http://schemas.openxmlformats.org/officeDocument/2006/relationships" xmlns:p="http://schemas.openxmlformats.org/presentationml/2006/main">
   <p:cSld>

</xml_diff>